<commit_message>
slides cut back and updated
</commit_message>
<xml_diff>
--- a/powerpoint/glad-slides.pptx
+++ b/powerpoint/glad-slides.pptx
@@ -5,7 +5,7 @@
     <p:sldMasterId id="2147483648" r:id="rId1"/>
   </p:sldMasterIdLst>
   <p:notesMasterIdLst>
-    <p:notesMasterId r:id="rId25"/>
+    <p:notesMasterId r:id="rId23"/>
   </p:notesMasterIdLst>
   <p:sldIdLst>
     <p:sldId id="256" r:id="rId2"/>
@@ -17,20 +17,18 @@
     <p:sldId id="259" r:id="rId8"/>
     <p:sldId id="268" r:id="rId9"/>
     <p:sldId id="260" r:id="rId10"/>
-    <p:sldId id="264" r:id="rId11"/>
-    <p:sldId id="269" r:id="rId12"/>
-    <p:sldId id="262" r:id="rId13"/>
-    <p:sldId id="285" r:id="rId14"/>
-    <p:sldId id="263" r:id="rId15"/>
-    <p:sldId id="271" r:id="rId16"/>
-    <p:sldId id="276" r:id="rId17"/>
-    <p:sldId id="278" r:id="rId18"/>
-    <p:sldId id="281" r:id="rId19"/>
-    <p:sldId id="284" r:id="rId20"/>
-    <p:sldId id="272" r:id="rId21"/>
-    <p:sldId id="267" r:id="rId22"/>
-    <p:sldId id="283" r:id="rId23"/>
-    <p:sldId id="282" r:id="rId24"/>
+    <p:sldId id="269" r:id="rId11"/>
+    <p:sldId id="262" r:id="rId12"/>
+    <p:sldId id="285" r:id="rId13"/>
+    <p:sldId id="271" r:id="rId14"/>
+    <p:sldId id="276" r:id="rId15"/>
+    <p:sldId id="278" r:id="rId16"/>
+    <p:sldId id="281" r:id="rId17"/>
+    <p:sldId id="284" r:id="rId18"/>
+    <p:sldId id="272" r:id="rId19"/>
+    <p:sldId id="267" r:id="rId20"/>
+    <p:sldId id="283" r:id="rId21"/>
+    <p:sldId id="282" r:id="rId22"/>
   </p:sldIdLst>
   <p:sldSz cx="12192000" cy="6858000"/>
   <p:notesSz cx="6858000" cy="9144000"/>
@@ -143,7 +141,7 @@
 <file path=ppt/charts/chart1.xml><?xml version="1.0" encoding="utf-8"?>
 <c:chartSpace xmlns:c="http://schemas.openxmlformats.org/drawingml/2006/chart" xmlns:a="http://schemas.openxmlformats.org/drawingml/2006/main" xmlns:r="http://schemas.openxmlformats.org/officeDocument/2006/relationships" xmlns:c16r2="http://schemas.microsoft.com/office/drawing/2015/06/chart">
   <c:date1904 val="0"/>
-  <c:lang val="en-US"/>
+  <c:lang val="en-GB"/>
   <c:roundedCorners val="0"/>
   <mc:AlternateContent xmlns:mc="http://schemas.openxmlformats.org/markup-compatibility/2006">
     <mc:Choice xmlns:c14="http://schemas.microsoft.com/office/drawing/2007/8/2/chart" Requires="c14">
@@ -1557,7 +1555,7 @@
 <file path=ppt/charts/chart2.xml><?xml version="1.0" encoding="utf-8"?>
 <c:chartSpace xmlns:c="http://schemas.openxmlformats.org/drawingml/2006/chart" xmlns:a="http://schemas.openxmlformats.org/drawingml/2006/main" xmlns:r="http://schemas.openxmlformats.org/officeDocument/2006/relationships" xmlns:c16r2="http://schemas.microsoft.com/office/drawing/2015/06/chart">
   <c:date1904 val="0"/>
-  <c:lang val="en-US"/>
+  <c:lang val="en-GB"/>
   <c:roundedCorners val="0"/>
   <mc:AlternateContent xmlns:mc="http://schemas.openxmlformats.org/markup-compatibility/2006">
     <mc:Choice xmlns:c14="http://schemas.microsoft.com/office/drawing/2007/8/2/chart" Requires="c14">
@@ -2971,7 +2969,7 @@
 <file path=ppt/charts/chart3.xml><?xml version="1.0" encoding="utf-8"?>
 <c:chartSpace xmlns:c="http://schemas.openxmlformats.org/drawingml/2006/chart" xmlns:a="http://schemas.openxmlformats.org/drawingml/2006/main" xmlns:r="http://schemas.openxmlformats.org/officeDocument/2006/relationships" xmlns:c16r2="http://schemas.microsoft.com/office/drawing/2015/06/chart">
   <c:date1904 val="0"/>
-  <c:lang val="en-US"/>
+  <c:lang val="en-GB"/>
   <c:roundedCorners val="0"/>
   <mc:AlternateContent xmlns:mc="http://schemas.openxmlformats.org/markup-compatibility/2006">
     <mc:Choice xmlns:c14="http://schemas.microsoft.com/office/drawing/2007/8/2/chart" Requires="c14">
@@ -4384,7 +4382,7 @@
 <file path=ppt/charts/chart4.xml><?xml version="1.0" encoding="utf-8"?>
 <c:chartSpace xmlns:c="http://schemas.openxmlformats.org/drawingml/2006/chart" xmlns:a="http://schemas.openxmlformats.org/drawingml/2006/main" xmlns:r="http://schemas.openxmlformats.org/officeDocument/2006/relationships" xmlns:c16r2="http://schemas.microsoft.com/office/drawing/2015/06/chart">
   <c:date1904 val="0"/>
-  <c:lang val="en-US"/>
+  <c:lang val="en-GB"/>
   <c:roundedCorners val="0"/>
   <mc:AlternateContent xmlns:mc="http://schemas.openxmlformats.org/markup-compatibility/2006">
     <mc:Choice xmlns:c14="http://schemas.microsoft.com/office/drawing/2007/8/2/chart" Requires="c14">
@@ -5798,7 +5796,7 @@
 <file path=ppt/charts/chart5.xml><?xml version="1.0" encoding="utf-8"?>
 <c:chartSpace xmlns:c="http://schemas.openxmlformats.org/drawingml/2006/chart" xmlns:a="http://schemas.openxmlformats.org/drawingml/2006/main" xmlns:r="http://schemas.openxmlformats.org/officeDocument/2006/relationships" xmlns:c16r2="http://schemas.microsoft.com/office/drawing/2015/06/chart">
   <c:date1904 val="0"/>
-  <c:lang val="en-US"/>
+  <c:lang val="en-GB"/>
   <c:roundedCorners val="0"/>
   <mc:AlternateContent xmlns:mc="http://schemas.openxmlformats.org/markup-compatibility/2006">
     <mc:Choice xmlns:c14="http://schemas.microsoft.com/office/drawing/2007/8/2/chart" Requires="c14">
@@ -7252,7 +7250,7 @@
 <file path=ppt/charts/chart6.xml><?xml version="1.0" encoding="utf-8"?>
 <c:chartSpace xmlns:c="http://schemas.openxmlformats.org/drawingml/2006/chart" xmlns:a="http://schemas.openxmlformats.org/drawingml/2006/main" xmlns:r="http://schemas.openxmlformats.org/officeDocument/2006/relationships" xmlns:c16r2="http://schemas.microsoft.com/office/drawing/2015/06/chart">
   <c:date1904 val="0"/>
-  <c:lang val="en-US"/>
+  <c:lang val="en-GB"/>
   <c:roundedCorners val="0"/>
   <mc:AlternateContent xmlns:mc="http://schemas.openxmlformats.org/markup-compatibility/2006">
     <mc:Choice xmlns:c14="http://schemas.microsoft.com/office/drawing/2007/8/2/chart" Requires="c14">
@@ -8574,7 +8572,7 @@
 <file path=ppt/charts/chart7.xml><?xml version="1.0" encoding="utf-8"?>
 <c:chartSpace xmlns:c="http://schemas.openxmlformats.org/drawingml/2006/chart" xmlns:a="http://schemas.openxmlformats.org/drawingml/2006/main" xmlns:r="http://schemas.openxmlformats.org/officeDocument/2006/relationships" xmlns:c16r2="http://schemas.microsoft.com/office/drawing/2015/06/chart">
   <c:date1904 val="0"/>
-  <c:lang val="en-US"/>
+  <c:lang val="en-GB"/>
   <c:roundedCorners val="0"/>
   <mc:AlternateContent xmlns:mc="http://schemas.openxmlformats.org/markup-compatibility/2006">
     <mc:Choice xmlns:c14="http://schemas.microsoft.com/office/drawing/2007/8/2/chart" Requires="c14">
@@ -9988,7 +9986,7 @@
 <file path=ppt/charts/chart8.xml><?xml version="1.0" encoding="utf-8"?>
 <c:chartSpace xmlns:c="http://schemas.openxmlformats.org/drawingml/2006/chart" xmlns:a="http://schemas.openxmlformats.org/drawingml/2006/main" xmlns:r="http://schemas.openxmlformats.org/officeDocument/2006/relationships" xmlns:c16r2="http://schemas.microsoft.com/office/drawing/2015/06/chart">
   <c:date1904 val="0"/>
-  <c:lang val="en-US"/>
+  <c:lang val="en-GB"/>
   <c:roundedCorners val="0"/>
   <mc:AlternateContent xmlns:mc="http://schemas.openxmlformats.org/markup-compatibility/2006">
     <mc:Choice xmlns:c14="http://schemas.microsoft.com/office/drawing/2007/8/2/chart" Requires="c14">
@@ -15929,7 +15927,7 @@
           <a:p>
             <a:fld id="{8AF7F5E1-4A2E-3B4A-B983-E3467DD6B16B}" type="datetimeFigureOut">
               <a:rPr lang="en-US" smtClean="0"/>
-              <a:t>10/28/22</a:t>
+              <a:t>11/2/22</a:t>
             </a:fld>
             <a:endParaRPr lang="en-US"/>
           </a:p>
@@ -16355,7 +16353,7 @@
     </p:spTree>
     <p:extLst>
       <p:ext uri="{BB962C8B-B14F-4D97-AF65-F5344CB8AC3E}">
-        <p14:creationId xmlns:p14="http://schemas.microsoft.com/office/powerpoint/2010/main" val="3485103202"/>
+        <p14:creationId xmlns:p14="http://schemas.microsoft.com/office/powerpoint/2010/main" val="2097721707"/>
       </p:ext>
     </p:extLst>
   </p:cSld>
@@ -16409,7 +16407,7 @@
           <a:bodyPr/>
           <a:lstStyle/>
           <a:p>
-            <a:endParaRPr lang="en-US"/>
+            <a:endParaRPr lang="en-US" dirty="0"/>
           </a:p>
         </p:txBody>
       </p:sp>
@@ -16439,7 +16437,7 @@
     </p:spTree>
     <p:extLst>
       <p:ext uri="{BB962C8B-B14F-4D97-AF65-F5344CB8AC3E}">
-        <p14:creationId xmlns:p14="http://schemas.microsoft.com/office/powerpoint/2010/main" val="2097721707"/>
+        <p14:creationId xmlns:p14="http://schemas.microsoft.com/office/powerpoint/2010/main" val="11926659"/>
       </p:ext>
     </p:extLst>
   </p:cSld>
@@ -16493,7 +16491,7 @@
           <a:bodyPr/>
           <a:lstStyle/>
           <a:p>
-            <a:endParaRPr lang="en-US" dirty="0"/>
+            <a:endParaRPr lang="en-US"/>
           </a:p>
         </p:txBody>
       </p:sp>
@@ -16514,7 +16512,7 @@
           <a:p>
             <a:fld id="{6015CCE1-9FA1-AB45-B907-52B4A1C0DF23}" type="slidenum">
               <a:rPr lang="en-US" smtClean="0"/>
-              <a:t>12</a:t>
+              <a:t>13</a:t>
             </a:fld>
             <a:endParaRPr lang="en-US"/>
           </a:p>
@@ -16523,7 +16521,7 @@
     </p:spTree>
     <p:extLst>
       <p:ext uri="{BB962C8B-B14F-4D97-AF65-F5344CB8AC3E}">
-        <p14:creationId xmlns:p14="http://schemas.microsoft.com/office/powerpoint/2010/main" val="11926659"/>
+        <p14:creationId xmlns:p14="http://schemas.microsoft.com/office/powerpoint/2010/main" val="1225411065"/>
       </p:ext>
     </p:extLst>
   </p:cSld>
@@ -16577,10 +16575,7 @@
           <a:bodyPr/>
           <a:lstStyle/>
           <a:p>
-            <a:r>
-              <a:rPr lang="en-US"/>
-              <a:t>Shocks</a:t>
-            </a:r>
+            <a:endParaRPr lang="en-US"/>
           </a:p>
         </p:txBody>
       </p:sp>
@@ -16610,7 +16605,7 @@
     </p:spTree>
     <p:extLst>
       <p:ext uri="{BB962C8B-B14F-4D97-AF65-F5344CB8AC3E}">
-        <p14:creationId xmlns:p14="http://schemas.microsoft.com/office/powerpoint/2010/main" val="2954465159"/>
+        <p14:creationId xmlns:p14="http://schemas.microsoft.com/office/powerpoint/2010/main" val="853740566"/>
       </p:ext>
     </p:extLst>
   </p:cSld>
@@ -16694,7 +16689,7 @@
     </p:spTree>
     <p:extLst>
       <p:ext uri="{BB962C8B-B14F-4D97-AF65-F5344CB8AC3E}">
-        <p14:creationId xmlns:p14="http://schemas.microsoft.com/office/powerpoint/2010/main" val="1225411065"/>
+        <p14:creationId xmlns:p14="http://schemas.microsoft.com/office/powerpoint/2010/main" val="2436628566"/>
       </p:ext>
     </p:extLst>
   </p:cSld>
@@ -16778,7 +16773,7 @@
     </p:spTree>
     <p:extLst>
       <p:ext uri="{BB962C8B-B14F-4D97-AF65-F5344CB8AC3E}">
-        <p14:creationId xmlns:p14="http://schemas.microsoft.com/office/powerpoint/2010/main" val="853740566"/>
+        <p14:creationId xmlns:p14="http://schemas.microsoft.com/office/powerpoint/2010/main" val="507453132"/>
       </p:ext>
     </p:extLst>
   </p:cSld>
@@ -16862,7 +16857,7 @@
     </p:spTree>
     <p:extLst>
       <p:ext uri="{BB962C8B-B14F-4D97-AF65-F5344CB8AC3E}">
-        <p14:creationId xmlns:p14="http://schemas.microsoft.com/office/powerpoint/2010/main" val="2436628566"/>
+        <p14:creationId xmlns:p14="http://schemas.microsoft.com/office/powerpoint/2010/main" val="206187255"/>
       </p:ext>
     </p:extLst>
   </p:cSld>
@@ -16938,174 +16933,6 @@
             <a:fld id="{6015CCE1-9FA1-AB45-B907-52B4A1C0DF23}" type="slidenum">
               <a:rPr lang="en-US" smtClean="0"/>
               <a:t>18</a:t>
-            </a:fld>
-            <a:endParaRPr lang="en-US"/>
-          </a:p>
-        </p:txBody>
-      </p:sp>
-    </p:spTree>
-    <p:extLst>
-      <p:ext uri="{BB962C8B-B14F-4D97-AF65-F5344CB8AC3E}">
-        <p14:creationId xmlns:p14="http://schemas.microsoft.com/office/powerpoint/2010/main" val="507453132"/>
-      </p:ext>
-    </p:extLst>
-  </p:cSld>
-  <p:clrMapOvr>
-    <a:masterClrMapping/>
-  </p:clrMapOvr>
-</p:notes>
-</file>
-
-<file path=ppt/notesSlides/notesSlide18.xml><?xml version="1.0" encoding="utf-8"?>
-<p:notes xmlns:a="http://schemas.openxmlformats.org/drawingml/2006/main" xmlns:r="http://schemas.openxmlformats.org/officeDocument/2006/relationships" xmlns:p="http://schemas.openxmlformats.org/presentationml/2006/main">
-  <p:cSld>
-    <p:spTree>
-      <p:nvGrpSpPr>
-        <p:cNvPr id="1" name=""/>
-        <p:cNvGrpSpPr/>
-        <p:nvPr/>
-      </p:nvGrpSpPr>
-      <p:grpSpPr>
-        <a:xfrm>
-          <a:off x="0" y="0"/>
-          <a:ext cx="0" cy="0"/>
-          <a:chOff x="0" y="0"/>
-          <a:chExt cx="0" cy="0"/>
-        </a:xfrm>
-      </p:grpSpPr>
-      <p:sp>
-        <p:nvSpPr>
-          <p:cNvPr id="2" name="Slide Image Placeholder 1"/>
-          <p:cNvSpPr>
-            <a:spLocks noGrp="1" noRot="1" noChangeAspect="1"/>
-          </p:cNvSpPr>
-          <p:nvPr>
-            <p:ph type="sldImg"/>
-          </p:nvPr>
-        </p:nvSpPr>
-        <p:spPr/>
-      </p:sp>
-      <p:sp>
-        <p:nvSpPr>
-          <p:cNvPr id="3" name="Notes Placeholder 2"/>
-          <p:cNvSpPr>
-            <a:spLocks noGrp="1"/>
-          </p:cNvSpPr>
-          <p:nvPr>
-            <p:ph type="body" idx="1"/>
-          </p:nvPr>
-        </p:nvSpPr>
-        <p:spPr/>
-        <p:txBody>
-          <a:bodyPr/>
-          <a:lstStyle/>
-          <a:p>
-            <a:endParaRPr lang="en-US"/>
-          </a:p>
-        </p:txBody>
-      </p:sp>
-      <p:sp>
-        <p:nvSpPr>
-          <p:cNvPr id="4" name="Slide Number Placeholder 3"/>
-          <p:cNvSpPr>
-            <a:spLocks noGrp="1"/>
-          </p:cNvSpPr>
-          <p:nvPr>
-            <p:ph type="sldNum" sz="quarter" idx="5"/>
-          </p:nvPr>
-        </p:nvSpPr>
-        <p:spPr/>
-        <p:txBody>
-          <a:bodyPr/>
-          <a:lstStyle/>
-          <a:p>
-            <a:fld id="{6015CCE1-9FA1-AB45-B907-52B4A1C0DF23}" type="slidenum">
-              <a:rPr lang="en-US" smtClean="0"/>
-              <a:t>19</a:t>
-            </a:fld>
-            <a:endParaRPr lang="en-US"/>
-          </a:p>
-        </p:txBody>
-      </p:sp>
-    </p:spTree>
-    <p:extLst>
-      <p:ext uri="{BB962C8B-B14F-4D97-AF65-F5344CB8AC3E}">
-        <p14:creationId xmlns:p14="http://schemas.microsoft.com/office/powerpoint/2010/main" val="206187255"/>
-      </p:ext>
-    </p:extLst>
-  </p:cSld>
-  <p:clrMapOvr>
-    <a:masterClrMapping/>
-  </p:clrMapOvr>
-</p:notes>
-</file>
-
-<file path=ppt/notesSlides/notesSlide19.xml><?xml version="1.0" encoding="utf-8"?>
-<p:notes xmlns:a="http://schemas.openxmlformats.org/drawingml/2006/main" xmlns:r="http://schemas.openxmlformats.org/officeDocument/2006/relationships" xmlns:p="http://schemas.openxmlformats.org/presentationml/2006/main">
-  <p:cSld>
-    <p:spTree>
-      <p:nvGrpSpPr>
-        <p:cNvPr id="1" name=""/>
-        <p:cNvGrpSpPr/>
-        <p:nvPr/>
-      </p:nvGrpSpPr>
-      <p:grpSpPr>
-        <a:xfrm>
-          <a:off x="0" y="0"/>
-          <a:ext cx="0" cy="0"/>
-          <a:chOff x="0" y="0"/>
-          <a:chExt cx="0" cy="0"/>
-        </a:xfrm>
-      </p:grpSpPr>
-      <p:sp>
-        <p:nvSpPr>
-          <p:cNvPr id="2" name="Slide Image Placeholder 1"/>
-          <p:cNvSpPr>
-            <a:spLocks noGrp="1" noRot="1" noChangeAspect="1"/>
-          </p:cNvSpPr>
-          <p:nvPr>
-            <p:ph type="sldImg"/>
-          </p:nvPr>
-        </p:nvSpPr>
-        <p:spPr/>
-      </p:sp>
-      <p:sp>
-        <p:nvSpPr>
-          <p:cNvPr id="3" name="Notes Placeholder 2"/>
-          <p:cNvSpPr>
-            <a:spLocks noGrp="1"/>
-          </p:cNvSpPr>
-          <p:nvPr>
-            <p:ph type="body" idx="1"/>
-          </p:nvPr>
-        </p:nvSpPr>
-        <p:spPr/>
-        <p:txBody>
-          <a:bodyPr/>
-          <a:lstStyle/>
-          <a:p>
-            <a:endParaRPr lang="en-US"/>
-          </a:p>
-        </p:txBody>
-      </p:sp>
-      <p:sp>
-        <p:nvSpPr>
-          <p:cNvPr id="4" name="Slide Number Placeholder 3"/>
-          <p:cNvSpPr>
-            <a:spLocks noGrp="1"/>
-          </p:cNvSpPr>
-          <p:nvPr>
-            <p:ph type="sldNum" sz="quarter" idx="5"/>
-          </p:nvPr>
-        </p:nvSpPr>
-        <p:spPr/>
-        <p:txBody>
-          <a:bodyPr/>
-          <a:lstStyle/>
-          <a:p>
-            <a:fld id="{6015CCE1-9FA1-AB45-B907-52B4A1C0DF23}" type="slidenum">
-              <a:rPr lang="en-US" smtClean="0"/>
-              <a:t>20</a:t>
             </a:fld>
             <a:endParaRPr lang="en-US"/>
           </a:p>
@@ -18555,7 +18382,7 @@
           <a:p>
             <a:fld id="{6EA60691-BC20-244D-99A6-BF06D3AEC294}" type="datetime1">
               <a:rPr lang="en-AU" smtClean="0"/>
-              <a:t>28/10/22</a:t>
+              <a:t>2/11/2022</a:t>
             </a:fld>
             <a:endParaRPr lang="en-US"/>
           </a:p>
@@ -18755,7 +18582,7 @@
           <a:p>
             <a:fld id="{7F9144AF-5416-F842-BD48-F48F1D6118C2}" type="datetime1">
               <a:rPr lang="en-AU" smtClean="0"/>
-              <a:t>28/10/22</a:t>
+              <a:t>2/11/2022</a:t>
             </a:fld>
             <a:endParaRPr lang="en-US"/>
           </a:p>
@@ -18965,7 +18792,7 @@
           <a:p>
             <a:fld id="{DDBCBA7D-17AB-FD4F-9A2F-196FB328BF2E}" type="datetime1">
               <a:rPr lang="en-AU" smtClean="0"/>
-              <a:t>28/10/22</a:t>
+              <a:t>2/11/2022</a:t>
             </a:fld>
             <a:endParaRPr lang="en-US"/>
           </a:p>
@@ -19165,7 +18992,7 @@
           <a:p>
             <a:fld id="{6863D31C-C034-7741-8460-E5CB1B61D776}" type="datetime1">
               <a:rPr lang="en-AU" smtClean="0"/>
-              <a:t>28/10/22</a:t>
+              <a:t>2/11/2022</a:t>
             </a:fld>
             <a:endParaRPr lang="en-US"/>
           </a:p>
@@ -19441,7 +19268,7 @@
           <a:p>
             <a:fld id="{7E1A3248-5BDF-404A-9052-905C3DD1E5E2}" type="datetime1">
               <a:rPr lang="en-AU" smtClean="0"/>
-              <a:t>28/10/22</a:t>
+              <a:t>2/11/2022</a:t>
             </a:fld>
             <a:endParaRPr lang="en-US"/>
           </a:p>
@@ -19709,7 +19536,7 @@
           <a:p>
             <a:fld id="{F932B512-F2DA-7B45-808B-6FAE5A4D9306}" type="datetime1">
               <a:rPr lang="en-AU" smtClean="0"/>
-              <a:t>28/10/22</a:t>
+              <a:t>2/11/2022</a:t>
             </a:fld>
             <a:endParaRPr lang="en-US"/>
           </a:p>
@@ -20124,7 +19951,7 @@
           <a:p>
             <a:fld id="{4C7D373C-30D7-664F-B9D3-679A6D18C06B}" type="datetime1">
               <a:rPr lang="en-AU" smtClean="0"/>
-              <a:t>28/10/22</a:t>
+              <a:t>2/11/2022</a:t>
             </a:fld>
             <a:endParaRPr lang="en-US"/>
           </a:p>
@@ -20266,7 +20093,7 @@
           <a:p>
             <a:fld id="{79596DAF-8286-784E-A5BE-4F485BBD43E0}" type="datetime1">
               <a:rPr lang="en-AU" smtClean="0"/>
-              <a:t>28/10/22</a:t>
+              <a:t>2/11/2022</a:t>
             </a:fld>
             <a:endParaRPr lang="en-US"/>
           </a:p>
@@ -20379,7 +20206,7 @@
           <a:p>
             <a:fld id="{A9904FF5-EF95-6F4A-9B6C-9E0199FB00C5}" type="datetime1">
               <a:rPr lang="en-AU" smtClean="0"/>
-              <a:t>28/10/22</a:t>
+              <a:t>2/11/2022</a:t>
             </a:fld>
             <a:endParaRPr lang="en-US"/>
           </a:p>
@@ -20692,7 +20519,7 @@
           <a:p>
             <a:fld id="{271113E8-C792-7E4C-ACEA-426C717C5DAB}" type="datetime1">
               <a:rPr lang="en-AU" smtClean="0"/>
-              <a:t>28/10/22</a:t>
+              <a:t>2/11/2022</a:t>
             </a:fld>
             <a:endParaRPr lang="en-US"/>
           </a:p>
@@ -20981,7 +20808,7 @@
           <a:p>
             <a:fld id="{3D4019F8-E202-7C44-943C-7ADAB970D59D}" type="datetime1">
               <a:rPr lang="en-AU" smtClean="0"/>
-              <a:t>28/10/22</a:t>
+              <a:t>2/11/2022</a:t>
             </a:fld>
             <a:endParaRPr lang="en-US"/>
           </a:p>
@@ -21224,7 +21051,7 @@
           <a:p>
             <a:fld id="{4597C455-C182-AB4F-A8C8-B43373E8C37B}" type="datetime1">
               <a:rPr lang="en-AU" smtClean="0"/>
-              <a:t>28/10/22</a:t>
+              <a:t>2/11/2022</a:t>
             </a:fld>
             <a:endParaRPr lang="en-US"/>
           </a:p>
@@ -21811,217 +21638,6 @@
       </p:grpSpPr>
       <p:sp>
         <p:nvSpPr>
-          <p:cNvPr id="3" name="Content Placeholder 2">
-            <a:extLst>
-              <a:ext uri="{FF2B5EF4-FFF2-40B4-BE49-F238E27FC236}">
-                <a16:creationId xmlns:a16="http://schemas.microsoft.com/office/drawing/2014/main" id="{89FBFA0C-1C7F-9747-8CCE-6471EE25D2A3}"/>
-              </a:ext>
-            </a:extLst>
-          </p:cNvPr>
-          <p:cNvSpPr>
-            <a:spLocks noGrp="1"/>
-          </p:cNvSpPr>
-          <p:nvPr>
-            <p:ph idx="1"/>
-          </p:nvPr>
-        </p:nvSpPr>
-        <p:spPr>
-          <a:xfrm>
-            <a:off x="838200" y="772583"/>
-            <a:ext cx="10515600" cy="5312833"/>
-          </a:xfrm>
-        </p:spPr>
-        <p:txBody>
-          <a:bodyPr>
-            <a:normAutofit fontScale="92500"/>
-          </a:bodyPr>
-          <a:lstStyle/>
-          <a:p>
-            <a:pPr marL="0" indent="0">
-              <a:buNone/>
-            </a:pPr>
-            <a:r>
-              <a:rPr lang="en-AU" sz="3000" dirty="0"/>
-              <a:t>Data: initial conclusions</a:t>
-            </a:r>
-          </a:p>
-          <a:p>
-            <a:pPr lvl="1"/>
-            <a:r>
-              <a:rPr lang="en-AU" dirty="0"/>
-              <a:t>Gladstone Bauxite imports less than half of Weipa production</a:t>
-            </a:r>
-          </a:p>
-          <a:p>
-            <a:pPr lvl="1"/>
-            <a:r>
-              <a:rPr lang="en-AU" dirty="0"/>
-              <a:t>QAL and Yarwun: Alumina sales to BSL is 15% of total output</a:t>
-            </a:r>
-            <a:endParaRPr lang="en-AU" i="1" dirty="0"/>
-          </a:p>
-          <a:p>
-            <a:pPr marL="457200" lvl="1" indent="0">
-              <a:buNone/>
-            </a:pPr>
-            <a:r>
-              <a:rPr lang="en-AU" i="1" dirty="0"/>
-              <a:t>No obvious major threats to overall supply chain: Rio Tinto is majority owner</a:t>
-            </a:r>
-            <a:endParaRPr lang="en-AU" sz="2000" i="1" dirty="0"/>
-          </a:p>
-          <a:p>
-            <a:pPr marL="457200" lvl="1" indent="0">
-              <a:buNone/>
-            </a:pPr>
-            <a:endParaRPr lang="en-AU" sz="2000" i="1" dirty="0"/>
-          </a:p>
-          <a:p>
-            <a:pPr marL="457200" lvl="1" indent="0">
-              <a:buNone/>
-            </a:pPr>
-            <a:r>
-              <a:rPr lang="en-AU" i="1" dirty="0"/>
-              <a:t>Gladstone economic impact</a:t>
-            </a:r>
-          </a:p>
-          <a:p>
-            <a:pPr lvl="1"/>
-            <a:r>
-              <a:rPr lang="en-AU" dirty="0"/>
-              <a:t>BSL is between one-quarter and one-sixth of the manufacturing sector</a:t>
-            </a:r>
-          </a:p>
-          <a:p>
-            <a:pPr lvl="1"/>
-            <a:r>
-              <a:rPr lang="en-AU" dirty="0"/>
-              <a:t>80% of Aluminium is exported via Gladstone port</a:t>
-            </a:r>
-          </a:p>
-          <a:p>
-            <a:pPr lvl="1"/>
-            <a:r>
-              <a:rPr lang="en-AU" dirty="0"/>
-              <a:t>Subsidy is likely to be over $250 million</a:t>
-            </a:r>
-          </a:p>
-          <a:p>
-            <a:pPr lvl="1"/>
-            <a:endParaRPr lang="en-AU" sz="2000" dirty="0"/>
-          </a:p>
-          <a:p>
-            <a:pPr marL="0" indent="0">
-              <a:buNone/>
-            </a:pPr>
-            <a:r>
-              <a:rPr lang="en-AU" sz="3000" dirty="0"/>
-              <a:t>Data: regionalising the Australian input-output table</a:t>
-            </a:r>
-          </a:p>
-          <a:p>
-            <a:pPr lvl="1"/>
-            <a:r>
-              <a:rPr lang="en-AU" dirty="0"/>
-              <a:t>Modify certain parameters to match estimates e.g. Utilities flows to Manufacturing</a:t>
-            </a:r>
-          </a:p>
-          <a:p>
-            <a:pPr lvl="1"/>
-            <a:r>
-              <a:rPr lang="en-AU" i="1" dirty="0"/>
-              <a:t>Within-model tuning </a:t>
-            </a:r>
-            <a:r>
-              <a:rPr lang="en-AU" dirty="0"/>
-              <a:t>of parameters to approximate observed Gladstone proportions  for variables such as </a:t>
-            </a:r>
-            <a:r>
-              <a:rPr lang="en-AU" i="1" dirty="0"/>
-              <a:t>output </a:t>
-            </a:r>
-            <a:r>
-              <a:rPr lang="en-AU" dirty="0"/>
-              <a:t>and </a:t>
-            </a:r>
-            <a:r>
-              <a:rPr lang="en-AU" i="1" dirty="0"/>
-              <a:t>labour remittances.</a:t>
-            </a:r>
-            <a:endParaRPr lang="en-AU" dirty="0"/>
-          </a:p>
-          <a:p>
-            <a:endParaRPr lang="en-AU" dirty="0"/>
-          </a:p>
-          <a:p>
-            <a:endParaRPr lang="en-AU" dirty="0"/>
-          </a:p>
-          <a:p>
-            <a:endParaRPr lang="en-US" dirty="0"/>
-          </a:p>
-        </p:txBody>
-      </p:sp>
-      <p:sp>
-        <p:nvSpPr>
-          <p:cNvPr id="2" name="Slide Number Placeholder 1">
-            <a:extLst>
-              <a:ext uri="{FF2B5EF4-FFF2-40B4-BE49-F238E27FC236}">
-                <a16:creationId xmlns:a16="http://schemas.microsoft.com/office/drawing/2014/main" id="{DCB63999-E6D7-33BF-B3D4-FF5A022C6D21}"/>
-              </a:ext>
-            </a:extLst>
-          </p:cNvPr>
-          <p:cNvSpPr>
-            <a:spLocks noGrp="1"/>
-          </p:cNvSpPr>
-          <p:nvPr>
-            <p:ph type="sldNum" sz="quarter" idx="12"/>
-          </p:nvPr>
-        </p:nvSpPr>
-        <p:spPr/>
-        <p:txBody>
-          <a:bodyPr/>
-          <a:lstStyle/>
-          <a:p>
-            <a:fld id="{0F22F1AF-7FE7-D74B-89B5-5B91D7E9B3CD}" type="slidenum">
-              <a:rPr lang="en-US" smtClean="0"/>
-              <a:t>10</a:t>
-            </a:fld>
-            <a:endParaRPr lang="en-US"/>
-          </a:p>
-        </p:txBody>
-      </p:sp>
-    </p:spTree>
-    <p:extLst>
-      <p:ext uri="{BB962C8B-B14F-4D97-AF65-F5344CB8AC3E}">
-        <p14:creationId xmlns:p14="http://schemas.microsoft.com/office/powerpoint/2010/main" val="116260742"/>
-      </p:ext>
-    </p:extLst>
-  </p:cSld>
-  <p:clrMapOvr>
-    <a:masterClrMapping/>
-  </p:clrMapOvr>
-</p:sld>
-</file>
-
-<file path=ppt/slides/slide11.xml><?xml version="1.0" encoding="utf-8"?>
-<p:sld xmlns:a="http://schemas.openxmlformats.org/drawingml/2006/main" xmlns:r="http://schemas.openxmlformats.org/officeDocument/2006/relationships" xmlns:p="http://schemas.openxmlformats.org/presentationml/2006/main">
-  <p:cSld>
-    <p:spTree>
-      <p:nvGrpSpPr>
-        <p:cNvPr id="1" name=""/>
-        <p:cNvGrpSpPr/>
-        <p:nvPr/>
-      </p:nvGrpSpPr>
-      <p:grpSpPr>
-        <a:xfrm>
-          <a:off x="0" y="0"/>
-          <a:ext cx="0" cy="0"/>
-          <a:chOff x="0" y="0"/>
-          <a:chExt cx="0" cy="0"/>
-        </a:xfrm>
-      </p:grpSpPr>
-      <p:sp>
-        <p:nvSpPr>
           <p:cNvPr id="2" name="Title 1">
             <a:extLst>
               <a:ext uri="{FF2B5EF4-FFF2-40B4-BE49-F238E27FC236}">
@@ -22078,7 +21694,7 @@
           <a:p>
             <a:fld id="{0F22F1AF-7FE7-D74B-89B5-5B91D7E9B3CD}" type="slidenum">
               <a:rPr lang="en-US" smtClean="0"/>
-              <a:t>11</a:t>
+              <a:t>10</a:t>
             </a:fld>
             <a:endParaRPr lang="en-US"/>
           </a:p>
@@ -22097,7 +21713,7 @@
 </p:sld>
 </file>
 
-<file path=ppt/slides/slide12.xml><?xml version="1.0" encoding="utf-8"?>
+<file path=ppt/slides/slide11.xml><?xml version="1.0" encoding="utf-8"?>
 <p:sld xmlns:a="http://schemas.openxmlformats.org/drawingml/2006/main" xmlns:r="http://schemas.openxmlformats.org/officeDocument/2006/relationships" xmlns:p="http://schemas.openxmlformats.org/presentationml/2006/main">
   <p:cSld>
     <p:spTree>
@@ -22133,7 +21749,7 @@
         <p:spPr>
           <a:xfrm>
             <a:off x="838200" y="693094"/>
-            <a:ext cx="10515600" cy="5471811"/>
+            <a:ext cx="5257800" cy="3424511"/>
           </a:xfrm>
         </p:spPr>
         <p:txBody>
@@ -22146,59 +21762,79 @@
               <a:buNone/>
             </a:pPr>
             <a:r>
+              <a:rPr lang="en-AU" dirty="0"/>
+              <a:t>Experiment Type (1): </a:t>
+            </a:r>
+          </a:p>
+          <a:p>
+            <a:pPr marL="457200" lvl="1" indent="0">
+              <a:buNone/>
+            </a:pPr>
+            <a:r>
+              <a:rPr lang="en-AU" b="1" dirty="0">
+                <a:solidFill>
+                  <a:srgbClr val="7030A0"/>
+                </a:solidFill>
+              </a:rPr>
+              <a:t>1st phase</a:t>
+            </a:r>
+            <a:r>
               <a:rPr lang="en-AU" dirty="0">
                 <a:solidFill>
                   <a:srgbClr val="7030A0"/>
                 </a:solidFill>
               </a:rPr>
-              <a:t>Experiment Type (1): Euler eq’ns hold</a:t>
+              <a:t>: tune parameters to regionalise, </a:t>
+            </a:r>
+            <a:r>
+              <a:rPr lang="en-AU" b="1" i="1" dirty="0">
+                <a:solidFill>
+                  <a:srgbClr val="7030A0"/>
+                </a:solidFill>
+              </a:rPr>
+              <a:t>all 20 SEE hold</a:t>
             </a:r>
           </a:p>
           <a:p>
             <a:pPr marL="457200" lvl="1" indent="0">
               <a:buNone/>
             </a:pPr>
+            <a:r>
+              <a:rPr lang="en-AU" b="1" dirty="0">
+                <a:solidFill>
+                  <a:srgbClr val="7030A0"/>
+                </a:solidFill>
+              </a:rPr>
+              <a:t>2nd phase</a:t>
+            </a:r>
             <a:r>
               <a:rPr lang="en-AU" dirty="0">
                 <a:solidFill>
                   <a:srgbClr val="7030A0"/>
                 </a:solidFill>
               </a:rPr>
-              <a:t>1st phase: tune parameters to regionalise </a:t>
-            </a:r>
-            <a:r>
-              <a:rPr lang="en-AU" i="1" dirty="0">
+              <a:t>: capital evolves towards a balanced growth path</a:t>
+            </a:r>
+          </a:p>
+          <a:p>
+            <a:pPr marL="457200" lvl="1" indent="0">
+              <a:buNone/>
+            </a:pPr>
+            <a:r>
+              <a:rPr lang="en-AU" b="1" dirty="0">
                 <a:solidFill>
                   <a:srgbClr val="7030A0"/>
                 </a:solidFill>
               </a:rPr>
-              <a:t>and satisfy Euler eq’ns</a:t>
-            </a:r>
-          </a:p>
-          <a:p>
-            <a:pPr marL="457200" lvl="1" indent="0">
-              <a:buNone/>
-            </a:pPr>
+              <a:t>3rd phase</a:t>
+            </a:r>
             <a:r>
               <a:rPr lang="en-AU" dirty="0">
                 <a:solidFill>
                   <a:srgbClr val="7030A0"/>
                 </a:solidFill>
               </a:rPr>
-              <a:t>2nd phase: capital evolves towards a balanced growth path</a:t>
-            </a:r>
-          </a:p>
-          <a:p>
-            <a:pPr marL="457200" lvl="1" indent="0">
-              <a:buNone/>
-            </a:pPr>
-            <a:r>
-              <a:rPr lang="en-AU" dirty="0">
-                <a:solidFill>
-                  <a:srgbClr val="7030A0"/>
-                </a:solidFill>
-              </a:rPr>
-              <a:t>3rd phase: continue along same path and generate</a:t>
+              <a:t>: continue along same path and generate</a:t>
             </a:r>
           </a:p>
           <a:p>
@@ -22230,76 +21866,6 @@
                 <a:srgbClr val="7030A0"/>
               </a:solidFill>
             </a:endParaRPr>
-          </a:p>
-          <a:p>
-            <a:pPr marL="0" indent="0">
-              <a:buNone/>
-            </a:pPr>
-            <a:r>
-              <a:rPr lang="en-AU" dirty="0">
-                <a:solidFill>
-                  <a:srgbClr val="7030A0"/>
-                </a:solidFill>
-              </a:rPr>
-              <a:t>Type (a) shock: one-off “MIT shock” agents don’t see coming</a:t>
-            </a:r>
-          </a:p>
-          <a:p>
-            <a:pPr lvl="1"/>
-            <a:r>
-              <a:rPr lang="en-AU" dirty="0">
-                <a:solidFill>
-                  <a:srgbClr val="7030A0"/>
-                </a:solidFill>
-              </a:rPr>
-              <a:t>One quarter decrease in Manufacturing productivity, capital and exports</a:t>
-            </a:r>
-          </a:p>
-          <a:p>
-            <a:pPr lvl="1"/>
-            <a:r>
-              <a:rPr lang="en-AU" dirty="0">
-                <a:solidFill>
-                  <a:srgbClr val="7030A0"/>
-                </a:solidFill>
-              </a:rPr>
-              <a:t>5/6 decrease in Utilities (energy and water) purchases by Manufacturing</a:t>
-            </a:r>
-          </a:p>
-          <a:p>
-            <a:pPr lvl="1"/>
-            <a:r>
-              <a:rPr lang="en-AU" dirty="0">
-                <a:solidFill>
-                  <a:srgbClr val="7030A0"/>
-                </a:solidFill>
-              </a:rPr>
-              <a:t>No decommissioning or replacement activity</a:t>
-            </a:r>
-          </a:p>
-          <a:p>
-            <a:pPr lvl="1"/>
-            <a:r>
-              <a:rPr lang="en-AU" dirty="0">
-                <a:solidFill>
-                  <a:srgbClr val="7030A0"/>
-                </a:solidFill>
-              </a:rPr>
-              <a:t>Labour is mobile</a:t>
-            </a:r>
-          </a:p>
-          <a:p>
-            <a:pPr marL="457200" lvl="1" indent="0">
-              <a:buNone/>
-            </a:pPr>
-            <a:r>
-              <a:rPr lang="en-AU" dirty="0">
-                <a:solidFill>
-                  <a:srgbClr val="7030A0"/>
-                </a:solidFill>
-              </a:rPr>
-              <a:t>Main message: depends on which experiment we run</a:t>
-            </a:r>
           </a:p>
           <a:p>
             <a:pPr marL="0" indent="0">
@@ -22332,9 +21898,560 @@
           <a:p>
             <a:fld id="{0F22F1AF-7FE7-D74B-89B5-5B91D7E9B3CD}" type="slidenum">
               <a:rPr lang="en-US" smtClean="0"/>
-              <a:t>12</a:t>
+              <a:t>11</a:t>
             </a:fld>
             <a:endParaRPr lang="en-US"/>
+          </a:p>
+        </p:txBody>
+      </p:sp>
+      <p:sp>
+        <p:nvSpPr>
+          <p:cNvPr id="2" name="Content Placeholder 2">
+            <a:extLst>
+              <a:ext uri="{FF2B5EF4-FFF2-40B4-BE49-F238E27FC236}">
+                <a16:creationId xmlns:a16="http://schemas.microsoft.com/office/drawing/2014/main" id="{142C38F8-9208-0665-F8BD-95B3760DD2DD}"/>
+              </a:ext>
+            </a:extLst>
+          </p:cNvPr>
+          <p:cNvSpPr txBox="1">
+            <a:spLocks/>
+          </p:cNvSpPr>
+          <p:nvPr/>
+        </p:nvSpPr>
+        <p:spPr>
+          <a:xfrm>
+            <a:off x="6226896" y="693094"/>
+            <a:ext cx="5126904" cy="3424511"/>
+          </a:xfrm>
+          <a:prstGeom prst="rect">
+            <a:avLst/>
+          </a:prstGeom>
+        </p:spPr>
+        <p:txBody>
+          <a:bodyPr vert="horz" lIns="91440" tIns="45720" rIns="91440" bIns="45720" rtlCol="0">
+            <a:normAutofit/>
+          </a:bodyPr>
+          <a:lstStyle>
+            <a:lvl1pPr marL="228600" indent="-228600" algn="l" defTabSz="914400" rtl="0" eaLnBrk="1" latinLnBrk="0" hangingPunct="1">
+              <a:lnSpc>
+                <a:spcPct val="90000"/>
+              </a:lnSpc>
+              <a:spcBef>
+                <a:spcPts val="1000"/>
+              </a:spcBef>
+              <a:buFont typeface="Arial" panose="020B0604020202020204" pitchFamily="34" charset="0"/>
+              <a:buChar char="•"/>
+              <a:defRPr sz="2800" kern="1200">
+                <a:solidFill>
+                  <a:schemeClr val="tx1"/>
+                </a:solidFill>
+                <a:latin typeface="+mn-lt"/>
+                <a:ea typeface="+mn-ea"/>
+                <a:cs typeface="+mn-cs"/>
+              </a:defRPr>
+            </a:lvl1pPr>
+            <a:lvl2pPr marL="685800" indent="-228600" algn="l" defTabSz="914400" rtl="0" eaLnBrk="1" latinLnBrk="0" hangingPunct="1">
+              <a:lnSpc>
+                <a:spcPct val="90000"/>
+              </a:lnSpc>
+              <a:spcBef>
+                <a:spcPts val="500"/>
+              </a:spcBef>
+              <a:buFont typeface="Arial" panose="020B0604020202020204" pitchFamily="34" charset="0"/>
+              <a:buChar char="•"/>
+              <a:defRPr sz="2400" kern="1200">
+                <a:solidFill>
+                  <a:schemeClr val="tx1"/>
+                </a:solidFill>
+                <a:latin typeface="+mn-lt"/>
+                <a:ea typeface="+mn-ea"/>
+                <a:cs typeface="+mn-cs"/>
+              </a:defRPr>
+            </a:lvl2pPr>
+            <a:lvl3pPr marL="1143000" indent="-228600" algn="l" defTabSz="914400" rtl="0" eaLnBrk="1" latinLnBrk="0" hangingPunct="1">
+              <a:lnSpc>
+                <a:spcPct val="90000"/>
+              </a:lnSpc>
+              <a:spcBef>
+                <a:spcPts val="500"/>
+              </a:spcBef>
+              <a:buFont typeface="Arial" panose="020B0604020202020204" pitchFamily="34" charset="0"/>
+              <a:buChar char="•"/>
+              <a:defRPr sz="2000" kern="1200">
+                <a:solidFill>
+                  <a:schemeClr val="tx1"/>
+                </a:solidFill>
+                <a:latin typeface="+mn-lt"/>
+                <a:ea typeface="+mn-ea"/>
+                <a:cs typeface="+mn-cs"/>
+              </a:defRPr>
+            </a:lvl3pPr>
+            <a:lvl4pPr marL="1600200" indent="-228600" algn="l" defTabSz="914400" rtl="0" eaLnBrk="1" latinLnBrk="0" hangingPunct="1">
+              <a:lnSpc>
+                <a:spcPct val="90000"/>
+              </a:lnSpc>
+              <a:spcBef>
+                <a:spcPts val="500"/>
+              </a:spcBef>
+              <a:buFont typeface="Arial" panose="020B0604020202020204" pitchFamily="34" charset="0"/>
+              <a:buChar char="•"/>
+              <a:defRPr sz="1800" kern="1200">
+                <a:solidFill>
+                  <a:schemeClr val="tx1"/>
+                </a:solidFill>
+                <a:latin typeface="+mn-lt"/>
+                <a:ea typeface="+mn-ea"/>
+                <a:cs typeface="+mn-cs"/>
+              </a:defRPr>
+            </a:lvl4pPr>
+            <a:lvl5pPr marL="2057400" indent="-228600" algn="l" defTabSz="914400" rtl="0" eaLnBrk="1" latinLnBrk="0" hangingPunct="1">
+              <a:lnSpc>
+                <a:spcPct val="90000"/>
+              </a:lnSpc>
+              <a:spcBef>
+                <a:spcPts val="500"/>
+              </a:spcBef>
+              <a:buFont typeface="Arial" panose="020B0604020202020204" pitchFamily="34" charset="0"/>
+              <a:buChar char="•"/>
+              <a:defRPr sz="1800" kern="1200">
+                <a:solidFill>
+                  <a:schemeClr val="tx1"/>
+                </a:solidFill>
+                <a:latin typeface="+mn-lt"/>
+                <a:ea typeface="+mn-ea"/>
+                <a:cs typeface="+mn-cs"/>
+              </a:defRPr>
+            </a:lvl5pPr>
+            <a:lvl6pPr marL="2514600" indent="-228600" algn="l" defTabSz="914400" rtl="0" eaLnBrk="1" latinLnBrk="0" hangingPunct="1">
+              <a:lnSpc>
+                <a:spcPct val="90000"/>
+              </a:lnSpc>
+              <a:spcBef>
+                <a:spcPts val="500"/>
+              </a:spcBef>
+              <a:buFont typeface="Arial" panose="020B0604020202020204" pitchFamily="34" charset="0"/>
+              <a:buChar char="•"/>
+              <a:defRPr sz="1800" kern="1200">
+                <a:solidFill>
+                  <a:schemeClr val="tx1"/>
+                </a:solidFill>
+                <a:latin typeface="+mn-lt"/>
+                <a:ea typeface="+mn-ea"/>
+                <a:cs typeface="+mn-cs"/>
+              </a:defRPr>
+            </a:lvl6pPr>
+            <a:lvl7pPr marL="2971800" indent="-228600" algn="l" defTabSz="914400" rtl="0" eaLnBrk="1" latinLnBrk="0" hangingPunct="1">
+              <a:lnSpc>
+                <a:spcPct val="90000"/>
+              </a:lnSpc>
+              <a:spcBef>
+                <a:spcPts val="500"/>
+              </a:spcBef>
+              <a:buFont typeface="Arial" panose="020B0604020202020204" pitchFamily="34" charset="0"/>
+              <a:buChar char="•"/>
+              <a:defRPr sz="1800" kern="1200">
+                <a:solidFill>
+                  <a:schemeClr val="tx1"/>
+                </a:solidFill>
+                <a:latin typeface="+mn-lt"/>
+                <a:ea typeface="+mn-ea"/>
+                <a:cs typeface="+mn-cs"/>
+              </a:defRPr>
+            </a:lvl7pPr>
+            <a:lvl8pPr marL="3429000" indent="-228600" algn="l" defTabSz="914400" rtl="0" eaLnBrk="1" latinLnBrk="0" hangingPunct="1">
+              <a:lnSpc>
+                <a:spcPct val="90000"/>
+              </a:lnSpc>
+              <a:spcBef>
+                <a:spcPts val="500"/>
+              </a:spcBef>
+              <a:buFont typeface="Arial" panose="020B0604020202020204" pitchFamily="34" charset="0"/>
+              <a:buChar char="•"/>
+              <a:defRPr sz="1800" kern="1200">
+                <a:solidFill>
+                  <a:schemeClr val="tx1"/>
+                </a:solidFill>
+                <a:latin typeface="+mn-lt"/>
+                <a:ea typeface="+mn-ea"/>
+                <a:cs typeface="+mn-cs"/>
+              </a:defRPr>
+            </a:lvl8pPr>
+            <a:lvl9pPr marL="3886200" indent="-228600" algn="l" defTabSz="914400" rtl="0" eaLnBrk="1" latinLnBrk="0" hangingPunct="1">
+              <a:lnSpc>
+                <a:spcPct val="90000"/>
+              </a:lnSpc>
+              <a:spcBef>
+                <a:spcPts val="500"/>
+              </a:spcBef>
+              <a:buFont typeface="Arial" panose="020B0604020202020204" pitchFamily="34" charset="0"/>
+              <a:buChar char="•"/>
+              <a:defRPr sz="1800" kern="1200">
+                <a:solidFill>
+                  <a:schemeClr val="tx1"/>
+                </a:solidFill>
+                <a:latin typeface="+mn-lt"/>
+                <a:ea typeface="+mn-ea"/>
+                <a:cs typeface="+mn-cs"/>
+              </a:defRPr>
+            </a:lvl9pPr>
+          </a:lstStyle>
+          <a:p>
+            <a:pPr marL="0" indent="0">
+              <a:buFont typeface="Arial" panose="020B0604020202020204" pitchFamily="34" charset="0"/>
+              <a:buNone/>
+            </a:pPr>
+            <a:r>
+              <a:rPr lang="en-AU" dirty="0"/>
+              <a:t>Experiment Type (2): </a:t>
+            </a:r>
+          </a:p>
+          <a:p>
+            <a:pPr marL="457200" lvl="1" indent="0">
+              <a:buNone/>
+            </a:pPr>
+            <a:r>
+              <a:rPr lang="en-AU" b="1" dirty="0">
+                <a:solidFill>
+                  <a:srgbClr val="7030A0"/>
+                </a:solidFill>
+              </a:rPr>
+              <a:t>1st phase</a:t>
+            </a:r>
+            <a:r>
+              <a:rPr lang="en-AU" dirty="0">
+                <a:solidFill>
+                  <a:srgbClr val="7030A0"/>
+                </a:solidFill>
+              </a:rPr>
+              <a:t>: tune parameters to regionalise; </a:t>
+            </a:r>
+            <a:r>
+              <a:rPr lang="en-AU" b="1" i="1" dirty="0">
+                <a:solidFill>
+                  <a:srgbClr val="7030A0"/>
+                </a:solidFill>
+              </a:rPr>
+              <a:t>not all 20 SEE hold</a:t>
+            </a:r>
+          </a:p>
+          <a:p>
+            <a:pPr marL="457200" lvl="1" indent="0">
+              <a:buNone/>
+            </a:pPr>
+            <a:r>
+              <a:rPr lang="en-AU" b="1" dirty="0">
+                <a:solidFill>
+                  <a:srgbClr val="7030A0"/>
+                </a:solidFill>
+              </a:rPr>
+              <a:t>2nd phase</a:t>
+            </a:r>
+            <a:r>
+              <a:rPr lang="en-AU" dirty="0">
+                <a:solidFill>
+                  <a:srgbClr val="7030A0"/>
+                </a:solidFill>
+              </a:rPr>
+              <a:t>: capital evolves towards a balanced growth path</a:t>
+            </a:r>
+          </a:p>
+          <a:p>
+            <a:pPr marL="457200" lvl="1" indent="0">
+              <a:buNone/>
+            </a:pPr>
+            <a:r>
+              <a:rPr lang="en-AU" b="1" dirty="0">
+                <a:solidFill>
+                  <a:srgbClr val="7030A0"/>
+                </a:solidFill>
+              </a:rPr>
+              <a:t>3rd phase</a:t>
+            </a:r>
+            <a:r>
+              <a:rPr lang="en-AU" dirty="0">
+                <a:solidFill>
+                  <a:srgbClr val="7030A0"/>
+                </a:solidFill>
+              </a:rPr>
+              <a:t>: continue along same path and generate</a:t>
+            </a:r>
+          </a:p>
+          <a:p>
+            <a:pPr lvl="2"/>
+            <a:r>
+              <a:rPr lang="en-AU" sz="2200" dirty="0">
+                <a:solidFill>
+                  <a:srgbClr val="7030A0"/>
+                </a:solidFill>
+              </a:rPr>
+              <a:t>``status quo’’ path</a:t>
+            </a:r>
+          </a:p>
+          <a:p>
+            <a:pPr lvl="2"/>
+            <a:r>
+              <a:rPr lang="en-AU" sz="2200" dirty="0">
+                <a:solidFill>
+                  <a:srgbClr val="7030A0"/>
+                </a:solidFill>
+              </a:rPr>
+              <a:t>``shock’’ (BSL closure) path</a:t>
+            </a:r>
+          </a:p>
+        </p:txBody>
+      </p:sp>
+      <p:sp>
+        <p:nvSpPr>
+          <p:cNvPr id="5" name="Content Placeholder 2">
+            <a:extLst>
+              <a:ext uri="{FF2B5EF4-FFF2-40B4-BE49-F238E27FC236}">
+                <a16:creationId xmlns:a16="http://schemas.microsoft.com/office/drawing/2014/main" id="{821EAF6D-0140-42A7-A3E3-3464F3BCE411}"/>
+              </a:ext>
+            </a:extLst>
+          </p:cNvPr>
+          <p:cNvSpPr txBox="1">
+            <a:spLocks/>
+          </p:cNvSpPr>
+          <p:nvPr/>
+        </p:nvSpPr>
+        <p:spPr>
+          <a:xfrm>
+            <a:off x="838200" y="4439803"/>
+            <a:ext cx="10515600" cy="2022709"/>
+          </a:xfrm>
+          <a:prstGeom prst="rect">
+            <a:avLst/>
+          </a:prstGeom>
+        </p:spPr>
+        <p:txBody>
+          <a:bodyPr vert="horz" lIns="91440" tIns="45720" rIns="91440" bIns="45720" rtlCol="0">
+            <a:normAutofit/>
+          </a:bodyPr>
+          <a:lstStyle>
+            <a:lvl1pPr marL="228600" indent="-228600" algn="l" defTabSz="914400" rtl="0" eaLnBrk="1" latinLnBrk="0" hangingPunct="1">
+              <a:lnSpc>
+                <a:spcPct val="90000"/>
+              </a:lnSpc>
+              <a:spcBef>
+                <a:spcPts val="1000"/>
+              </a:spcBef>
+              <a:buFont typeface="Arial" panose="020B0604020202020204" pitchFamily="34" charset="0"/>
+              <a:buChar char="•"/>
+              <a:defRPr sz="2800" kern="1200">
+                <a:solidFill>
+                  <a:schemeClr val="tx1"/>
+                </a:solidFill>
+                <a:latin typeface="+mn-lt"/>
+                <a:ea typeface="+mn-ea"/>
+                <a:cs typeface="+mn-cs"/>
+              </a:defRPr>
+            </a:lvl1pPr>
+            <a:lvl2pPr marL="685800" indent="-228600" algn="l" defTabSz="914400" rtl="0" eaLnBrk="1" latinLnBrk="0" hangingPunct="1">
+              <a:lnSpc>
+                <a:spcPct val="90000"/>
+              </a:lnSpc>
+              <a:spcBef>
+                <a:spcPts val="500"/>
+              </a:spcBef>
+              <a:buFont typeface="Arial" panose="020B0604020202020204" pitchFamily="34" charset="0"/>
+              <a:buChar char="•"/>
+              <a:defRPr sz="2400" kern="1200">
+                <a:solidFill>
+                  <a:schemeClr val="tx1"/>
+                </a:solidFill>
+                <a:latin typeface="+mn-lt"/>
+                <a:ea typeface="+mn-ea"/>
+                <a:cs typeface="+mn-cs"/>
+              </a:defRPr>
+            </a:lvl2pPr>
+            <a:lvl3pPr marL="1143000" indent="-228600" algn="l" defTabSz="914400" rtl="0" eaLnBrk="1" latinLnBrk="0" hangingPunct="1">
+              <a:lnSpc>
+                <a:spcPct val="90000"/>
+              </a:lnSpc>
+              <a:spcBef>
+                <a:spcPts val="500"/>
+              </a:spcBef>
+              <a:buFont typeface="Arial" panose="020B0604020202020204" pitchFamily="34" charset="0"/>
+              <a:buChar char="•"/>
+              <a:defRPr sz="2000" kern="1200">
+                <a:solidFill>
+                  <a:schemeClr val="tx1"/>
+                </a:solidFill>
+                <a:latin typeface="+mn-lt"/>
+                <a:ea typeface="+mn-ea"/>
+                <a:cs typeface="+mn-cs"/>
+              </a:defRPr>
+            </a:lvl3pPr>
+            <a:lvl4pPr marL="1600200" indent="-228600" algn="l" defTabSz="914400" rtl="0" eaLnBrk="1" latinLnBrk="0" hangingPunct="1">
+              <a:lnSpc>
+                <a:spcPct val="90000"/>
+              </a:lnSpc>
+              <a:spcBef>
+                <a:spcPts val="500"/>
+              </a:spcBef>
+              <a:buFont typeface="Arial" panose="020B0604020202020204" pitchFamily="34" charset="0"/>
+              <a:buChar char="•"/>
+              <a:defRPr sz="1800" kern="1200">
+                <a:solidFill>
+                  <a:schemeClr val="tx1"/>
+                </a:solidFill>
+                <a:latin typeface="+mn-lt"/>
+                <a:ea typeface="+mn-ea"/>
+                <a:cs typeface="+mn-cs"/>
+              </a:defRPr>
+            </a:lvl4pPr>
+            <a:lvl5pPr marL="2057400" indent="-228600" algn="l" defTabSz="914400" rtl="0" eaLnBrk="1" latinLnBrk="0" hangingPunct="1">
+              <a:lnSpc>
+                <a:spcPct val="90000"/>
+              </a:lnSpc>
+              <a:spcBef>
+                <a:spcPts val="500"/>
+              </a:spcBef>
+              <a:buFont typeface="Arial" panose="020B0604020202020204" pitchFamily="34" charset="0"/>
+              <a:buChar char="•"/>
+              <a:defRPr sz="1800" kern="1200">
+                <a:solidFill>
+                  <a:schemeClr val="tx1"/>
+                </a:solidFill>
+                <a:latin typeface="+mn-lt"/>
+                <a:ea typeface="+mn-ea"/>
+                <a:cs typeface="+mn-cs"/>
+              </a:defRPr>
+            </a:lvl5pPr>
+            <a:lvl6pPr marL="2514600" indent="-228600" algn="l" defTabSz="914400" rtl="0" eaLnBrk="1" latinLnBrk="0" hangingPunct="1">
+              <a:lnSpc>
+                <a:spcPct val="90000"/>
+              </a:lnSpc>
+              <a:spcBef>
+                <a:spcPts val="500"/>
+              </a:spcBef>
+              <a:buFont typeface="Arial" panose="020B0604020202020204" pitchFamily="34" charset="0"/>
+              <a:buChar char="•"/>
+              <a:defRPr sz="1800" kern="1200">
+                <a:solidFill>
+                  <a:schemeClr val="tx1"/>
+                </a:solidFill>
+                <a:latin typeface="+mn-lt"/>
+                <a:ea typeface="+mn-ea"/>
+                <a:cs typeface="+mn-cs"/>
+              </a:defRPr>
+            </a:lvl6pPr>
+            <a:lvl7pPr marL="2971800" indent="-228600" algn="l" defTabSz="914400" rtl="0" eaLnBrk="1" latinLnBrk="0" hangingPunct="1">
+              <a:lnSpc>
+                <a:spcPct val="90000"/>
+              </a:lnSpc>
+              <a:spcBef>
+                <a:spcPts val="500"/>
+              </a:spcBef>
+              <a:buFont typeface="Arial" panose="020B0604020202020204" pitchFamily="34" charset="0"/>
+              <a:buChar char="•"/>
+              <a:defRPr sz="1800" kern="1200">
+                <a:solidFill>
+                  <a:schemeClr val="tx1"/>
+                </a:solidFill>
+                <a:latin typeface="+mn-lt"/>
+                <a:ea typeface="+mn-ea"/>
+                <a:cs typeface="+mn-cs"/>
+              </a:defRPr>
+            </a:lvl7pPr>
+            <a:lvl8pPr marL="3429000" indent="-228600" algn="l" defTabSz="914400" rtl="0" eaLnBrk="1" latinLnBrk="0" hangingPunct="1">
+              <a:lnSpc>
+                <a:spcPct val="90000"/>
+              </a:lnSpc>
+              <a:spcBef>
+                <a:spcPts val="500"/>
+              </a:spcBef>
+              <a:buFont typeface="Arial" panose="020B0604020202020204" pitchFamily="34" charset="0"/>
+              <a:buChar char="•"/>
+              <a:defRPr sz="1800" kern="1200">
+                <a:solidFill>
+                  <a:schemeClr val="tx1"/>
+                </a:solidFill>
+                <a:latin typeface="+mn-lt"/>
+                <a:ea typeface="+mn-ea"/>
+                <a:cs typeface="+mn-cs"/>
+              </a:defRPr>
+            </a:lvl8pPr>
+            <a:lvl9pPr marL="3886200" indent="-228600" algn="l" defTabSz="914400" rtl="0" eaLnBrk="1" latinLnBrk="0" hangingPunct="1">
+              <a:lnSpc>
+                <a:spcPct val="90000"/>
+              </a:lnSpc>
+              <a:spcBef>
+                <a:spcPts val="500"/>
+              </a:spcBef>
+              <a:buFont typeface="Arial" panose="020B0604020202020204" pitchFamily="34" charset="0"/>
+              <a:buChar char="•"/>
+              <a:defRPr sz="1800" kern="1200">
+                <a:solidFill>
+                  <a:schemeClr val="tx1"/>
+                </a:solidFill>
+                <a:latin typeface="+mn-lt"/>
+                <a:ea typeface="+mn-ea"/>
+                <a:cs typeface="+mn-cs"/>
+              </a:defRPr>
+            </a:lvl9pPr>
+          </a:lstStyle>
+          <a:p>
+            <a:pPr marL="0" indent="0">
+              <a:buFont typeface="Arial" panose="020B0604020202020204" pitchFamily="34" charset="0"/>
+              <a:buNone/>
+            </a:pPr>
+            <a:r>
+              <a:rPr lang="en-AU" dirty="0"/>
+              <a:t>Shock type (a): one-off “MIT shock” agents don’t see coming</a:t>
+            </a:r>
+          </a:p>
+          <a:p>
+            <a:pPr lvl="1"/>
+            <a:r>
+              <a:rPr lang="en-AU" dirty="0">
+                <a:solidFill>
+                  <a:srgbClr val="7030A0"/>
+                </a:solidFill>
+              </a:rPr>
+              <a:t>1/4 decrease in Manufacturing productivity, capital and exports</a:t>
+            </a:r>
+          </a:p>
+          <a:p>
+            <a:pPr lvl="1"/>
+            <a:r>
+              <a:rPr lang="en-AU" dirty="0">
+                <a:solidFill>
+                  <a:srgbClr val="7030A0"/>
+                </a:solidFill>
+              </a:rPr>
+              <a:t>5/6 decrease in Utilities (energy + water) purchases by Manufacturing</a:t>
+            </a:r>
+          </a:p>
+          <a:p>
+            <a:pPr lvl="1"/>
+            <a:r>
+              <a:rPr lang="en-AU" dirty="0">
+                <a:solidFill>
+                  <a:srgbClr val="7030A0"/>
+                </a:solidFill>
+              </a:rPr>
+              <a:t>No </a:t>
+            </a:r>
+            <a:r>
+              <a:rPr lang="en-AU" b="1" dirty="0">
+                <a:solidFill>
+                  <a:srgbClr val="7030A0"/>
+                </a:solidFill>
+              </a:rPr>
+              <a:t>exogenous </a:t>
+            </a:r>
+            <a:r>
+              <a:rPr lang="en-AU" dirty="0">
+                <a:solidFill>
+                  <a:srgbClr val="7030A0"/>
+                </a:solidFill>
+              </a:rPr>
+              <a:t>decommissioning or replacement activity</a:t>
+            </a:r>
+          </a:p>
+          <a:p>
+            <a:endParaRPr lang="en-US" dirty="0"/>
           </a:p>
         </p:txBody>
       </p:sp>
@@ -22351,7 +22468,7 @@
 </p:sld>
 </file>
 
-<file path=ppt/slides/slide13.xml><?xml version="1.0" encoding="utf-8"?>
+<file path=ppt/slides/slide12.xml><?xml version="1.0" encoding="utf-8"?>
 <p:sld xmlns:a="http://schemas.openxmlformats.org/drawingml/2006/main" xmlns:r="http://schemas.openxmlformats.org/officeDocument/2006/relationships" xmlns:p="http://schemas.openxmlformats.org/presentationml/2006/main">
   <p:cSld>
     <p:spTree>
@@ -22413,9 +22530,12 @@
             <a:endParaRPr lang="en-AU" sz="1100" dirty="0"/>
           </a:p>
           <a:p>
+            <a:pPr marL="0" indent="0">
+              <a:buNone/>
+            </a:pPr>
             <a:r>
               <a:rPr lang="en-AU" dirty="0"/>
-              <a:t>If Euler eq’ns hold, then the impact is more permanent.</a:t>
+              <a:t>If the SEE hold, the shock is sector-specific and more permanent</a:t>
             </a:r>
           </a:p>
           <a:p>
@@ -22443,9 +22563,23 @@
             <a:endParaRPr lang="en-AU" i="1" dirty="0"/>
           </a:p>
           <a:p>
+            <a:endParaRPr lang="en-AU" dirty="0"/>
+          </a:p>
+          <a:p>
+            <a:pPr marL="0" indent="0">
+              <a:buNone/>
+            </a:pPr>
+            <a:r>
+              <a:rPr lang="en-AU" dirty="0">
+                <a:solidFill>
+                  <a:srgbClr val="7030A0"/>
+                </a:solidFill>
+              </a:rPr>
+              <a:t>Closure causes Utilities (energy and water) prices to fall </a:t>
+            </a:r>
             <a:r>
               <a:rPr lang="en-AU" dirty="0"/>
-              <a:t>Closure causes energy and water prices to fall which stimulates</a:t>
+              <a:t>which stimulates</a:t>
             </a:r>
             <a:r>
               <a:rPr lang="en-AU" i="1" dirty="0"/>
@@ -22480,7 +22614,7 @@
             <a:pPr lvl="1"/>
             <a:r>
               <a:rPr lang="en-AU" dirty="0"/>
-              <a:t>But Gladstone is connected to NEM, so the fall in energy prices would be less significant as benefits are spread over a much larger region.</a:t>
+              <a:t>In practice, Gladstone is connected to NEM, so actual fall in energy prices would be less significant as benefits are spread over a much larger region.</a:t>
             </a:r>
           </a:p>
         </p:txBody>
@@ -22508,7 +22642,7 @@
           <a:p>
             <a:fld id="{0F22F1AF-7FE7-D74B-89B5-5B91D7E9B3CD}" type="slidenum">
               <a:rPr lang="en-US" smtClean="0"/>
-              <a:t>13</a:t>
+              <a:t>12</a:t>
             </a:fld>
             <a:endParaRPr lang="en-US"/>
           </a:p>
@@ -22529,14 +22663,14 @@
           <p:nvPr>
             <p:extLst>
               <p:ext uri="{D42A27DB-BD31-4B8C-83A1-F6EECF244321}">
-                <p14:modId xmlns:p14="http://schemas.microsoft.com/office/powerpoint/2010/main" val="2235842440"/>
+                <p14:modId xmlns:p14="http://schemas.microsoft.com/office/powerpoint/2010/main" val="1020261722"/>
               </p:ext>
             </p:extLst>
           </p:nvPr>
         </p:nvGraphicFramePr>
         <p:xfrm>
-          <a:off x="1521069" y="2150015"/>
-          <a:ext cx="8540595" cy="1188720"/>
+          <a:off x="1346356" y="2150015"/>
+          <a:ext cx="9026194" cy="1280160"/>
         </p:xfrm>
         <a:graphic>
           <a:graphicData uri="http://schemas.openxmlformats.org/drawingml/2006/table">
@@ -22545,35 +22679,35 @@
                 <a:tableStyleId>{5C22544A-7EE6-4342-B048-85BDC9FD1C3A}</a:tableStyleId>
               </a:tblPr>
               <a:tblGrid>
-                <a:gridCol w="1764843">
+                <a:gridCol w="1865188">
                   <a:extLst>
                     <a:ext uri="{9D8B030D-6E8A-4147-A177-3AD203B41FA5}">
                       <a16:colId xmlns:a16="http://schemas.microsoft.com/office/drawing/2014/main" val="403313198"/>
                     </a:ext>
                   </a:extLst>
                 </a:gridCol>
-                <a:gridCol w="1651395">
+                <a:gridCol w="1745289">
                   <a:extLst>
                     <a:ext uri="{9D8B030D-6E8A-4147-A177-3AD203B41FA5}">
                       <a16:colId xmlns:a16="http://schemas.microsoft.com/office/drawing/2014/main" val="412949445"/>
                     </a:ext>
                   </a:extLst>
                 </a:gridCol>
-                <a:gridCol w="1708119">
+                <a:gridCol w="1805239">
                   <a:extLst>
                     <a:ext uri="{9D8B030D-6E8A-4147-A177-3AD203B41FA5}">
                       <a16:colId xmlns:a16="http://schemas.microsoft.com/office/drawing/2014/main" val="3353235764"/>
                     </a:ext>
                   </a:extLst>
                 </a:gridCol>
-                <a:gridCol w="1708119">
+                <a:gridCol w="1805239">
                   <a:extLst>
                     <a:ext uri="{9D8B030D-6E8A-4147-A177-3AD203B41FA5}">
                       <a16:colId xmlns:a16="http://schemas.microsoft.com/office/drawing/2014/main" val="2375509926"/>
                     </a:ext>
                   </a:extLst>
                 </a:gridCol>
-                <a:gridCol w="1708119">
+                <a:gridCol w="1805239">
                   <a:extLst>
                     <a:ext uri="{9D8B030D-6E8A-4147-A177-3AD203B41FA5}">
                       <a16:colId xmlns:a16="http://schemas.microsoft.com/office/drawing/2014/main" val="999097846"/>
@@ -22605,14 +22739,14 @@
                         <a:defRPr/>
                       </a:pPr>
                       <a:r>
-                        <a:rPr lang="en-AU" sz="2000" b="1" dirty="0">
+                        <a:rPr lang="en-AU" sz="2200" b="1" baseline="0" dirty="0">
                           <a:solidFill>
                             <a:srgbClr val="7030A0"/>
                           </a:solidFill>
                         </a:rPr>
                         <a:t>Sectoral breakdown of initial -$1.56bn drop in Aggregate Output</a:t>
                       </a:r>
-                      <a:endParaRPr lang="en-AU" sz="2000" dirty="0">
+                      <a:endParaRPr lang="en-AU" sz="2200" baseline="0" dirty="0">
                         <a:solidFill>
                           <a:srgbClr val="7030A0"/>
                         </a:solidFill>
@@ -22697,14 +22831,14 @@
                         <a:defRPr/>
                       </a:pPr>
                       <a:r>
-                        <a:rPr lang="en-AU" sz="2000" dirty="0">
+                        <a:rPr lang="en-AU" sz="2200" baseline="0" dirty="0">
                           <a:solidFill>
                             <a:srgbClr val="7030A0"/>
                           </a:solidFill>
                         </a:rPr>
                         <a:t>Manufacturing</a:t>
                       </a:r>
-                      <a:endParaRPr lang="en-US" sz="2000" dirty="0">
+                      <a:endParaRPr lang="en-US" sz="2200" baseline="0" dirty="0">
                         <a:solidFill>
                           <a:srgbClr val="7030A0"/>
                         </a:solidFill>
@@ -22722,14 +22856,14 @@
                     <a:p>
                       <a:pPr algn="ctr"/>
                       <a:r>
-                        <a:rPr lang="en-AU" sz="2000">
+                        <a:rPr lang="en-AU" sz="2200" baseline="0">
                           <a:solidFill>
                             <a:srgbClr val="7030A0"/>
                           </a:solidFill>
                         </a:rPr>
                         <a:t>Utilities </a:t>
                       </a:r>
-                      <a:endParaRPr lang="en-US" sz="2000">
+                      <a:endParaRPr lang="en-US" sz="2200" baseline="0">
                         <a:solidFill>
                           <a:srgbClr val="7030A0"/>
                         </a:solidFill>
@@ -22747,14 +22881,14 @@
                     <a:p>
                       <a:pPr algn="ctr"/>
                       <a:r>
-                        <a:rPr lang="en-AU" sz="2000">
+                        <a:rPr lang="en-AU" sz="2200" baseline="0">
                           <a:solidFill>
                             <a:srgbClr val="7030A0"/>
                           </a:solidFill>
                         </a:rPr>
                         <a:t>Construction</a:t>
                       </a:r>
-                      <a:endParaRPr lang="en-US" sz="2000">
+                      <a:endParaRPr lang="en-US" sz="2200" baseline="0">
                         <a:solidFill>
                           <a:srgbClr val="7030A0"/>
                         </a:solidFill>
@@ -22772,14 +22906,14 @@
                     <a:p>
                       <a:pPr algn="ctr"/>
                       <a:r>
-                        <a:rPr lang="en-AU" sz="2000">
+                        <a:rPr lang="en-AU" sz="2200" baseline="0">
                           <a:solidFill>
                             <a:srgbClr val="7030A0"/>
                           </a:solidFill>
                         </a:rPr>
                         <a:t>Transport</a:t>
                       </a:r>
-                      <a:endParaRPr lang="en-US" sz="2000">
+                      <a:endParaRPr lang="en-US" sz="2200" baseline="0">
                         <a:solidFill>
                           <a:srgbClr val="7030A0"/>
                         </a:solidFill>
@@ -22797,7 +22931,7 @@
                     <a:p>
                       <a:pPr algn="ctr"/>
                       <a:r>
-                        <a:rPr lang="en-US" sz="2000">
+                        <a:rPr lang="en-US" sz="2200" baseline="0">
                           <a:solidFill>
                             <a:srgbClr val="7030A0"/>
                           </a:solidFill>
@@ -22840,14 +22974,14 @@
                         <a:defRPr/>
                       </a:pPr>
                       <a:r>
-                        <a:rPr lang="en-AU" sz="2000" dirty="0">
+                        <a:rPr lang="en-AU" sz="2200" baseline="0" dirty="0">
                           <a:solidFill>
                             <a:srgbClr val="7030A0"/>
                           </a:solidFill>
                         </a:rPr>
                         <a:t>-$1.47bn</a:t>
                       </a:r>
-                      <a:endParaRPr lang="en-US" sz="2000" dirty="0">
+                      <a:endParaRPr lang="en-US" sz="2200" baseline="0" dirty="0">
                         <a:solidFill>
                           <a:srgbClr val="7030A0"/>
                         </a:solidFill>
@@ -22865,14 +22999,14 @@
                     <a:p>
                       <a:pPr algn="ctr"/>
                       <a:r>
-                        <a:rPr lang="en-AU" sz="2000" dirty="0">
+                        <a:rPr lang="en-AU" sz="2200" baseline="0" dirty="0">
                           <a:solidFill>
                             <a:srgbClr val="7030A0"/>
                           </a:solidFill>
                         </a:rPr>
                         <a:t>-$45m</a:t>
                       </a:r>
-                      <a:endParaRPr lang="en-US" sz="2000" dirty="0">
+                      <a:endParaRPr lang="en-US" sz="2200" baseline="0" dirty="0">
                         <a:solidFill>
                           <a:srgbClr val="7030A0"/>
                         </a:solidFill>
@@ -22890,14 +23024,14 @@
                     <a:p>
                       <a:pPr algn="ctr"/>
                       <a:r>
-                        <a:rPr lang="en-AU" sz="2000">
+                        <a:rPr lang="en-AU" sz="2200" baseline="0">
                           <a:solidFill>
                             <a:srgbClr val="7030A0"/>
                           </a:solidFill>
                         </a:rPr>
                         <a:t>-$23m</a:t>
                       </a:r>
-                      <a:endParaRPr lang="en-US" sz="2000">
+                      <a:endParaRPr lang="en-US" sz="2200" baseline="0">
                         <a:solidFill>
                           <a:srgbClr val="7030A0"/>
                         </a:solidFill>
@@ -22915,7 +23049,7 @@
                     <a:p>
                       <a:pPr algn="ctr"/>
                       <a:r>
-                        <a:rPr lang="en-US" sz="2000">
+                        <a:rPr lang="en-US" sz="2200" baseline="0">
                           <a:solidFill>
                             <a:srgbClr val="7030A0"/>
                           </a:solidFill>
@@ -22935,7 +23069,7 @@
                     <a:p>
                       <a:pPr algn="ctr"/>
                       <a:r>
-                        <a:rPr lang="en-US" sz="2000" dirty="0">
+                        <a:rPr lang="en-US" sz="2200" baseline="0" dirty="0">
                           <a:solidFill>
                             <a:srgbClr val="7030A0"/>
                           </a:solidFill>
@@ -22971,192 +23105,7 @@
 </p:sld>
 </file>
 
-<file path=ppt/slides/slide14.xml><?xml version="1.0" encoding="utf-8"?>
-<p:sld xmlns:a="http://schemas.openxmlformats.org/drawingml/2006/main" xmlns:r="http://schemas.openxmlformats.org/officeDocument/2006/relationships" xmlns:p="http://schemas.openxmlformats.org/presentationml/2006/main">
-  <p:cSld>
-    <p:spTree>
-      <p:nvGrpSpPr>
-        <p:cNvPr id="1" name=""/>
-        <p:cNvGrpSpPr/>
-        <p:nvPr/>
-      </p:nvGrpSpPr>
-      <p:grpSpPr>
-        <a:xfrm>
-          <a:off x="0" y="0"/>
-          <a:ext cx="0" cy="0"/>
-          <a:chOff x="0" y="0"/>
-          <a:chExt cx="0" cy="0"/>
-        </a:xfrm>
-      </p:grpSpPr>
-      <p:sp>
-        <p:nvSpPr>
-          <p:cNvPr id="3" name="Content Placeholder 2">
-            <a:extLst>
-              <a:ext uri="{FF2B5EF4-FFF2-40B4-BE49-F238E27FC236}">
-                <a16:creationId xmlns:a16="http://schemas.microsoft.com/office/drawing/2014/main" id="{212EB1A2-5194-2D45-98B3-AD333281337F}"/>
-              </a:ext>
-            </a:extLst>
-          </p:cNvPr>
-          <p:cNvSpPr>
-            <a:spLocks noGrp="1"/>
-          </p:cNvSpPr>
-          <p:nvPr>
-            <p:ph idx="1"/>
-          </p:nvPr>
-        </p:nvSpPr>
-        <p:spPr>
-          <a:xfrm>
-            <a:off x="838200" y="773407"/>
-            <a:ext cx="10515600" cy="5311186"/>
-          </a:xfrm>
-        </p:spPr>
-        <p:txBody>
-          <a:bodyPr>
-            <a:normAutofit/>
-          </a:bodyPr>
-          <a:lstStyle/>
-          <a:p>
-            <a:pPr marL="0" indent="0">
-              <a:buNone/>
-            </a:pPr>
-            <a:r>
-              <a:rPr lang="en-AU" dirty="0"/>
-              <a:t>Experiment Type (2): Euler eq’ns needn’t hold.</a:t>
-            </a:r>
-          </a:p>
-          <a:p>
-            <a:pPr lvl="1"/>
-            <a:r>
-              <a:rPr lang="en-AU" dirty="0"/>
-              <a:t>Three phases as above</a:t>
-            </a:r>
-          </a:p>
-          <a:p>
-            <a:pPr lvl="1"/>
-            <a:r>
-              <a:rPr lang="en-AU" dirty="0"/>
-              <a:t>Intended to capture Gladstone as an economy in transition with major uncertain changes relating to emissions targets given its current industry.</a:t>
-            </a:r>
-          </a:p>
-          <a:p>
-            <a:pPr marL="0" indent="0">
-              <a:buNone/>
-            </a:pPr>
-            <a:endParaRPr lang="en-AU" dirty="0"/>
-          </a:p>
-          <a:p>
-            <a:pPr marL="0" indent="0">
-              <a:buNone/>
-            </a:pPr>
-            <a:r>
-              <a:rPr lang="en-AU" dirty="0"/>
-              <a:t>Type (b) shock: labour is immobile</a:t>
-            </a:r>
-          </a:p>
-          <a:p>
-            <a:pPr marL="457200" lvl="1" indent="0">
-              <a:buNone/>
-            </a:pPr>
-            <a:r>
-              <a:rPr lang="en-AU" dirty="0"/>
-              <a:t>Main message: the shock is worse and permanent</a:t>
-            </a:r>
-          </a:p>
-          <a:p>
-            <a:pPr marL="457200" lvl="1" indent="0">
-              <a:buNone/>
-            </a:pPr>
-            <a:endParaRPr lang="en-AU" dirty="0"/>
-          </a:p>
-          <a:p>
-            <a:pPr marL="0" indent="0">
-              <a:buNone/>
-            </a:pPr>
-            <a:r>
-              <a:rPr lang="en-AU" dirty="0"/>
-              <a:t>Type (c) shock: the agents know in advance and can plan for it</a:t>
-            </a:r>
-          </a:p>
-          <a:p>
-            <a:pPr lvl="1"/>
-            <a:r>
-              <a:rPr lang="en-AU" dirty="0"/>
-              <a:t>Distinguishes the model from the </a:t>
-            </a:r>
-            <a:r>
-              <a:rPr lang="en-AU" dirty="0" err="1"/>
-              <a:t>CoPS</a:t>
-            </a:r>
-            <a:r>
-              <a:rPr lang="en-AU" dirty="0"/>
-              <a:t> approach</a:t>
-            </a:r>
-          </a:p>
-          <a:p>
-            <a:pPr marL="457200" lvl="1" indent="0">
-              <a:buNone/>
-            </a:pPr>
-            <a:r>
-              <a:rPr lang="en-AU" dirty="0"/>
-              <a:t>Main message: it is optimal to build up capital in advance of the closure</a:t>
-            </a:r>
-          </a:p>
-          <a:p>
-            <a:pPr lvl="2">
-              <a:buFont typeface="Wingdings" pitchFamily="2" charset="2"/>
-              <a:buChar char="ü"/>
-            </a:pPr>
-            <a:endParaRPr lang="en-AU" sz="3000" dirty="0"/>
-          </a:p>
-          <a:p>
-            <a:pPr lvl="1"/>
-            <a:endParaRPr lang="en-US" dirty="0"/>
-          </a:p>
-        </p:txBody>
-      </p:sp>
-      <p:sp>
-        <p:nvSpPr>
-          <p:cNvPr id="5" name="Slide Number Placeholder 4">
-            <a:extLst>
-              <a:ext uri="{FF2B5EF4-FFF2-40B4-BE49-F238E27FC236}">
-                <a16:creationId xmlns:a16="http://schemas.microsoft.com/office/drawing/2014/main" id="{F048F40A-C3F6-BAB4-A37B-D6C70CB44FBE}"/>
-              </a:ext>
-            </a:extLst>
-          </p:cNvPr>
-          <p:cNvSpPr>
-            <a:spLocks noGrp="1"/>
-          </p:cNvSpPr>
-          <p:nvPr>
-            <p:ph type="sldNum" sz="quarter" idx="12"/>
-          </p:nvPr>
-        </p:nvSpPr>
-        <p:spPr/>
-        <p:txBody>
-          <a:bodyPr/>
-          <a:lstStyle/>
-          <a:p>
-            <a:fld id="{0F22F1AF-7FE7-D74B-89B5-5B91D7E9B3CD}" type="slidenum">
-              <a:rPr lang="en-US" smtClean="0"/>
-              <a:t>14</a:t>
-            </a:fld>
-            <a:endParaRPr lang="en-US"/>
-          </a:p>
-        </p:txBody>
-      </p:sp>
-    </p:spTree>
-    <p:extLst>
-      <p:ext uri="{BB962C8B-B14F-4D97-AF65-F5344CB8AC3E}">
-        <p14:creationId xmlns:p14="http://schemas.microsoft.com/office/powerpoint/2010/main" val="3769610822"/>
-      </p:ext>
-    </p:extLst>
-  </p:cSld>
-  <p:clrMapOvr>
-    <a:masterClrMapping/>
-  </p:clrMapOvr>
-</p:sld>
-</file>
-
-<file path=ppt/slides/slide15.xml><?xml version="1.0" encoding="utf-8"?>
+<file path=ppt/slides/slide13.xml><?xml version="1.0" encoding="utf-8"?>
 <p:sld xmlns:a="http://schemas.openxmlformats.org/drawingml/2006/main" xmlns:r="http://schemas.openxmlformats.org/officeDocument/2006/relationships" xmlns:p="http://schemas.openxmlformats.org/presentationml/2006/main">
   <p:cSld>
     <p:spTree>
@@ -23214,7 +23163,7 @@
             </a:br>
             <a:r>
               <a:rPr lang="en-AU" dirty="0"/>
-              <a:t>(1a)                                         (2a)</a:t>
+              <a:t>(1a)                                          (2a)</a:t>
             </a:r>
             <a:br>
               <a:rPr lang="en-AU" dirty="0"/>
@@ -23222,7 +23171,46 @@
             <a:br>
               <a:rPr lang="en-AU" dirty="0"/>
             </a:br>
-            <a:endParaRPr lang="en-US" dirty="0"/>
+            <a:r>
+              <a:rPr lang="en-AU" sz="3200" i="1" dirty="0">
+                <a:solidFill>
+                  <a:srgbClr val="7030A0"/>
+                </a:solidFill>
+              </a:rPr>
+              <a:t>All 20 SEE hold</a:t>
+            </a:r>
+            <a:r>
+              <a:rPr lang="en-AU" sz="3200" dirty="0"/>
+              <a:t> </a:t>
+            </a:r>
+            <a:r>
+              <a:rPr lang="en-AU" sz="3200" i="1" dirty="0">
+                <a:solidFill>
+                  <a:srgbClr val="7030A0"/>
+                </a:solidFill>
+              </a:rPr>
+              <a:t>                                       </a:t>
+            </a:r>
+            <a:r>
+              <a:rPr lang="en-AU" sz="3200" b="1" i="1" dirty="0">
+                <a:solidFill>
+                  <a:srgbClr val="7030A0"/>
+                </a:solidFill>
+              </a:rPr>
+              <a:t>Not</a:t>
+            </a:r>
+            <a:r>
+              <a:rPr lang="en-AU" sz="3200" i="1" dirty="0">
+                <a:solidFill>
+                  <a:srgbClr val="7030A0"/>
+                </a:solidFill>
+              </a:rPr>
+              <a:t> all 20 SEE hold</a:t>
+            </a:r>
+            <a:br>
+              <a:rPr lang="en-AU" sz="3200" dirty="0"/>
+            </a:br>
+            <a:endParaRPr lang="en-US" sz="3200" dirty="0"/>
           </a:p>
         </p:txBody>
       </p:sp>
@@ -23249,7 +23237,7 @@
           <a:p>
             <a:fld id="{0F22F1AF-7FE7-D74B-89B5-5B91D7E9B3CD}" type="slidenum">
               <a:rPr lang="en-US" smtClean="0"/>
-              <a:t>15</a:t>
+              <a:t>13</a:t>
             </a:fld>
             <a:endParaRPr lang="en-US"/>
           </a:p>
@@ -23268,7 +23256,7 @@
 </p:sld>
 </file>
 
-<file path=ppt/slides/slide16.xml><?xml version="1.0" encoding="utf-8"?>
+<file path=ppt/slides/slide14.xml><?xml version="1.0" encoding="utf-8"?>
 <p:sld xmlns:a="http://schemas.openxmlformats.org/drawingml/2006/main" xmlns:r="http://schemas.openxmlformats.org/officeDocument/2006/relationships" xmlns:p="http://schemas.openxmlformats.org/presentationml/2006/main">
   <p:cSld>
     <p:spTree>
@@ -23314,17 +23302,21 @@
           <a:lstStyle/>
           <a:p>
             <a:r>
-              <a:rPr lang="en-US"/>
+              <a:rPr lang="en-US" dirty="0"/>
               <a:t>Experiment-shock (1a): </a:t>
             </a:r>
             <a:r>
-              <a:rPr lang="en-US" b="1"/>
+              <a:rPr lang="en-US" b="1" dirty="0"/>
               <a:t>% change relative to status quo,</a:t>
             </a:r>
           </a:p>
           <a:p>
             <a:r>
-              <a:rPr lang="en-US" sz="2400" b="1"/>
+              <a:rPr lang="en-US" sz="2400" b="1" dirty="0">
+                <a:solidFill>
+                  <a:srgbClr val="7030A0"/>
+                </a:solidFill>
+              </a:rPr>
               <a:t>Aggregates</a:t>
             </a:r>
           </a:p>
@@ -23359,17 +23351,21 @@
           <a:lstStyle/>
           <a:p>
             <a:r>
-              <a:rPr lang="en-US"/>
+              <a:rPr lang="en-US" dirty="0"/>
               <a:t>Experiment-shock (2a): </a:t>
             </a:r>
             <a:r>
-              <a:rPr lang="en-US" b="1"/>
+              <a:rPr lang="en-US" b="1" dirty="0"/>
               <a:t>% change relative to status quo,</a:t>
             </a:r>
           </a:p>
           <a:p>
             <a:r>
-              <a:rPr lang="en-US" sz="2400" b="1"/>
+              <a:rPr lang="en-US" sz="2400" b="1" dirty="0">
+                <a:solidFill>
+                  <a:srgbClr val="7030A0"/>
+                </a:solidFill>
+              </a:rPr>
               <a:t>Aggregates</a:t>
             </a:r>
           </a:p>
@@ -23507,7 +23503,7 @@
           <a:p>
             <a:fld id="{0F22F1AF-7FE7-D74B-89B5-5B91D7E9B3CD}" type="slidenum">
               <a:rPr lang="en-US" smtClean="0"/>
-              <a:t>16</a:t>
+              <a:t>14</a:t>
             </a:fld>
             <a:endParaRPr lang="en-US"/>
           </a:p>
@@ -23586,7 +23582,7 @@
 </p:sld>
 </file>
 
-<file path=ppt/slides/slide17.xml><?xml version="1.0" encoding="utf-8"?>
+<file path=ppt/slides/slide15.xml><?xml version="1.0" encoding="utf-8"?>
 <p:sld xmlns:a="http://schemas.openxmlformats.org/drawingml/2006/main" xmlns:r="http://schemas.openxmlformats.org/officeDocument/2006/relationships" xmlns:p="http://schemas.openxmlformats.org/presentationml/2006/main">
   <p:cSld>
     <p:spTree>
@@ -23632,17 +23628,21 @@
           <a:lstStyle/>
           <a:p>
             <a:r>
-              <a:rPr lang="en-US"/>
+              <a:rPr lang="en-US" dirty="0"/>
               <a:t>Experiment-shock (1a): </a:t>
             </a:r>
             <a:r>
-              <a:rPr lang="en-US" b="1"/>
+              <a:rPr lang="en-US" b="1" dirty="0"/>
               <a:t>% change relative to status quo,</a:t>
             </a:r>
           </a:p>
           <a:p>
             <a:r>
-              <a:rPr lang="en-US" sz="2400" b="1"/>
+              <a:rPr lang="en-US" sz="2400" b="1" dirty="0">
+                <a:solidFill>
+                  <a:srgbClr val="7030A0"/>
+                </a:solidFill>
+              </a:rPr>
               <a:t>Manufacturing</a:t>
             </a:r>
           </a:p>
@@ -23677,17 +23677,21 @@
           <a:lstStyle/>
           <a:p>
             <a:r>
-              <a:rPr lang="en-US"/>
+              <a:rPr lang="en-US" dirty="0"/>
               <a:t>Experiment-shock (2a): </a:t>
             </a:r>
             <a:r>
-              <a:rPr lang="en-US" b="1"/>
+              <a:rPr lang="en-US" b="1" dirty="0"/>
               <a:t>% change relative to status quo,</a:t>
             </a:r>
           </a:p>
           <a:p>
             <a:r>
-              <a:rPr lang="en-US" sz="2400" b="1"/>
+              <a:rPr lang="en-US" sz="2400" b="1" dirty="0">
+                <a:solidFill>
+                  <a:srgbClr val="7030A0"/>
+                </a:solidFill>
+              </a:rPr>
               <a:t>Manufacturing</a:t>
             </a:r>
           </a:p>
@@ -23722,15 +23726,15 @@
           <a:lstStyle/>
           <a:p>
             <a:r>
-              <a:rPr lang="en-US">
+              <a:rPr lang="en-US" dirty="0">
                 <a:solidFill>
                   <a:schemeClr val="accent1"/>
                 </a:solidFill>
               </a:rPr>
-              <a:t>Manufacturing capital immediately returns close to optimal levels</a:t>
-            </a:r>
-            <a:r>
-              <a:rPr lang="en-US"/>
+              <a:t>Manufacturing capital immediately returns back to previous levels</a:t>
+            </a:r>
+            <a:r>
+              <a:rPr lang="en-US" dirty="0"/>
               <a:t>: a quick response is optimal.</a:t>
             </a:r>
           </a:p>
@@ -23802,7 +23806,7 @@
           <a:p>
             <a:fld id="{0F22F1AF-7FE7-D74B-89B5-5B91D7E9B3CD}" type="slidenum">
               <a:rPr lang="en-US" smtClean="0"/>
-              <a:t>17</a:t>
+              <a:t>15</a:t>
             </a:fld>
             <a:endParaRPr lang="en-US"/>
           </a:p>
@@ -23881,7 +23885,7 @@
 </p:sld>
 </file>
 
-<file path=ppt/slides/slide18.xml><?xml version="1.0" encoding="utf-8"?>
+<file path=ppt/slides/slide16.xml><?xml version="1.0" encoding="utf-8"?>
 <p:sld xmlns:a="http://schemas.openxmlformats.org/drawingml/2006/main" xmlns:r="http://schemas.openxmlformats.org/officeDocument/2006/relationships" xmlns:p="http://schemas.openxmlformats.org/presentationml/2006/main">
   <p:cSld>
     <p:spTree>
@@ -23921,7 +23925,7 @@
           <a:p>
             <a:fld id="{0F22F1AF-7FE7-D74B-89B5-5B91D7E9B3CD}" type="slidenum">
               <a:rPr lang="en-US" smtClean="0"/>
-              <a:t>18</a:t>
+              <a:t>16</a:t>
             </a:fld>
             <a:endParaRPr lang="en-US"/>
           </a:p>
@@ -23956,17 +23960,21 @@
           <a:lstStyle/>
           <a:p>
             <a:r>
-              <a:rPr lang="en-US"/>
+              <a:rPr lang="en-US" dirty="0"/>
               <a:t>Experiment-shock (1a): </a:t>
             </a:r>
             <a:r>
-              <a:rPr lang="en-US" b="1"/>
+              <a:rPr lang="en-US" b="1" dirty="0"/>
               <a:t>% change relative to status quo,</a:t>
             </a:r>
           </a:p>
           <a:p>
             <a:r>
-              <a:rPr lang="en-US" sz="2400" b="1"/>
+              <a:rPr lang="en-US" sz="2400" b="1" dirty="0">
+                <a:solidFill>
+                  <a:srgbClr val="7030A0"/>
+                </a:solidFill>
+              </a:rPr>
               <a:t>Utilities</a:t>
             </a:r>
           </a:p>
@@ -24124,17 +24132,21 @@
           <a:lstStyle/>
           <a:p>
             <a:r>
-              <a:rPr lang="en-US"/>
+              <a:rPr lang="en-US" dirty="0"/>
               <a:t>Experiment-shock (2a): </a:t>
             </a:r>
             <a:r>
-              <a:rPr lang="en-US" b="1"/>
+              <a:rPr lang="en-US" b="1" dirty="0"/>
               <a:t>% change relative to status quo,</a:t>
             </a:r>
           </a:p>
           <a:p>
             <a:r>
-              <a:rPr lang="en-US" sz="2400" b="1"/>
+              <a:rPr lang="en-US" sz="2400" b="1" dirty="0">
+                <a:solidFill>
+                  <a:srgbClr val="7030A0"/>
+                </a:solidFill>
+              </a:rPr>
               <a:t>Utilities</a:t>
             </a:r>
           </a:p>
@@ -24224,7 +24236,7 @@
 </p:sld>
 </file>
 
-<file path=ppt/slides/slide19.xml><?xml version="1.0" encoding="utf-8"?>
+<file path=ppt/slides/slide17.xml><?xml version="1.0" encoding="utf-8"?>
 <p:sld xmlns:a="http://schemas.openxmlformats.org/drawingml/2006/main" xmlns:r="http://schemas.openxmlformats.org/officeDocument/2006/relationships" xmlns:p="http://schemas.openxmlformats.org/presentationml/2006/main">
   <p:cSld>
     <p:spTree>
@@ -24270,25 +24282,29 @@
           <a:lstStyle/>
           <a:p>
             <a:r>
-              <a:rPr lang="en-US"/>
+              <a:rPr lang="en-US" dirty="0"/>
               <a:t>Experiment-shock (1a): </a:t>
             </a:r>
             <a:r>
-              <a:rPr lang="en-US" b="1"/>
+              <a:rPr lang="en-US" b="1" dirty="0"/>
               <a:t>% change relative to status quo,</a:t>
             </a:r>
           </a:p>
           <a:p>
             <a:r>
-              <a:rPr lang="en-US" sz="2400" b="1"/>
+              <a:rPr lang="en-US" sz="2400" b="1" dirty="0">
+                <a:solidFill>
+                  <a:srgbClr val="7030A0"/>
+                </a:solidFill>
+              </a:rPr>
               <a:t>Agriculture</a:t>
             </a:r>
             <a:r>
-              <a:rPr lang="en-US" b="1"/>
+              <a:rPr lang="en-US" b="1" dirty="0"/>
               <a:t> </a:t>
             </a:r>
             <a:r>
-              <a:rPr lang="en-US"/>
+              <a:rPr lang="en-US" dirty="0"/>
               <a:t>(Similar pictures for Mining.)</a:t>
             </a:r>
           </a:p>
@@ -24363,7 +24379,7 @@
           <a:p>
             <a:fld id="{0F22F1AF-7FE7-D74B-89B5-5B91D7E9B3CD}" type="slidenum">
               <a:rPr lang="en-US" smtClean="0"/>
-              <a:t>19</a:t>
+              <a:t>17</a:t>
             </a:fld>
             <a:endParaRPr lang="en-US"/>
           </a:p>
@@ -24428,17 +24444,21 @@
           <a:lstStyle/>
           <a:p>
             <a:r>
-              <a:rPr lang="en-US"/>
+              <a:rPr lang="en-US" dirty="0"/>
               <a:t>Experiment-shock (2a): </a:t>
             </a:r>
             <a:r>
-              <a:rPr lang="en-US" b="1"/>
+              <a:rPr lang="en-US" b="1" dirty="0"/>
               <a:t>% change relative to status quo,</a:t>
             </a:r>
           </a:p>
           <a:p>
             <a:r>
-              <a:rPr lang="en-US" sz="2400" b="1"/>
+              <a:rPr lang="en-US" sz="2400" b="1" dirty="0">
+                <a:solidFill>
+                  <a:srgbClr val="7030A0"/>
+                </a:solidFill>
+              </a:rPr>
               <a:t>Agriculture</a:t>
             </a:r>
           </a:p>
@@ -24549,6 +24569,390 @@
     <p:extLst>
       <p:ext uri="{BB962C8B-B14F-4D97-AF65-F5344CB8AC3E}">
         <p14:creationId xmlns:p14="http://schemas.microsoft.com/office/powerpoint/2010/main" val="4022164597"/>
+      </p:ext>
+    </p:extLst>
+  </p:cSld>
+  <p:clrMapOvr>
+    <a:masterClrMapping/>
+  </p:clrMapOvr>
+</p:sld>
+</file>
+
+<file path=ppt/slides/slide18.xml><?xml version="1.0" encoding="utf-8"?>
+<p:sld xmlns:a="http://schemas.openxmlformats.org/drawingml/2006/main" xmlns:r="http://schemas.openxmlformats.org/officeDocument/2006/relationships" xmlns:p="http://schemas.openxmlformats.org/presentationml/2006/main">
+  <p:cSld>
+    <p:spTree>
+      <p:nvGrpSpPr>
+        <p:cNvPr id="1" name=""/>
+        <p:cNvGrpSpPr/>
+        <p:nvPr/>
+      </p:nvGrpSpPr>
+      <p:grpSpPr>
+        <a:xfrm>
+          <a:off x="0" y="0"/>
+          <a:ext cx="0" cy="0"/>
+          <a:chOff x="0" y="0"/>
+          <a:chExt cx="0" cy="0"/>
+        </a:xfrm>
+      </p:grpSpPr>
+      <p:sp>
+        <p:nvSpPr>
+          <p:cNvPr id="4" name="Title 1">
+            <a:extLst>
+              <a:ext uri="{FF2B5EF4-FFF2-40B4-BE49-F238E27FC236}">
+                <a16:creationId xmlns:a16="http://schemas.microsoft.com/office/drawing/2014/main" id="{30A5936C-A01C-63CA-B6CF-BDF472DA68C2}"/>
+              </a:ext>
+            </a:extLst>
+          </p:cNvPr>
+          <p:cNvSpPr>
+            <a:spLocks noGrp="1"/>
+          </p:cNvSpPr>
+          <p:nvPr>
+            <p:ph type="title"/>
+          </p:nvPr>
+        </p:nvSpPr>
+        <p:spPr>
+          <a:xfrm>
+            <a:off x="838200" y="2180492"/>
+            <a:ext cx="10515600" cy="2497016"/>
+          </a:xfrm>
+        </p:spPr>
+        <p:txBody>
+          <a:bodyPr>
+            <a:normAutofit/>
+          </a:bodyPr>
+          <a:lstStyle/>
+          <a:p>
+            <a:pPr algn="ctr"/>
+            <a:r>
+              <a:rPr lang="en-US" dirty="0"/>
+              <a:t>Key takeaways</a:t>
+            </a:r>
+          </a:p>
+        </p:txBody>
+      </p:sp>
+      <p:sp>
+        <p:nvSpPr>
+          <p:cNvPr id="5" name="Slide Number Placeholder 4">
+            <a:extLst>
+              <a:ext uri="{FF2B5EF4-FFF2-40B4-BE49-F238E27FC236}">
+                <a16:creationId xmlns:a16="http://schemas.microsoft.com/office/drawing/2014/main" id="{E79D44CC-774A-5F17-A282-CE99AC7CF19A}"/>
+              </a:ext>
+            </a:extLst>
+          </p:cNvPr>
+          <p:cNvSpPr>
+            <a:spLocks noGrp="1"/>
+          </p:cNvSpPr>
+          <p:nvPr>
+            <p:ph type="sldNum" sz="quarter" idx="12"/>
+          </p:nvPr>
+        </p:nvSpPr>
+        <p:spPr/>
+        <p:txBody>
+          <a:bodyPr/>
+          <a:lstStyle/>
+          <a:p>
+            <a:fld id="{0F22F1AF-7FE7-D74B-89B5-5B91D7E9B3CD}" type="slidenum">
+              <a:rPr lang="en-US" smtClean="0"/>
+              <a:t>18</a:t>
+            </a:fld>
+            <a:endParaRPr lang="en-US"/>
+          </a:p>
+        </p:txBody>
+      </p:sp>
+    </p:spTree>
+    <p:extLst>
+      <p:ext uri="{BB962C8B-B14F-4D97-AF65-F5344CB8AC3E}">
+        <p14:creationId xmlns:p14="http://schemas.microsoft.com/office/powerpoint/2010/main" val="4198528421"/>
+      </p:ext>
+    </p:extLst>
+  </p:cSld>
+  <p:clrMapOvr>
+    <a:masterClrMapping/>
+  </p:clrMapOvr>
+</p:sld>
+</file>
+
+<file path=ppt/slides/slide19.xml><?xml version="1.0" encoding="utf-8"?>
+<p:sld xmlns:a="http://schemas.openxmlformats.org/drawingml/2006/main" xmlns:r="http://schemas.openxmlformats.org/officeDocument/2006/relationships" xmlns:p="http://schemas.openxmlformats.org/presentationml/2006/main">
+  <p:cSld>
+    <p:spTree>
+      <p:nvGrpSpPr>
+        <p:cNvPr id="1" name=""/>
+        <p:cNvGrpSpPr/>
+        <p:nvPr/>
+      </p:nvGrpSpPr>
+      <p:grpSpPr>
+        <a:xfrm>
+          <a:off x="0" y="0"/>
+          <a:ext cx="0" cy="0"/>
+          <a:chOff x="0" y="0"/>
+          <a:chExt cx="0" cy="0"/>
+        </a:xfrm>
+      </p:grpSpPr>
+      <p:sp>
+        <p:nvSpPr>
+          <p:cNvPr id="3" name="Content Placeholder 2">
+            <a:extLst>
+              <a:ext uri="{FF2B5EF4-FFF2-40B4-BE49-F238E27FC236}">
+                <a16:creationId xmlns:a16="http://schemas.microsoft.com/office/drawing/2014/main" id="{5939A8CF-240B-EE41-8730-065ECF5F3CEC}"/>
+              </a:ext>
+            </a:extLst>
+          </p:cNvPr>
+          <p:cNvSpPr>
+            <a:spLocks noGrp="1"/>
+          </p:cNvSpPr>
+          <p:nvPr>
+            <p:ph idx="1"/>
+          </p:nvPr>
+        </p:nvSpPr>
+        <p:spPr>
+          <a:xfrm>
+            <a:off x="838200" y="678077"/>
+            <a:ext cx="10515600" cy="5501846"/>
+          </a:xfrm>
+        </p:spPr>
+        <p:txBody>
+          <a:bodyPr>
+            <a:normAutofit fontScale="40000" lnSpcReduction="20000"/>
+          </a:bodyPr>
+          <a:lstStyle/>
+          <a:p>
+            <a:pPr marL="0" indent="0">
+              <a:buNone/>
+            </a:pPr>
+            <a:r>
+              <a:rPr lang="en-AU" sz="5100" dirty="0"/>
+              <a:t>Economic modelling with the SEE:</a:t>
+            </a:r>
+          </a:p>
+          <a:p>
+            <a:pPr lvl="1"/>
+            <a:r>
+              <a:rPr lang="en-AU" sz="4700" dirty="0"/>
+              <a:t>The SEE are testable conditions with a long history in macroeconomics and finance</a:t>
+            </a:r>
+          </a:p>
+          <a:p>
+            <a:pPr lvl="1"/>
+            <a:r>
+              <a:rPr lang="en-AU" sz="4500" dirty="0">
+                <a:solidFill>
+                  <a:srgbClr val="7030A0"/>
+                </a:solidFill>
+              </a:rPr>
+              <a:t>If the SEE hold, then the shock is more sector-specific (less macroeconomic).</a:t>
+            </a:r>
+          </a:p>
+          <a:p>
+            <a:pPr marL="0" indent="0">
+              <a:buNone/>
+            </a:pPr>
+            <a:endParaRPr lang="en-AU" sz="6000" dirty="0"/>
+          </a:p>
+          <a:p>
+            <a:pPr marL="0" indent="0">
+              <a:buNone/>
+            </a:pPr>
+            <a:r>
+              <a:rPr lang="en-AU" sz="5100" dirty="0"/>
+              <a:t>Transition: uncertainty and out-of-date capital, so the SEE are unlikely to hold</a:t>
+            </a:r>
+          </a:p>
+          <a:p>
+            <a:pPr lvl="1"/>
+            <a:r>
+              <a:rPr lang="en-AU" sz="4500" dirty="0">
+                <a:solidFill>
+                  <a:srgbClr val="7030A0"/>
+                </a:solidFill>
+              </a:rPr>
+              <a:t>greater propagation of shocks, but also opportunity for change</a:t>
+            </a:r>
+          </a:p>
+          <a:p>
+            <a:pPr lvl="1"/>
+            <a:endParaRPr lang="en-AU" sz="6000" dirty="0"/>
+          </a:p>
+          <a:p>
+            <a:pPr marL="0" indent="0">
+              <a:buNone/>
+            </a:pPr>
+            <a:r>
+              <a:rPr lang="en-AU" sz="5000" dirty="0"/>
+              <a:t>Policy implications: by estimating how the SEE fail to hold, we can</a:t>
+            </a:r>
+          </a:p>
+          <a:p>
+            <a:pPr lvl="1"/>
+            <a:r>
+              <a:rPr lang="en-AU" sz="4600" dirty="0">
+                <a:solidFill>
+                  <a:srgbClr val="7030A0"/>
+                </a:solidFill>
+              </a:rPr>
+              <a:t>identify paths of least resistance for transforming the economy</a:t>
+            </a:r>
+            <a:endParaRPr lang="en-AU" sz="3400" dirty="0">
+              <a:solidFill>
+                <a:srgbClr val="7030A0"/>
+              </a:solidFill>
+            </a:endParaRPr>
+          </a:p>
+          <a:p>
+            <a:pPr marL="457200" lvl="1" indent="0">
+              <a:buNone/>
+            </a:pPr>
+            <a:endParaRPr lang="en-AU" sz="6000" dirty="0"/>
+          </a:p>
+          <a:p>
+            <a:pPr marL="0" indent="0">
+              <a:buNone/>
+            </a:pPr>
+            <a:r>
+              <a:rPr lang="en-AU" sz="5100" dirty="0">
+                <a:solidFill>
+                  <a:srgbClr val="7030A0"/>
+                </a:solidFill>
+              </a:rPr>
+              <a:t>BSL is important to Gladstone’s economy</a:t>
+            </a:r>
+            <a:r>
+              <a:rPr lang="en-AU" sz="5100" dirty="0"/>
+              <a:t> and Qld’s Al/</a:t>
+            </a:r>
+            <a:r>
+              <a:rPr lang="en-AU" sz="5100" dirty="0" err="1"/>
+              <a:t>AlOx</a:t>
+            </a:r>
+            <a:r>
+              <a:rPr lang="en-AU" sz="5100" dirty="0"/>
+              <a:t> supply chain</a:t>
+            </a:r>
+            <a:endParaRPr lang="en-AU" sz="4200" dirty="0"/>
+          </a:p>
+          <a:p>
+            <a:pPr lvl="1"/>
+            <a:r>
+              <a:rPr lang="en-AU" sz="4200" dirty="0"/>
+              <a:t>Transition needs to be handled with care as it is a major consumer of energy</a:t>
+            </a:r>
+          </a:p>
+          <a:p>
+            <a:pPr lvl="1"/>
+            <a:r>
+              <a:rPr lang="en-AU" sz="4200" dirty="0"/>
+              <a:t>Needs a large backup supply of energy (currently Gladstone Power Station)</a:t>
+            </a:r>
+          </a:p>
+          <a:p>
+            <a:pPr lvl="1"/>
+            <a:r>
+              <a:rPr lang="en-AU" sz="4200" dirty="0"/>
+              <a:t>Quick decisions are valuable: e.g. Kurri Kurri closure 2012; power station approval 2021</a:t>
+            </a:r>
+          </a:p>
+          <a:p>
+            <a:pPr marL="457200" lvl="1" indent="0">
+              <a:buNone/>
+            </a:pPr>
+            <a:endParaRPr lang="en-AU" sz="6000" dirty="0"/>
+          </a:p>
+          <a:p>
+            <a:pPr marL="0" indent="0">
+              <a:buNone/>
+            </a:pPr>
+            <a:r>
+              <a:rPr lang="en-AU" sz="5100" dirty="0"/>
+              <a:t>With right energy transition, </a:t>
+            </a:r>
+            <a:r>
+              <a:rPr lang="en-AU" sz="5100" dirty="0">
+                <a:solidFill>
+                  <a:srgbClr val="7030A0"/>
+                </a:solidFill>
+              </a:rPr>
+              <a:t>Gladstone Aluminium can be internationally competitive</a:t>
+            </a:r>
+            <a:endParaRPr lang="en-AU" sz="4200" dirty="0">
+              <a:solidFill>
+                <a:srgbClr val="7030A0"/>
+              </a:solidFill>
+            </a:endParaRPr>
+          </a:p>
+          <a:p>
+            <a:pPr marL="457200" lvl="1" indent="0">
+              <a:buNone/>
+            </a:pPr>
+            <a:r>
+              <a:rPr lang="en-AU" sz="4200" dirty="0">
+                <a:hlinkClick r:id="rId2"/>
+              </a:rPr>
+              <a:t>June 2022</a:t>
+            </a:r>
+            <a:r>
+              <a:rPr lang="en-AU" sz="4200" dirty="0"/>
+              <a:t>: Rio Tinto calls for clean Gladstone Aluminium by 2030. </a:t>
+            </a:r>
+          </a:p>
+          <a:p>
+            <a:pPr marL="457200" lvl="1" indent="0">
+              <a:buNone/>
+            </a:pPr>
+            <a:r>
+              <a:rPr lang="en-AU" sz="4200" dirty="0">
+                <a:hlinkClick r:id="rId3"/>
+              </a:rPr>
+              <a:t>September 2022</a:t>
+            </a:r>
+            <a:r>
+              <a:rPr lang="en-AU" sz="4200" dirty="0"/>
+              <a:t>, Qld Energy Plan: </a:t>
+            </a:r>
+            <a:r>
+              <a:rPr lang="en-AU" sz="4200" dirty="0" err="1"/>
+              <a:t>supergrid</a:t>
+            </a:r>
+            <a:r>
+              <a:rPr lang="en-AU" sz="4200" dirty="0"/>
+              <a:t> can keep Gladstone in proximity of power supply</a:t>
+            </a:r>
+          </a:p>
+        </p:txBody>
+      </p:sp>
+      <p:sp>
+        <p:nvSpPr>
+          <p:cNvPr id="6" name="Slide Number Placeholder 5">
+            <a:extLst>
+              <a:ext uri="{FF2B5EF4-FFF2-40B4-BE49-F238E27FC236}">
+                <a16:creationId xmlns:a16="http://schemas.microsoft.com/office/drawing/2014/main" id="{0A9A70DA-2E9C-C81C-0451-B60ECB9CDD1F}"/>
+              </a:ext>
+            </a:extLst>
+          </p:cNvPr>
+          <p:cNvSpPr>
+            <a:spLocks noGrp="1"/>
+          </p:cNvSpPr>
+          <p:nvPr>
+            <p:ph type="sldNum" sz="quarter" idx="12"/>
+          </p:nvPr>
+        </p:nvSpPr>
+        <p:spPr/>
+        <p:txBody>
+          <a:bodyPr/>
+          <a:lstStyle/>
+          <a:p>
+            <a:fld id="{0F22F1AF-7FE7-D74B-89B5-5B91D7E9B3CD}" type="slidenum">
+              <a:rPr lang="en-US" smtClean="0"/>
+              <a:t>19</a:t>
+            </a:fld>
+            <a:endParaRPr lang="en-US"/>
+          </a:p>
+        </p:txBody>
+      </p:sp>
+    </p:spTree>
+    <p:extLst>
+      <p:ext uri="{BB962C8B-B14F-4D97-AF65-F5344CB8AC3E}">
+        <p14:creationId xmlns:p14="http://schemas.microsoft.com/office/powerpoint/2010/main" val="4274382949"/>
       </p:ext>
     </p:extLst>
   </p:cSld>
@@ -24688,343 +25092,6 @@
       </p:grpSpPr>
       <p:sp>
         <p:nvSpPr>
-          <p:cNvPr id="4" name="Title 1">
-            <a:extLst>
-              <a:ext uri="{FF2B5EF4-FFF2-40B4-BE49-F238E27FC236}">
-                <a16:creationId xmlns:a16="http://schemas.microsoft.com/office/drawing/2014/main" id="{30A5936C-A01C-63CA-B6CF-BDF472DA68C2}"/>
-              </a:ext>
-            </a:extLst>
-          </p:cNvPr>
-          <p:cNvSpPr>
-            <a:spLocks noGrp="1"/>
-          </p:cNvSpPr>
-          <p:nvPr>
-            <p:ph type="title"/>
-          </p:nvPr>
-        </p:nvSpPr>
-        <p:spPr>
-          <a:xfrm>
-            <a:off x="838200" y="2180492"/>
-            <a:ext cx="10515600" cy="2497016"/>
-          </a:xfrm>
-        </p:spPr>
-        <p:txBody>
-          <a:bodyPr>
-            <a:normAutofit/>
-          </a:bodyPr>
-          <a:lstStyle/>
-          <a:p>
-            <a:pPr algn="ctr"/>
-            <a:r>
-              <a:rPr lang="en-US" dirty="0"/>
-              <a:t>Key takeaways</a:t>
-            </a:r>
-          </a:p>
-        </p:txBody>
-      </p:sp>
-      <p:sp>
-        <p:nvSpPr>
-          <p:cNvPr id="5" name="Slide Number Placeholder 4">
-            <a:extLst>
-              <a:ext uri="{FF2B5EF4-FFF2-40B4-BE49-F238E27FC236}">
-                <a16:creationId xmlns:a16="http://schemas.microsoft.com/office/drawing/2014/main" id="{E79D44CC-774A-5F17-A282-CE99AC7CF19A}"/>
-              </a:ext>
-            </a:extLst>
-          </p:cNvPr>
-          <p:cNvSpPr>
-            <a:spLocks noGrp="1"/>
-          </p:cNvSpPr>
-          <p:nvPr>
-            <p:ph type="sldNum" sz="quarter" idx="12"/>
-          </p:nvPr>
-        </p:nvSpPr>
-        <p:spPr/>
-        <p:txBody>
-          <a:bodyPr/>
-          <a:lstStyle/>
-          <a:p>
-            <a:fld id="{0F22F1AF-7FE7-D74B-89B5-5B91D7E9B3CD}" type="slidenum">
-              <a:rPr lang="en-US" smtClean="0"/>
-              <a:t>20</a:t>
-            </a:fld>
-            <a:endParaRPr lang="en-US"/>
-          </a:p>
-        </p:txBody>
-      </p:sp>
-    </p:spTree>
-    <p:extLst>
-      <p:ext uri="{BB962C8B-B14F-4D97-AF65-F5344CB8AC3E}">
-        <p14:creationId xmlns:p14="http://schemas.microsoft.com/office/powerpoint/2010/main" val="4198528421"/>
-      </p:ext>
-    </p:extLst>
-  </p:cSld>
-  <p:clrMapOvr>
-    <a:masterClrMapping/>
-  </p:clrMapOvr>
-</p:sld>
-</file>
-
-<file path=ppt/slides/slide21.xml><?xml version="1.0" encoding="utf-8"?>
-<p:sld xmlns:a="http://schemas.openxmlformats.org/drawingml/2006/main" xmlns:r="http://schemas.openxmlformats.org/officeDocument/2006/relationships" xmlns:p="http://schemas.openxmlformats.org/presentationml/2006/main">
-  <p:cSld>
-    <p:spTree>
-      <p:nvGrpSpPr>
-        <p:cNvPr id="1" name=""/>
-        <p:cNvGrpSpPr/>
-        <p:nvPr/>
-      </p:nvGrpSpPr>
-      <p:grpSpPr>
-        <a:xfrm>
-          <a:off x="0" y="0"/>
-          <a:ext cx="0" cy="0"/>
-          <a:chOff x="0" y="0"/>
-          <a:chExt cx="0" cy="0"/>
-        </a:xfrm>
-      </p:grpSpPr>
-      <p:sp>
-        <p:nvSpPr>
-          <p:cNvPr id="3" name="Content Placeholder 2">
-            <a:extLst>
-              <a:ext uri="{FF2B5EF4-FFF2-40B4-BE49-F238E27FC236}">
-                <a16:creationId xmlns:a16="http://schemas.microsoft.com/office/drawing/2014/main" id="{5939A8CF-240B-EE41-8730-065ECF5F3CEC}"/>
-              </a:ext>
-            </a:extLst>
-          </p:cNvPr>
-          <p:cNvSpPr>
-            <a:spLocks noGrp="1"/>
-          </p:cNvSpPr>
-          <p:nvPr>
-            <p:ph idx="1"/>
-          </p:nvPr>
-        </p:nvSpPr>
-        <p:spPr>
-          <a:xfrm>
-            <a:off x="838200" y="678077"/>
-            <a:ext cx="10515600" cy="5501846"/>
-          </a:xfrm>
-        </p:spPr>
-        <p:txBody>
-          <a:bodyPr>
-            <a:normAutofit fontScale="40000" lnSpcReduction="20000"/>
-          </a:bodyPr>
-          <a:lstStyle/>
-          <a:p>
-            <a:pPr marL="0" indent="0">
-              <a:buNone/>
-            </a:pPr>
-            <a:r>
-              <a:rPr lang="en-AU" sz="7600" dirty="0">
-                <a:latin typeface="+mj-lt"/>
-              </a:rPr>
-              <a:t>Key takeaways</a:t>
-            </a:r>
-          </a:p>
-          <a:p>
-            <a:pPr marL="0" indent="0">
-              <a:buNone/>
-            </a:pPr>
-            <a:endParaRPr lang="en-AU" sz="4200" dirty="0"/>
-          </a:p>
-          <a:p>
-            <a:r>
-              <a:rPr lang="en-AU" sz="5100" i="1" dirty="0"/>
-              <a:t>Sectoral </a:t>
-            </a:r>
-            <a:r>
-              <a:rPr lang="en-AU" sz="5100" dirty="0"/>
-              <a:t>Euler eq’ns matter for shock propagation and economic response</a:t>
-            </a:r>
-          </a:p>
-          <a:p>
-            <a:pPr lvl="1"/>
-            <a:r>
-              <a:rPr lang="en-AU" sz="4500" dirty="0"/>
-              <a:t>If they hold, then the shock is more sector-specific (less macroeconomic).</a:t>
-            </a:r>
-          </a:p>
-          <a:p>
-            <a:pPr lvl="1"/>
-            <a:endParaRPr lang="en-AU" sz="5100" dirty="0"/>
-          </a:p>
-          <a:p>
-            <a:r>
-              <a:rPr lang="en-AU" sz="5100" dirty="0"/>
-              <a:t>Transition: uncertainty and out-of-date capital, so sectoral Euler equations unlikely to hold</a:t>
-            </a:r>
-          </a:p>
-          <a:p>
-            <a:pPr lvl="1"/>
-            <a:r>
-              <a:rPr lang="en-AU" sz="4500" dirty="0"/>
-              <a:t>greater propagation of shocks, but also opportunity for change</a:t>
-            </a:r>
-          </a:p>
-          <a:p>
-            <a:pPr lvl="1"/>
-            <a:endParaRPr lang="en-AU" sz="4600" dirty="0"/>
-          </a:p>
-          <a:p>
-            <a:r>
-              <a:rPr lang="en-AU" sz="5000" dirty="0"/>
-              <a:t>By allowing sectoral Euler equations to fail in ways that reflect the current transition:</a:t>
-            </a:r>
-          </a:p>
-          <a:p>
-            <a:pPr lvl="1"/>
-            <a:r>
-              <a:rPr lang="en-AU" sz="4600" dirty="0"/>
-              <a:t>we can explore ways to transform the economy</a:t>
-            </a:r>
-            <a:endParaRPr lang="en-AU" sz="3400" dirty="0"/>
-          </a:p>
-          <a:p>
-            <a:pPr marL="457200" lvl="1" indent="0">
-              <a:buNone/>
-            </a:pPr>
-            <a:endParaRPr lang="en-AU" sz="2600" dirty="0"/>
-          </a:p>
-          <a:p>
-            <a:r>
-              <a:rPr lang="en-AU" sz="5100" dirty="0"/>
-              <a:t>BSL is important to Gladstone’s economy</a:t>
-            </a:r>
-            <a:endParaRPr lang="en-AU" sz="4200" dirty="0"/>
-          </a:p>
-          <a:p>
-            <a:pPr lvl="1"/>
-            <a:r>
-              <a:rPr lang="en-AU" sz="4200" dirty="0"/>
-              <a:t>Transition needs to be handled with care as it is a major consumer of energy</a:t>
-            </a:r>
-          </a:p>
-          <a:p>
-            <a:pPr lvl="1"/>
-            <a:r>
-              <a:rPr lang="en-AU" sz="4200" dirty="0"/>
-              <a:t>Needs a backup supply of energy (currently Gladstone Power Station)</a:t>
-            </a:r>
-          </a:p>
-          <a:p>
-            <a:pPr lvl="1"/>
-            <a:r>
-              <a:rPr lang="en-AU" sz="4200" dirty="0"/>
-              <a:t>Early decisions are valuable: e.g. Kurri Kurri closure 2012; power station approval in 2021</a:t>
-            </a:r>
-          </a:p>
-          <a:p>
-            <a:pPr marL="457200" lvl="1" indent="0">
-              <a:buNone/>
-            </a:pPr>
-            <a:endParaRPr lang="en-AU" sz="3600" dirty="0"/>
-          </a:p>
-          <a:p>
-            <a:r>
-              <a:rPr lang="en-AU" sz="5100" dirty="0"/>
-              <a:t>With right energy transition, Gladstone Aluminium is internationally competitive</a:t>
-            </a:r>
-            <a:endParaRPr lang="en-AU" sz="4200" dirty="0"/>
-          </a:p>
-          <a:p>
-            <a:pPr marL="457200" lvl="1" indent="0">
-              <a:buNone/>
-            </a:pPr>
-            <a:r>
-              <a:rPr lang="en-AU" sz="4200" dirty="0">
-                <a:hlinkClick r:id="rId2"/>
-              </a:rPr>
-              <a:t>June 2022</a:t>
-            </a:r>
-            <a:r>
-              <a:rPr lang="en-AU" sz="4200" dirty="0"/>
-              <a:t>: Rio Tinto calls for clean Gladstone Aluminium by 2030. </a:t>
-            </a:r>
-          </a:p>
-          <a:p>
-            <a:pPr marL="457200" lvl="1" indent="0">
-              <a:buNone/>
-            </a:pPr>
-            <a:r>
-              <a:rPr lang="en-AU" sz="4200" dirty="0">
-                <a:hlinkClick r:id="rId3"/>
-              </a:rPr>
-              <a:t>September 2022</a:t>
-            </a:r>
-            <a:r>
-              <a:rPr lang="en-AU" sz="4200" dirty="0"/>
-              <a:t>, Qld Energy Plan: </a:t>
-            </a:r>
-            <a:r>
-              <a:rPr lang="en-AU" sz="4200" dirty="0" err="1"/>
-              <a:t>supergrid</a:t>
-            </a:r>
-            <a:r>
-              <a:rPr lang="en-AU" sz="4200" dirty="0"/>
-              <a:t> can keep Gladstone in proximity of power supply</a:t>
-            </a:r>
-          </a:p>
-        </p:txBody>
-      </p:sp>
-      <p:sp>
-        <p:nvSpPr>
-          <p:cNvPr id="6" name="Slide Number Placeholder 5">
-            <a:extLst>
-              <a:ext uri="{FF2B5EF4-FFF2-40B4-BE49-F238E27FC236}">
-                <a16:creationId xmlns:a16="http://schemas.microsoft.com/office/drawing/2014/main" id="{0A9A70DA-2E9C-C81C-0451-B60ECB9CDD1F}"/>
-              </a:ext>
-            </a:extLst>
-          </p:cNvPr>
-          <p:cNvSpPr>
-            <a:spLocks noGrp="1"/>
-          </p:cNvSpPr>
-          <p:nvPr>
-            <p:ph type="sldNum" sz="quarter" idx="12"/>
-          </p:nvPr>
-        </p:nvSpPr>
-        <p:spPr/>
-        <p:txBody>
-          <a:bodyPr/>
-          <a:lstStyle/>
-          <a:p>
-            <a:fld id="{0F22F1AF-7FE7-D74B-89B5-5B91D7E9B3CD}" type="slidenum">
-              <a:rPr lang="en-US" smtClean="0"/>
-              <a:t>21</a:t>
-            </a:fld>
-            <a:endParaRPr lang="en-US"/>
-          </a:p>
-        </p:txBody>
-      </p:sp>
-    </p:spTree>
-    <p:extLst>
-      <p:ext uri="{BB962C8B-B14F-4D97-AF65-F5344CB8AC3E}">
-        <p14:creationId xmlns:p14="http://schemas.microsoft.com/office/powerpoint/2010/main" val="4274382949"/>
-      </p:ext>
-    </p:extLst>
-  </p:cSld>
-  <p:clrMapOvr>
-    <a:masterClrMapping/>
-  </p:clrMapOvr>
-</p:sld>
-</file>
-
-<file path=ppt/slides/slide22.xml><?xml version="1.0" encoding="utf-8"?>
-<p:sld xmlns:a="http://schemas.openxmlformats.org/drawingml/2006/main" xmlns:r="http://schemas.openxmlformats.org/officeDocument/2006/relationships" xmlns:p="http://schemas.openxmlformats.org/presentationml/2006/main">
-  <p:cSld>
-    <p:spTree>
-      <p:nvGrpSpPr>
-        <p:cNvPr id="1" name=""/>
-        <p:cNvGrpSpPr/>
-        <p:nvPr/>
-      </p:nvGrpSpPr>
-      <p:grpSpPr>
-        <a:xfrm>
-          <a:off x="0" y="0"/>
-          <a:ext cx="0" cy="0"/>
-          <a:chOff x="0" y="0"/>
-          <a:chExt cx="0" cy="0"/>
-        </a:xfrm>
-      </p:grpSpPr>
-      <p:sp>
-        <p:nvSpPr>
           <p:cNvPr id="2" name="Title 1">
             <a:extLst>
               <a:ext uri="{FF2B5EF4-FFF2-40B4-BE49-F238E27FC236}">
@@ -25080,7 +25147,7 @@
           <a:p>
             <a:fld id="{0F22F1AF-7FE7-D74B-89B5-5B91D7E9B3CD}" type="slidenum">
               <a:rPr lang="en-US" smtClean="0"/>
-              <a:t>22</a:t>
+              <a:t>20</a:t>
             </a:fld>
             <a:endParaRPr lang="en-US"/>
           </a:p>
@@ -25099,7 +25166,7 @@
 </p:sld>
 </file>
 
-<file path=ppt/slides/slide23.xml><?xml version="1.0" encoding="utf-8"?>
+<file path=ppt/slides/slide21.xml><?xml version="1.0" encoding="utf-8"?>
 <p:sld xmlns:a="http://schemas.openxmlformats.org/drawingml/2006/main" xmlns:r="http://schemas.openxmlformats.org/officeDocument/2006/relationships" xmlns:p="http://schemas.openxmlformats.org/presentationml/2006/main">
   <p:cSld>
     <p:spTree>
@@ -25135,7 +25202,7 @@
         <p:spPr>
           <a:xfrm>
             <a:off x="838200" y="712554"/>
-            <a:ext cx="10515600" cy="5432892"/>
+            <a:ext cx="10515600" cy="5643796"/>
           </a:xfrm>
         </p:spPr>
         <p:txBody>
@@ -25144,175 +25211,132 @@
           </a:bodyPr>
           <a:lstStyle/>
           <a:p>
-            <a:r>
-              <a:rPr lang="en-AU" sz="1400" dirty="0"/>
-              <a:t>Queensland Government (2022). </a:t>
-            </a:r>
-            <a:r>
-              <a:rPr lang="en-AU" sz="1400" i="1" dirty="0"/>
-              <a:t>Energy and Jobs Plan</a:t>
-            </a:r>
-            <a:r>
-              <a:rPr lang="en-AU" sz="1400" dirty="0"/>
-              <a:t>. </a:t>
-            </a:r>
-            <a:r>
-              <a:rPr lang="en-US" sz="1400" dirty="0">
-                <a:hlinkClick r:id="rId2"/>
-              </a:rPr>
-              <a:t>https://www.epw.qld.gov.au/energyandjobsplan</a:t>
-            </a:r>
-            <a:r>
-              <a:rPr lang="en-US" sz="1400" dirty="0"/>
-              <a:t> . </a:t>
-            </a:r>
-            <a:r>
-              <a:rPr lang="en-AU" sz="1400" dirty="0"/>
-              <a:t>Retrieved October 2022</a:t>
-            </a:r>
-            <a:endParaRPr lang="en-US" sz="1400" dirty="0">
-              <a:hlinkClick r:id="rId3"/>
-            </a:endParaRPr>
-          </a:p>
-          <a:p>
-            <a:r>
-              <a:rPr lang="en-AU" sz="1400" dirty="0"/>
-              <a:t>Queensland Government. </a:t>
-            </a:r>
-            <a:r>
-              <a:rPr lang="en-US" sz="1400" dirty="0">
-                <a:hlinkClick r:id="rId4"/>
-              </a:rPr>
-              <a:t>https://yoursayhpw.engagementhq.com/understand-qrez/news_feed/central</a:t>
-            </a:r>
-            <a:r>
-              <a:rPr lang="en-US" sz="1400" dirty="0"/>
-              <a:t> . </a:t>
-            </a:r>
-            <a:r>
-              <a:rPr lang="en-AU" sz="1400" dirty="0"/>
-              <a:t>Retrieved October 2022</a:t>
-            </a:r>
-            <a:endParaRPr lang="en-US" sz="1400" dirty="0">
-              <a:hlinkClick r:id="rId3"/>
-            </a:endParaRPr>
-          </a:p>
-          <a:p>
-            <a:r>
-              <a:rPr lang="en-AU" sz="1400" dirty="0"/>
-              <a:t>Gladstone Regional Council. </a:t>
-            </a:r>
-            <a:r>
-              <a:rPr lang="en-US" sz="1400" dirty="0">
-                <a:hlinkClick r:id="rId3"/>
-              </a:rPr>
-              <a:t>https://www.gladstone.qld.gov.au/downloads/file/3466/gladstone-region-investment-prospectus</a:t>
-            </a:r>
-            <a:r>
-              <a:rPr lang="en-US" sz="1400" dirty="0"/>
-              <a:t> .</a:t>
-            </a:r>
-            <a:r>
-              <a:rPr lang="en-AU" sz="1400" dirty="0"/>
-              <a:t> Retrieved October 2022</a:t>
-            </a:r>
-          </a:p>
-          <a:p>
-            <a:r>
-              <a:rPr lang="en-AU" sz="1400" dirty="0" err="1"/>
+            <a:pPr marL="0" indent="0">
+              <a:buNone/>
+            </a:pPr>
+            <a:r>
+              <a:rPr lang="en-AU" sz="1100" dirty="0"/>
+              <a:t>Articles:</a:t>
+            </a:r>
+          </a:p>
+          <a:p>
+            <a:r>
+              <a:rPr lang="en-AU" sz="1100" dirty="0" err="1"/>
               <a:t>Atalay</a:t>
             </a:r>
             <a:r>
-              <a:rPr lang="en-AU" sz="1400" dirty="0"/>
+              <a:rPr lang="en-AU" sz="1100" dirty="0"/>
               <a:t>, E. (2017). How important are sectoral shocks?. </a:t>
             </a:r>
             <a:r>
-              <a:rPr lang="en-AU" sz="1400" i="1" dirty="0"/>
+              <a:rPr lang="en-AU" sz="1100" i="1" dirty="0"/>
               <a:t>American Economic Journal: Macroeconomics</a:t>
             </a:r>
             <a:r>
-              <a:rPr lang="en-AU" sz="1400" dirty="0"/>
+              <a:rPr lang="en-AU" sz="1100" dirty="0"/>
               <a:t>, </a:t>
             </a:r>
             <a:r>
-              <a:rPr lang="en-AU" sz="1400" i="1" dirty="0"/>
+              <a:rPr lang="en-AU" sz="1100" i="1" dirty="0"/>
               <a:t>9</a:t>
             </a:r>
             <a:r>
-              <a:rPr lang="en-AU" sz="1400" dirty="0"/>
+              <a:rPr lang="en-AU" sz="1100" dirty="0"/>
               <a:t>(4), 254-80.</a:t>
             </a:r>
           </a:p>
           <a:p>
             <a:r>
-              <a:rPr lang="en-AU" sz="1400" dirty="0" err="1"/>
+              <a:rPr lang="en-AU" sz="1100" dirty="0" err="1"/>
               <a:t>Baqaee</a:t>
             </a:r>
             <a:r>
-              <a:rPr lang="en-AU" sz="1400" dirty="0"/>
+              <a:rPr lang="en-AU" sz="1100" dirty="0"/>
               <a:t>, D. R., &amp; Farhi, E. (2019). The macroeconomic impact of microeconomic shocks: Beyond </a:t>
             </a:r>
             <a:r>
-              <a:rPr lang="en-AU" sz="1400" dirty="0" err="1"/>
+              <a:rPr lang="en-AU" sz="1100" dirty="0" err="1"/>
               <a:t>Hulten's</a:t>
             </a:r>
             <a:r>
-              <a:rPr lang="en-AU" sz="1400" dirty="0"/>
+              <a:rPr lang="en-AU" sz="1100" dirty="0"/>
               <a:t> theorem. </a:t>
             </a:r>
             <a:r>
-              <a:rPr lang="en-AU" sz="1400" i="1" dirty="0" err="1"/>
+              <a:rPr lang="en-AU" sz="1100" i="1" dirty="0" err="1"/>
               <a:t>Econometrica</a:t>
             </a:r>
             <a:r>
-              <a:rPr lang="en-AU" sz="1400" dirty="0"/>
+              <a:rPr lang="en-AU" sz="1100" dirty="0"/>
               <a:t>, </a:t>
             </a:r>
             <a:r>
-              <a:rPr lang="en-AU" sz="1400" i="1" dirty="0"/>
+              <a:rPr lang="en-AU" sz="1100" i="1" dirty="0"/>
               <a:t>87</a:t>
             </a:r>
             <a:r>
-              <a:rPr lang="en-AU" sz="1400" dirty="0"/>
+              <a:rPr lang="en-AU" sz="1100" dirty="0"/>
               <a:t>(4), 1155-1203.</a:t>
             </a:r>
           </a:p>
           <a:p>
             <a:r>
-              <a:rPr lang="en-AU" sz="1400" dirty="0"/>
+              <a:rPr lang="en-AU" sz="1100" dirty="0"/>
               <a:t>Cai, Y., &amp; Judd, K. L. (2021). A Simple but Powerful Simulated Certainty Equivalent Approximation Method for Dynamic Stochastic Problems (No. w28502). National Bureau of Economic Research.</a:t>
             </a:r>
           </a:p>
           <a:p>
             <a:r>
-              <a:rPr lang="en-AU" sz="1400" dirty="0"/>
+              <a:rPr lang="en-AU" sz="1100" dirty="0"/>
+              <a:t>Cusano, G., Rodrigo Gonzalo, M., Farrell, F., Remus, R., </a:t>
+            </a:r>
+            <a:r>
+              <a:rPr lang="en-AU" sz="1100" dirty="0" err="1"/>
+              <a:t>Roudier</a:t>
+            </a:r>
+            <a:r>
+              <a:rPr lang="en-AU" sz="1100" dirty="0"/>
+              <a:t>, S., Delgado Sancho, L. (2017). </a:t>
+            </a:r>
+            <a:r>
+              <a:rPr lang="en-AU" sz="1100" i="1" dirty="0"/>
+              <a:t>Best Available Techniques (BAT) Reference Document for the Non-Ferrous Metals Industries. Industrial Emissions Directive 2010/75/EU (Integrated Pollution Prevention and Control)</a:t>
+            </a:r>
+            <a:r>
+              <a:rPr lang="en-AU" sz="1100" dirty="0"/>
+              <a:t> (No. JRC107041). Joint Research Centre (Seville site).</a:t>
+            </a:r>
+          </a:p>
+          <a:p>
+            <a:r>
+              <a:rPr lang="en-AU" sz="1100" dirty="0"/>
               <a:t>Dixon, P., &amp; </a:t>
             </a:r>
             <a:r>
-              <a:rPr lang="en-AU" sz="1400" dirty="0" err="1"/>
+              <a:rPr lang="en-AU" sz="1100" dirty="0" err="1"/>
               <a:t>Rimmer</a:t>
             </a:r>
             <a:r>
-              <a:rPr lang="en-AU" sz="1400" dirty="0"/>
+              <a:rPr lang="en-AU" sz="1100" dirty="0"/>
               <a:t>, M. T. (2020). </a:t>
             </a:r>
             <a:r>
-              <a:rPr lang="en-AU" sz="1400" i="1" dirty="0"/>
+              <a:rPr lang="en-AU" sz="1100" i="1" dirty="0"/>
               <a:t>Developing a DSGE consumption function for a CGE model</a:t>
             </a:r>
             <a:r>
-              <a:rPr lang="en-AU" sz="1400" dirty="0"/>
+              <a:rPr lang="en-AU" sz="1100" dirty="0"/>
               <a:t>. Centre of Policy Studies (</a:t>
             </a:r>
             <a:r>
-              <a:rPr lang="en-AU" sz="1400" dirty="0" err="1"/>
+              <a:rPr lang="en-AU" sz="1100" dirty="0" err="1"/>
               <a:t>CoPS</a:t>
             </a:r>
             <a:r>
-              <a:rPr lang="en-AU" sz="1400" dirty="0"/>
+              <a:rPr lang="en-AU" sz="1100" dirty="0"/>
               <a:t>), Victoria University.</a:t>
             </a:r>
-            <a:endParaRPr lang="en-AU" sz="1400" dirty="0">
+            <a:endParaRPr lang="en-AU" sz="1100" dirty="0">
               <a:solidFill>
                 <a:srgbClr val="000000"/>
               </a:solidFill>
@@ -25321,60 +25345,68 @@
           </a:p>
           <a:p>
             <a:r>
-              <a:rPr lang="en-AU" sz="1400" dirty="0" err="1"/>
+              <a:rPr lang="en-AU" sz="1100" dirty="0" err="1"/>
               <a:t>Gagné</a:t>
             </a:r>
             <a:r>
-              <a:rPr lang="en-AU" sz="1400" dirty="0"/>
+              <a:rPr lang="en-AU" sz="1100" dirty="0"/>
               <a:t>, R., &amp; Nappi, C. (2000). The cost and technological structure of aluminium smelters worldwide. </a:t>
             </a:r>
             <a:r>
-              <a:rPr lang="en-AU" sz="1400" i="1" dirty="0"/>
+              <a:rPr lang="en-AU" sz="1100" i="1" dirty="0"/>
               <a:t>Journal of Applied Econometrics</a:t>
             </a:r>
             <a:r>
-              <a:rPr lang="en-AU" sz="1400" dirty="0"/>
+              <a:rPr lang="en-AU" sz="1100" dirty="0"/>
               <a:t>, </a:t>
             </a:r>
             <a:r>
-              <a:rPr lang="en-AU" sz="1400" i="1" dirty="0"/>
+              <a:rPr lang="en-AU" sz="1100" i="1" dirty="0"/>
               <a:t>15</a:t>
             </a:r>
             <a:r>
-              <a:rPr lang="en-AU" sz="1400" dirty="0"/>
+              <a:rPr lang="en-AU" sz="1100" dirty="0"/>
               <a:t>(4), 417-432.</a:t>
             </a:r>
-            <a:endParaRPr lang="en-AU" sz="1400" dirty="0">
-              <a:solidFill>
-                <a:srgbClr val="000000"/>
-              </a:solidFill>
-            </a:endParaRPr>
-          </a:p>
-          <a:p>
-            <a:r>
-              <a:rPr lang="en-AU" sz="1400" dirty="0"/>
-              <a:t>Cusano, G., Rodrigo Gonzalo, M., Farrell, F., Remus, R., </a:t>
-            </a:r>
-            <a:r>
-              <a:rPr lang="en-AU" sz="1400" dirty="0" err="1"/>
-              <a:t>Roudier</a:t>
-            </a:r>
-            <a:r>
-              <a:rPr lang="en-AU" sz="1400" dirty="0"/>
-              <a:t>, S., Delgado Sancho, L. (2017). </a:t>
-            </a:r>
-            <a:r>
-              <a:rPr lang="en-AU" sz="1400" i="1" dirty="0"/>
-              <a:t>Best Available Techniques (BAT) Reference Document for the Non-Ferrous Metals Industries. Industrial Emissions Directive 2010/75/EU (Integrated Pollution Prevention and Control)</a:t>
-            </a:r>
-            <a:r>
-              <a:rPr lang="en-AU" sz="1400" dirty="0"/>
-              <a:t> (No. JRC107041). Joint Research Centre (Seville site).</a:t>
-            </a:r>
-          </a:p>
-          <a:p>
-            <a:r>
-              <a:rPr lang="en-AU" sz="1400" dirty="0">
+          </a:p>
+          <a:p>
+            <a:r>
+              <a:rPr lang="en-AU" sz="1100" dirty="0"/>
+              <a:t>Na, S., </a:t>
+            </a:r>
+            <a:r>
+              <a:rPr lang="en-AU" sz="1100" dirty="0" err="1"/>
+              <a:t>Anitescu</a:t>
+            </a:r>
+            <a:r>
+              <a:rPr lang="en-AU" sz="1100" dirty="0"/>
+              <a:t>, M., &amp; Kolar, M. (2021). A fast temporal decomposition procedure for long-horizon nonlinear dynamic programming. </a:t>
+            </a:r>
+            <a:r>
+              <a:rPr lang="en-AU" sz="1100" i="1" dirty="0" err="1"/>
+              <a:t>arXiv</a:t>
+            </a:r>
+            <a:r>
+              <a:rPr lang="en-AU" sz="1100" i="1" dirty="0"/>
+              <a:t> preprint arXiv:2107.11560</a:t>
+            </a:r>
+            <a:r>
+              <a:rPr lang="en-AU" sz="1100" dirty="0"/>
+              <a:t>. </a:t>
+            </a:r>
+          </a:p>
+          <a:p>
+            <a:pPr marL="0" indent="0">
+              <a:buNone/>
+            </a:pPr>
+            <a:r>
+              <a:rPr lang="en-AU" sz="1100" dirty="0"/>
+              <a:t>Data:</a:t>
+            </a:r>
+          </a:p>
+          <a:p>
+            <a:r>
+              <a:rPr lang="en-AU" sz="1100" dirty="0">
                 <a:solidFill>
                   <a:srgbClr val="000000"/>
                 </a:solidFill>
@@ -25383,7 +25415,7 @@
               <a:t>Australian Bureau of Statistics (ABS), 2018-2019. </a:t>
             </a:r>
             <a:r>
-              <a:rPr lang="en-AU" sz="1400" i="1" dirty="0">
+              <a:rPr lang="en-AU" sz="1100" i="1" dirty="0">
                 <a:solidFill>
                   <a:srgbClr val="000000"/>
                 </a:solidFill>
@@ -25392,7 +25424,7 @@
               <a:t>Tables 5 and 8: Industry by Industry Flow Table</a:t>
             </a:r>
             <a:r>
-              <a:rPr lang="en-AU" sz="1400" dirty="0">
+              <a:rPr lang="en-AU" sz="1100" dirty="0">
                 <a:solidFill>
                   <a:srgbClr val="000000"/>
                 </a:solidFill>
@@ -25403,7 +25435,40 @@
           </a:p>
           <a:p>
             <a:r>
-              <a:rPr lang="en-AU" sz="1400" dirty="0">
+              <a:rPr lang="en-AU" sz="1100" dirty="0">
+                <a:solidFill>
+                  <a:srgbClr val="000000"/>
+                </a:solidFill>
+              </a:rPr>
+              <a:t>Australian Bureau of Statistics, Business Longitudinal Analysis Data Environment (BLADE), 2018-2019, </a:t>
+            </a:r>
+            <a:r>
+              <a:rPr lang="en-AU" sz="1100" dirty="0">
+                <a:solidFill>
+                  <a:srgbClr val="000000"/>
+                </a:solidFill>
+                <a:hlinkClick r:id="rId2"/>
+              </a:rPr>
+              <a:t>https://www.abs.gov.au/about/data-services/data-integration/integrated-data/business-longitudinal-analysis-data-environment-blade</a:t>
+            </a:r>
+            <a:r>
+              <a:rPr lang="en-AU" sz="1100" dirty="0">
+                <a:solidFill>
+                  <a:srgbClr val="000000"/>
+                </a:solidFill>
+              </a:rPr>
+              <a:t> </a:t>
+            </a:r>
+            <a:endParaRPr lang="en-AU" sz="1100" dirty="0">
+              <a:solidFill>
+                <a:srgbClr val="000000"/>
+              </a:solidFill>
+              <a:effectLst/>
+            </a:endParaRPr>
+          </a:p>
+          <a:p>
+            <a:r>
+              <a:rPr lang="en-AU" sz="1100" dirty="0">
                 <a:solidFill>
                   <a:srgbClr val="000000"/>
                 </a:solidFill>
@@ -25412,7 +25477,7 @@
               <a:t>Bureau of Economic Analysis (2003). </a:t>
             </a:r>
             <a:r>
-              <a:rPr lang="en-AU" sz="1400" i="1" dirty="0">
+              <a:rPr lang="en-AU" sz="1100" i="1" dirty="0">
                 <a:solidFill>
                   <a:srgbClr val="000000"/>
                 </a:solidFill>
@@ -25421,65 +25486,138 @@
               <a:t>Capital flow data for 1997</a:t>
             </a:r>
             <a:r>
-              <a:rPr lang="en-AU" sz="1400" dirty="0">
+              <a:rPr lang="en-AU" sz="1100" dirty="0">
                 <a:solidFill>
                   <a:srgbClr val="000000"/>
                 </a:solidFill>
                 <a:effectLst/>
               </a:rPr>
-              <a:t>. https://</a:t>
-            </a:r>
-            <a:r>
-              <a:rPr lang="en-AU" sz="1400" dirty="0" err="1">
+              <a:t>. </a:t>
+            </a:r>
+            <a:r>
+              <a:rPr lang="en-AU" sz="1100" dirty="0">
+                <a:solidFill>
+                  <a:srgbClr val="000000"/>
+                </a:solidFill>
+                <a:effectLst/>
+                <a:hlinkClick r:id="rId3"/>
+              </a:rPr>
+              <a:t>https://www.bea.gov/news/2003/capital-flows-us-economy-1997</a:t>
+            </a:r>
+            <a:endParaRPr lang="en-AU" sz="1100" dirty="0">
+              <a:solidFill>
+                <a:srgbClr val="000000"/>
+              </a:solidFill>
+              <a:effectLst/>
+            </a:endParaRPr>
+          </a:p>
+          <a:p>
+            <a:r>
+              <a:rPr lang="en-AU" sz="1100" dirty="0"/>
+              <a:t>Gladstone Regional Council. </a:t>
+            </a:r>
+            <a:r>
+              <a:rPr lang="en-US" sz="1100" dirty="0">
+                <a:hlinkClick r:id="rId4"/>
+              </a:rPr>
+              <a:t>https://www.gladstone.qld.gov.au/downloads/file/3466/gladstone-region-investment-prospectus</a:t>
+            </a:r>
+            <a:r>
+              <a:rPr lang="en-US" sz="1100" dirty="0"/>
+              <a:t> .</a:t>
+            </a:r>
+            <a:r>
+              <a:rPr lang="en-AU" sz="1100" dirty="0"/>
+              <a:t> Retrieved October 2022</a:t>
+            </a:r>
+          </a:p>
+          <a:p>
+            <a:r>
+              <a:rPr lang="en-AU" sz="1100" dirty="0"/>
+              <a:t>Queensland Government (2022). </a:t>
+            </a:r>
+            <a:r>
+              <a:rPr lang="en-AU" sz="1100" i="1" dirty="0"/>
+              <a:t>Energy and Jobs Plan</a:t>
+            </a:r>
+            <a:r>
+              <a:rPr lang="en-AU" sz="1100" dirty="0"/>
+              <a:t>. </a:t>
+            </a:r>
+            <a:r>
+              <a:rPr lang="en-US" sz="1100" dirty="0">
+                <a:hlinkClick r:id="rId5"/>
+              </a:rPr>
+              <a:t>https://www.epw.qld.gov.au/energyandjobsplan</a:t>
+            </a:r>
+            <a:r>
+              <a:rPr lang="en-US" sz="1100" dirty="0"/>
+              <a:t> . </a:t>
+            </a:r>
+            <a:r>
+              <a:rPr lang="en-AU" sz="1100" dirty="0"/>
+              <a:t>Retrieved October 2022</a:t>
+            </a:r>
+            <a:endParaRPr lang="en-US" sz="1100" dirty="0">
+              <a:hlinkClick r:id="rId4"/>
+            </a:endParaRPr>
+          </a:p>
+          <a:p>
+            <a:r>
+              <a:rPr lang="en-AU" sz="1100" dirty="0"/>
+              <a:t>Queensland Government. </a:t>
+            </a:r>
+            <a:r>
+              <a:rPr lang="en-US" sz="1100" dirty="0">
+                <a:hlinkClick r:id="rId6"/>
+              </a:rPr>
+              <a:t>https://yoursayhpw.engagementhq.com/understand-qrez/news_feed/central</a:t>
+            </a:r>
+            <a:r>
+              <a:rPr lang="en-US" sz="1100" dirty="0"/>
+              <a:t> . </a:t>
+            </a:r>
+            <a:r>
+              <a:rPr lang="en-AU" sz="1100" dirty="0"/>
+              <a:t>Retrieved October 2022</a:t>
+            </a:r>
+            <a:endParaRPr lang="en-US" sz="1100" dirty="0">
+              <a:hlinkClick r:id="rId4"/>
+            </a:endParaRPr>
+          </a:p>
+          <a:p>
+            <a:r>
+              <a:rPr lang="en-AU" sz="1100" dirty="0">
                 <a:solidFill>
                   <a:srgbClr val="000000"/>
                 </a:solidFill>
                 <a:effectLst/>
               </a:rPr>
-              <a:t>www.bea.gov</a:t>
-            </a:r>
-            <a:r>
-              <a:rPr lang="en-AU" sz="1400" dirty="0">
+              <a:t>Port of Gladstone, “Trade Statistics Data,” </a:t>
+            </a:r>
+            <a:r>
+              <a:rPr lang="en-AU" sz="1100" dirty="0">
+                <a:solidFill>
+                  <a:srgbClr val="000000"/>
+                </a:solidFill>
+                <a:effectLst/>
+                <a:hlinkClick r:id="rId7"/>
+              </a:rPr>
+              <a:t>https://www.gpcl.com.au/trade-statistics</a:t>
+            </a:r>
+            <a:r>
+              <a:rPr lang="en-AU" sz="1100" dirty="0">
                 <a:solidFill>
                   <a:srgbClr val="000000"/>
                 </a:solidFill>
                 <a:effectLst/>
               </a:rPr>
-              <a:t>/news/2003/capital-flows-us-economy-1997</a:t>
-            </a:r>
-          </a:p>
-          <a:p>
-            <a:r>
-              <a:rPr lang="en-AU" sz="1400" dirty="0">
-                <a:solidFill>
-                  <a:srgbClr val="000000"/>
-                </a:solidFill>
-                <a:effectLst/>
-              </a:rPr>
-              <a:t>Port of Gladstone, “Trade Statistics Data,” https://</a:t>
-            </a:r>
-            <a:r>
-              <a:rPr lang="en-AU" sz="1400" dirty="0" err="1">
-                <a:solidFill>
-                  <a:srgbClr val="000000"/>
-                </a:solidFill>
-                <a:effectLst/>
-              </a:rPr>
-              <a:t>www.gpcl.com.au</a:t>
-            </a:r>
-            <a:r>
-              <a:rPr lang="en-AU" sz="1400" dirty="0">
-                <a:solidFill>
-                  <a:srgbClr val="000000"/>
-                </a:solidFill>
-                <a:effectLst/>
-              </a:rPr>
-              <a:t>/trade- statistics, Retrieved April 2020</a:t>
-            </a:r>
-          </a:p>
-          <a:p>
-            <a:r>
-              <a:rPr lang="en-AU" sz="1400" dirty="0">
+              <a:t> . Retrieved April 2020</a:t>
+            </a:r>
+          </a:p>
+          <a:p>
+            <a:r>
+              <a:rPr lang="en-AU" sz="1100" dirty="0">
                 <a:solidFill>
                   <a:srgbClr val="000000"/>
                 </a:solidFill>
@@ -25488,7 +25626,7 @@
               <a:t>Rio Tinto, (2019). </a:t>
             </a:r>
             <a:r>
-              <a:rPr lang="en-AU" sz="1400" i="1" dirty="0">
+              <a:rPr lang="en-AU" sz="1100" i="1" dirty="0">
                 <a:solidFill>
                   <a:srgbClr val="000000"/>
                 </a:solidFill>
@@ -25497,7 +25635,7 @@
               <a:t>Annual Report Production, Reserves and Operations</a:t>
             </a:r>
             <a:r>
-              <a:rPr lang="en-AU" sz="1400" dirty="0">
+              <a:rPr lang="en-AU" sz="1100" dirty="0">
                 <a:solidFill>
                   <a:srgbClr val="000000"/>
                 </a:solidFill>
@@ -25574,7 +25712,7 @@
           <a:p>
             <a:fld id="{0F22F1AF-7FE7-D74B-89B5-5B91D7E9B3CD}" type="slidenum">
               <a:rPr lang="en-US" smtClean="0"/>
-              <a:t>23</a:t>
+              <a:t>21</a:t>
             </a:fld>
             <a:endParaRPr lang="en-US"/>
           </a:p>
@@ -25634,7 +25772,7 @@
         </p:spPr>
         <p:txBody>
           <a:bodyPr>
-            <a:normAutofit fontScale="92500" lnSpcReduction="20000"/>
+            <a:normAutofit fontScale="85000" lnSpcReduction="20000"/>
           </a:bodyPr>
           <a:lstStyle/>
           <a:p>
@@ -25647,7 +25785,15 @@
             </a:r>
             <a:r>
               <a:rPr lang="en-AU" sz="3000" dirty="0"/>
-              <a:t>: energy-abundant &amp; fully integrated Aluminium supply chain </a:t>
+              <a:t>: energy-abundant &amp; </a:t>
+            </a:r>
+            <a:r>
+              <a:rPr lang="en-AU" sz="3000" dirty="0">
+                <a:solidFill>
+                  <a:srgbClr val="7030A0"/>
+                </a:solidFill>
+              </a:rPr>
+              <a:t>fully integrated Aluminium supply chain </a:t>
             </a:r>
           </a:p>
           <a:p>
@@ -25670,8 +25816,64 @@
             </a:r>
             <a:r>
               <a:rPr lang="en-AU" sz="3000" dirty="0"/>
-              <a:t>: Weipa Bauxite is shipped to Gladstone for Alumina refining and Aluminium Smelting at BSL (much of this supply chain is Rio Tinto)</a:t>
-            </a:r>
+              <a:t>: </a:t>
+            </a:r>
+            <a:r>
+              <a:rPr lang="en-AU" sz="3000" dirty="0">
+                <a:solidFill>
+                  <a:srgbClr val="7030A0"/>
+                </a:solidFill>
+              </a:rPr>
+              <a:t>Weipa Bauxite       Gladstone for </a:t>
+            </a:r>
+            <a:r>
+              <a:rPr lang="en-AU" sz="3000" dirty="0" err="1">
+                <a:solidFill>
+                  <a:srgbClr val="7030A0"/>
+                </a:solidFill>
+              </a:rPr>
+              <a:t>AlOx</a:t>
+            </a:r>
+            <a:r>
+              <a:rPr lang="en-AU" sz="3000" dirty="0">
+                <a:solidFill>
+                  <a:srgbClr val="7030A0"/>
+                </a:solidFill>
+              </a:rPr>
+              <a:t> refining and Al smelting at BSL </a:t>
+            </a:r>
+          </a:p>
+          <a:p>
+            <a:pPr lvl="1"/>
+            <a:r>
+              <a:rPr lang="en-AU" sz="2900" dirty="0"/>
+              <a:t>Rio Tinto holds majority stake</a:t>
+            </a:r>
+          </a:p>
+          <a:p>
+            <a:pPr lvl="1"/>
+            <a:r>
+              <a:rPr lang="en-AU" sz="2800" dirty="0"/>
+              <a:t>Gladstone Bauxite imports less than half of Weipa production</a:t>
+            </a:r>
+          </a:p>
+          <a:p>
+            <a:pPr lvl="1"/>
+            <a:r>
+              <a:rPr lang="en-AU" sz="2800" dirty="0"/>
+              <a:t>QAL and Yarwun: Alumina sales to BSL is 15% of total output</a:t>
+            </a:r>
+            <a:endParaRPr lang="en-AU" sz="2800" i="1" dirty="0"/>
+          </a:p>
+          <a:p>
+            <a:pPr marL="457200" lvl="1" indent="0">
+              <a:buNone/>
+            </a:pPr>
+            <a:r>
+              <a:rPr lang="en-AU" sz="2800" i="1" dirty="0"/>
+              <a:t>No obvious major threats to overall supply chain: Rio Tinto is majority owner</a:t>
+            </a:r>
+            <a:endParaRPr lang="en-AU" sz="3000" dirty="0"/>
           </a:p>
           <a:p>
             <a:endParaRPr lang="en-AU" sz="2000" dirty="0"/>
@@ -25686,14 +25888,29 @@
             </a:r>
             <a:r>
               <a:rPr lang="en-AU" sz="3000" dirty="0"/>
-              <a:t>: consumes 1/8 of Qld’s electricity</a:t>
+              <a:t>: </a:t>
+            </a:r>
+            <a:r>
+              <a:rPr lang="en-AU" sz="3000" dirty="0">
+                <a:solidFill>
+                  <a:srgbClr val="7030A0"/>
+                </a:solidFill>
+              </a:rPr>
+              <a:t>consumes 1/8 of Qld’s electricity and large energy subsidy ($250m+)</a:t>
             </a:r>
           </a:p>
           <a:p>
             <a:pPr lvl="1"/>
             <a:r>
               <a:rPr lang="en-AU" sz="2600" dirty="0"/>
-              <a:t>Recent Smelter closures: Kurri Kurri 2012</a:t>
+              <a:t>Like other smelters it is in close proximity of energy sources</a:t>
+            </a:r>
+          </a:p>
+          <a:p>
+            <a:pPr lvl="1"/>
+            <a:r>
+              <a:rPr lang="en-AU" sz="2600" dirty="0"/>
+              <a:t>Recent Smelter closure: Kurri Kurri 2012</a:t>
             </a:r>
           </a:p>
           <a:p>
@@ -25701,31 +25918,6 @@
             <a:r>
               <a:rPr lang="en-AU" sz="2600" dirty="0"/>
               <a:t>Near miss at Tiwai Point, New Zealand in 2020-2021:</a:t>
-            </a:r>
-          </a:p>
-          <a:p>
-            <a:pPr marL="914400" lvl="2" indent="0">
-              <a:buNone/>
-            </a:pPr>
-            <a:r>
-              <a:rPr lang="en-AU" sz="2200" dirty="0"/>
-              <a:t>``Clean’’ aluminium: from hydroelectric power (alumina from Gladstone)</a:t>
-            </a:r>
-          </a:p>
-          <a:p>
-            <a:pPr marL="914400" lvl="2" indent="0">
-              <a:buNone/>
-            </a:pPr>
-            <a:r>
-              <a:rPr lang="en-AU" sz="2200" dirty="0"/>
-              <a:t>Needed a deal to keep it open with reduced price for electricity</a:t>
-            </a:r>
-          </a:p>
-          <a:p>
-            <a:pPr lvl="1"/>
-            <a:r>
-              <a:rPr lang="en-AU" sz="2600" dirty="0"/>
-              <a:t>Subsidies due to high energy prices (and subsidies in other countries)</a:t>
             </a:r>
           </a:p>
           <a:p>
@@ -25786,6 +25978,45 @@
           </a:p>
         </p:txBody>
       </p:sp>
+      <p:pic>
+        <p:nvPicPr>
+          <p:cNvPr id="6" name="Graphic 5" descr="Tug boat with solid fill">
+            <a:extLst>
+              <a:ext uri="{FF2B5EF4-FFF2-40B4-BE49-F238E27FC236}">
+                <a16:creationId xmlns:a16="http://schemas.microsoft.com/office/drawing/2014/main" id="{8EFBF20E-708C-0460-CC1D-64E1A43DFB26}"/>
+              </a:ext>
+            </a:extLst>
+          </p:cNvPr>
+          <p:cNvPicPr>
+            <a:picLocks noChangeAspect="1"/>
+          </p:cNvPicPr>
+          <p:nvPr/>
+        </p:nvPicPr>
+        <p:blipFill>
+          <a:blip r:embed="rId4">
+            <a:extLst>
+              <a:ext uri="{28A0092B-C50C-407E-A947-70E740481C1C}">
+                <a14:useLocalDpi xmlns:a14="http://schemas.microsoft.com/office/drawing/2010/main" val="0"/>
+              </a:ext>
+              <a:ext uri="{96DAC541-7B7A-43D3-8B79-37D633B846F1}">
+                <asvg:svgBlip xmlns:asvg="http://schemas.microsoft.com/office/drawing/2016/SVG/main" r:embed="rId5"/>
+              </a:ext>
+            </a:extLst>
+          </a:blip>
+          <a:stretch>
+            <a:fillRect/>
+          </a:stretch>
+        </p:blipFill>
+        <p:spPr>
+          <a:xfrm>
+            <a:off x="3616571" y="1758457"/>
+            <a:ext cx="281354" cy="334109"/>
+          </a:xfrm>
+          <a:prstGeom prst="rect">
+            <a:avLst/>
+          </a:prstGeom>
+        </p:spPr>
+      </p:pic>
     </p:spTree>
     <p:extLst>
       <p:ext uri="{BB962C8B-B14F-4D97-AF65-F5344CB8AC3E}">
@@ -25936,184 +26167,166 @@
         </p:spPr>
         <p:txBody>
           <a:bodyPr>
-            <a:normAutofit fontScale="92500" lnSpcReduction="10000"/>
+            <a:normAutofit fontScale="92500"/>
           </a:bodyPr>
           <a:lstStyle/>
           <a:p>
+            <a:pPr lvl="1"/>
+            <a:endParaRPr lang="en-AU" dirty="0"/>
+          </a:p>
+          <a:p>
+            <a:pPr marL="0" indent="0">
+              <a:buNone/>
+            </a:pPr>
+            <a:r>
+              <a:rPr lang="en-AU" dirty="0"/>
+              <a:t>Gladstone (</a:t>
+            </a:r>
             <a:r>
               <a:rPr lang="en-AU" sz="2800" dirty="0"/>
-              <a:t>Central Qld: the energy powerhouse of Qld: 4600MW (but coal-fired)</a:t>
+              <a:t>2018-19 economy, SA3/LGA):</a:t>
+            </a:r>
+          </a:p>
+          <a:p>
+            <a:pPr marL="457200" lvl="1" indent="0">
+              <a:buNone/>
+            </a:pPr>
+            <a:r>
+              <a:rPr lang="en-AU" dirty="0"/>
+              <a:t>$15.5bn aggregate output: approx. 25% of Central Qld, 2% Qld</a:t>
+            </a:r>
+          </a:p>
+          <a:p>
+            <a:pPr marL="457200" lvl="1" indent="0">
+              <a:buNone/>
+            </a:pPr>
+            <a:r>
+              <a:rPr lang="en-AU" dirty="0"/>
+              <a:t>29k FTE: approx. 28% of Central Qld,  1.3% of Qld </a:t>
+            </a:r>
+          </a:p>
+          <a:p>
+            <a:pPr marL="457200" lvl="1" indent="0">
+              <a:buNone/>
+            </a:pPr>
+            <a:r>
+              <a:rPr lang="en-AU" dirty="0"/>
+              <a:t>63k population: highly skilled, but aging with 0.7% growth</a:t>
             </a:r>
           </a:p>
           <a:p>
             <a:pPr lvl="1"/>
+            <a:r>
+              <a:rPr lang="en-AU" b="0" dirty="0">
+                <a:effectLst/>
+              </a:rPr>
+              <a:t>Multi-commodity deep-water port plus rail and road infrastructure</a:t>
+            </a:r>
+          </a:p>
+          <a:p>
+            <a:pPr lvl="1"/>
+            <a:endParaRPr lang="en-AU" sz="2800" dirty="0"/>
+          </a:p>
+          <a:p>
+            <a:pPr marL="0" indent="0">
+              <a:buNone/>
+            </a:pPr>
+            <a:r>
+              <a:rPr lang="en-AU" dirty="0"/>
+              <a:t>Gladstone is Qld’s regional m</a:t>
+            </a:r>
+            <a:r>
+              <a:rPr lang="en-AU" sz="2800" dirty="0"/>
+              <a:t>anufacturing hub:</a:t>
+            </a:r>
+            <a:endParaRPr lang="en-AU" sz="2800" dirty="0">
+              <a:effectLst/>
+            </a:endParaRPr>
+          </a:p>
+          <a:p>
+            <a:pPr marL="457200" lvl="1" indent="0">
+              <a:buNone/>
+            </a:pPr>
+            <a:r>
+              <a:rPr lang="en-AU" dirty="0"/>
+              <a:t>$5.5bn to $6bn Manufacturing output: of which approx. $1bn is BSL</a:t>
+            </a:r>
+          </a:p>
+          <a:p>
+            <a:pPr marL="457200" lvl="1" indent="0">
+              <a:buNone/>
+            </a:pPr>
+            <a:r>
+              <a:rPr lang="en-AU" dirty="0"/>
+              <a:t>4k to 4.5k Manufacturing FTE employees: of which 1k at </a:t>
+            </a:r>
+            <a:r>
+              <a:rPr lang="en-AU" b="1" dirty="0"/>
+              <a:t>BSL</a:t>
+            </a:r>
+          </a:p>
+          <a:p>
+            <a:pPr lvl="1"/>
+            <a:r>
+              <a:rPr lang="en-AU" b="1" dirty="0">
+                <a:solidFill>
+                  <a:srgbClr val="7030A0"/>
+                </a:solidFill>
+              </a:rPr>
+              <a:t>BSL represents approx. ¼ of Manufacturing </a:t>
+            </a:r>
+            <a:r>
+              <a:rPr lang="en-AU" dirty="0">
+                <a:solidFill>
+                  <a:srgbClr val="7030A0"/>
+                </a:solidFill>
+              </a:rPr>
+              <a:t>activity except in energy consumption</a:t>
+            </a:r>
+          </a:p>
+          <a:p>
+            <a:pPr marL="457200" lvl="1" indent="0">
+              <a:buNone/>
+            </a:pPr>
+            <a:r>
+              <a:rPr lang="en-AU" dirty="0"/>
+              <a:t>Other Heavy industry: Ammonia, Cement, LNG, Oil refinery</a:t>
+            </a:r>
+          </a:p>
+          <a:p>
+            <a:pPr marL="457200" lvl="1" indent="0">
+              <a:buNone/>
+            </a:pPr>
             <a:r>
               <a:rPr lang="en-AU" b="1" dirty="0">
                 <a:hlinkClick r:id="rId3"/>
               </a:rPr>
-              <a:t>C</a:t>
+              <a:t>Growth</a:t>
             </a:r>
             <a:r>
               <a:rPr lang="en-AU" b="1" dirty="0">
                 <a:effectLst/>
                 <a:hlinkClick r:id="rId3"/>
               </a:rPr>
-              <a:t>entral QREZ</a:t>
-            </a:r>
-            <a:r>
-              <a:rPr lang="en-AU" dirty="0"/>
-              <a:t>: Qld Energy plans for renewables</a:t>
-            </a:r>
-          </a:p>
-          <a:p>
-            <a:pPr lvl="1"/>
-            <a:endParaRPr lang="en-AU" dirty="0"/>
-          </a:p>
-          <a:p>
-            <a:r>
-              <a:rPr lang="en-AU" dirty="0"/>
-              <a:t>Gladstone (</a:t>
-            </a:r>
-            <a:r>
-              <a:rPr lang="en-AU" sz="2800" dirty="0"/>
-              <a:t>2018-19 economy, SA3/LGA), Central Qld</a:t>
-            </a:r>
-          </a:p>
-          <a:p>
-            <a:pPr marL="457200" lvl="1" indent="0">
-              <a:buNone/>
-            </a:pPr>
-            <a:r>
-              <a:rPr lang="en-AU" b="1" dirty="0"/>
-              <a:t>$15.5bn aggregate output: </a:t>
-            </a:r>
-            <a:r>
-              <a:rPr lang="en-AU" dirty="0"/>
-              <a:t>approx. 25% of Central Qld, 2% Qld</a:t>
-            </a:r>
-          </a:p>
-          <a:p>
-            <a:pPr marL="457200" lvl="1" indent="0">
-              <a:buNone/>
-            </a:pPr>
-            <a:r>
-              <a:rPr lang="en-AU" b="1" dirty="0"/>
-              <a:t>29k FTE:</a:t>
-            </a:r>
-            <a:r>
-              <a:rPr lang="en-AU" dirty="0"/>
-              <a:t> approx. 28% of Central Qld,  1.3% of Qld </a:t>
-            </a:r>
-          </a:p>
-          <a:p>
-            <a:pPr marL="457200" lvl="1" indent="0">
-              <a:buNone/>
-            </a:pPr>
-            <a:r>
-              <a:rPr lang="en-AU" b="1" dirty="0"/>
-              <a:t>63k population: </a:t>
-            </a:r>
-            <a:r>
-              <a:rPr lang="en-AU" dirty="0"/>
-              <a:t>highly skilled, but aging with 0.7% growth</a:t>
-            </a:r>
-          </a:p>
-          <a:p>
-            <a:pPr lvl="1"/>
+              <a:t> industries</a:t>
+            </a:r>
             <a:r>
               <a:rPr lang="en-AU" b="0" dirty="0">
                 <a:effectLst/>
               </a:rPr>
-              <a:t>Multi-commodity deep-water port plus rail and road infrastructure</a:t>
-            </a:r>
-          </a:p>
-          <a:p>
-            <a:pPr lvl="1"/>
-            <a:endParaRPr lang="en-AU" sz="2800" dirty="0"/>
-          </a:p>
-          <a:p>
-            <a:r>
-              <a:rPr lang="en-AU" dirty="0"/>
-              <a:t>Gladstone is Qld’s regional m</a:t>
-            </a:r>
-            <a:r>
-              <a:rPr lang="en-AU" sz="2800" dirty="0"/>
-              <a:t>anufacturing hub:</a:t>
-            </a:r>
-            <a:endParaRPr lang="en-AU" sz="2800" dirty="0">
-              <a:effectLst/>
-            </a:endParaRPr>
-          </a:p>
-          <a:p>
-            <a:pPr marL="457200" lvl="1" indent="0">
-              <a:buNone/>
-            </a:pPr>
-            <a:r>
-              <a:rPr lang="en-AU" b="1" dirty="0"/>
-              <a:t>$5.5bn to $6bn Manufacturing output:</a:t>
-            </a:r>
-            <a:r>
-              <a:rPr lang="en-AU" dirty="0"/>
-              <a:t> of which approx. $1bn is </a:t>
-            </a:r>
-            <a:r>
-              <a:rPr lang="en-AU" b="1" dirty="0"/>
-              <a:t>BSL</a:t>
-            </a:r>
-            <a:endParaRPr lang="en-AU" dirty="0"/>
-          </a:p>
-          <a:p>
-            <a:pPr marL="457200" lvl="1" indent="0">
-              <a:buNone/>
-            </a:pPr>
-            <a:r>
-              <a:rPr lang="en-AU" b="1" dirty="0"/>
-              <a:t>4k to 4.5k Manufacturing FTE employees:</a:t>
-            </a:r>
-            <a:r>
-              <a:rPr lang="en-AU" dirty="0"/>
-              <a:t> of which 1k at </a:t>
-            </a:r>
-            <a:r>
-              <a:rPr lang="en-AU" b="1" dirty="0"/>
-              <a:t>BSL</a:t>
-            </a:r>
-          </a:p>
-          <a:p>
-            <a:pPr marL="457200" lvl="1" indent="0">
-              <a:buNone/>
-            </a:pPr>
-            <a:r>
-              <a:rPr lang="en-AU" b="1" dirty="0"/>
-              <a:t>Other Heavy industry</a:t>
-            </a:r>
-            <a:r>
-              <a:rPr lang="en-AU" dirty="0"/>
-              <a:t>: Ammonia, Cement, LNG, Oil refinery</a:t>
-            </a:r>
-          </a:p>
-          <a:p>
-            <a:pPr marL="457200" lvl="1" indent="0">
-              <a:buNone/>
-            </a:pPr>
-            <a:r>
-              <a:rPr lang="en-AU" b="1" dirty="0">
-                <a:hlinkClick r:id="rId4"/>
+              <a:t>: ag-tech, </a:t>
+            </a:r>
+            <a:r>
+              <a:rPr lang="en-AU" b="0" dirty="0" err="1">
+                <a:effectLst/>
               </a:rPr>
-              <a:t>Growth</a:t>
-            </a:r>
-            <a:r>
-              <a:rPr lang="en-AU" b="1" dirty="0">
-                <a:effectLst/>
-                <a:hlinkClick r:id="rId4"/>
-              </a:rPr>
-              <a:t> industries</a:t>
+              <a:t>AlOx</a:t>
             </a:r>
             <a:r>
               <a:rPr lang="en-AU" b="0" dirty="0">
                 <a:effectLst/>
               </a:rPr>
-              <a:t>: ag-tech, alumina </a:t>
+              <a:t> </a:t>
             </a:r>
             <a:r>
               <a:rPr lang="en-AU" dirty="0"/>
@@ -26157,6 +26370,81 @@
           </a:p>
         </p:txBody>
       </p:sp>
+      <p:pic>
+        <p:nvPicPr>
+          <p:cNvPr id="5" name="Picture 4" descr="Map&#10;&#10;Description automatically generated">
+            <a:extLst>
+              <a:ext uri="{FF2B5EF4-FFF2-40B4-BE49-F238E27FC236}">
+                <a16:creationId xmlns:a16="http://schemas.microsoft.com/office/drawing/2014/main" id="{1959A6CE-BE3C-3C73-002A-DB4A16803B48}"/>
+              </a:ext>
+            </a:extLst>
+          </p:cNvPr>
+          <p:cNvPicPr>
+            <a:picLocks noChangeAspect="1"/>
+          </p:cNvPicPr>
+          <p:nvPr/>
+        </p:nvPicPr>
+        <p:blipFill>
+          <a:blip r:embed="rId4">
+            <a:extLst>
+              <a:ext uri="{28A0092B-C50C-407E-A947-70E740481C1C}">
+                <a14:useLocalDpi xmlns:a14="http://schemas.microsoft.com/office/drawing/2010/main" val="0"/>
+              </a:ext>
+            </a:extLst>
+          </a:blip>
+          <a:stretch>
+            <a:fillRect/>
+          </a:stretch>
+        </p:blipFill>
+        <p:spPr>
+          <a:xfrm>
+            <a:off x="8761095" y="811530"/>
+            <a:ext cx="2604136" cy="1886771"/>
+          </a:xfrm>
+          <a:prstGeom prst="rect">
+            <a:avLst/>
+          </a:prstGeom>
+        </p:spPr>
+      </p:pic>
+      <p:pic>
+        <p:nvPicPr>
+          <p:cNvPr id="7" name="Graphic 6" descr="Factory with solid fill">
+            <a:extLst>
+              <a:ext uri="{FF2B5EF4-FFF2-40B4-BE49-F238E27FC236}">
+                <a16:creationId xmlns:a16="http://schemas.microsoft.com/office/drawing/2014/main" id="{4C6D665F-BE8F-F935-6785-DF5040D1FFF2}"/>
+              </a:ext>
+            </a:extLst>
+          </p:cNvPr>
+          <p:cNvPicPr>
+            <a:picLocks noChangeAspect="1"/>
+          </p:cNvPicPr>
+          <p:nvPr/>
+        </p:nvPicPr>
+        <p:blipFill>
+          <a:blip r:embed="rId5">
+            <a:extLst>
+              <a:ext uri="{28A0092B-C50C-407E-A947-70E740481C1C}">
+                <a14:useLocalDpi xmlns:a14="http://schemas.microsoft.com/office/drawing/2010/main" val="0"/>
+              </a:ext>
+              <a:ext uri="{96DAC541-7B7A-43D3-8B79-37D633B846F1}">
+                <asvg:svgBlip xmlns:asvg="http://schemas.microsoft.com/office/drawing/2016/SVG/main" r:embed="rId6"/>
+              </a:ext>
+            </a:extLst>
+          </a:blip>
+          <a:stretch>
+            <a:fillRect/>
+          </a:stretch>
+        </p:blipFill>
+        <p:spPr>
+          <a:xfrm>
+            <a:off x="9525000" y="3742654"/>
+            <a:ext cx="914400" cy="914400"/>
+          </a:xfrm>
+          <a:prstGeom prst="rect">
+            <a:avLst/>
+          </a:prstGeom>
+        </p:spPr>
+      </p:pic>
     </p:spTree>
     <p:extLst>
       <p:ext uri="{BB962C8B-B14F-4D97-AF65-F5344CB8AC3E}">
@@ -26217,38 +26505,98 @@
           <a:p>
             <a:pPr algn="ctr"/>
             <a:r>
+              <a:rPr lang="en-AU" sz="3200" dirty="0">
+                <a:solidFill>
+                  <a:srgbClr val="7030A0"/>
+                </a:solidFill>
+              </a:rPr>
+              <a:t>E</a:t>
+            </a:r>
+            <a:r>
               <a:rPr lang="en-AU" sz="3200" dirty="0"/>
-              <a:t>Computable General </a:t>
-            </a:r>
-            <a:r>
-              <a:rPr lang="en-AU" sz="3200" dirty="0" err="1"/>
-              <a:t>Eq’m</a:t>
+              <a:t>conomic </a:t>
+            </a:r>
+            <a:r>
+              <a:rPr lang="en-AU" sz="3200" dirty="0">
+                <a:solidFill>
+                  <a:srgbClr val="7030A0"/>
+                </a:solidFill>
+              </a:rPr>
+              <a:t>M</a:t>
+            </a:r>
+            <a:r>
+              <a:rPr lang="en-AU" sz="3200" dirty="0"/>
+              <a:t>odelling</a:t>
             </a:r>
             <a:br>
-              <a:rPr lang="en-AU" sz="3200"/>
+              <a:rPr lang="en-AU" sz="3200" dirty="0"/>
             </a:br>
             <a:r>
-              <a:rPr lang="en-AU" sz="3200"/>
-              <a:t>with </a:t>
+              <a:rPr lang="en-AU" sz="3200" dirty="0"/>
+              <a:t>with</a:t>
             </a:r>
             <a:br>
-              <a:rPr lang="en-AU" sz="3200"/>
+              <a:rPr lang="en-AU" sz="3200" dirty="0"/>
             </a:br>
             <a:r>
-              <a:rPr lang="en-AU" sz="3200"/>
-              <a:t>Inter-temporal, Sectoral Euler Equations</a:t>
+              <a:rPr lang="en-AU" sz="3200" dirty="0">
+                <a:solidFill>
+                  <a:srgbClr val="7030A0"/>
+                </a:solidFill>
+              </a:rPr>
+              <a:t>S</a:t>
+            </a:r>
+            <a:r>
+              <a:rPr lang="en-AU" sz="3200" dirty="0"/>
+              <a:t>ector-specific </a:t>
+            </a:r>
+            <a:r>
+              <a:rPr lang="en-AU" sz="3200" dirty="0">
+                <a:solidFill>
+                  <a:srgbClr val="7030A0"/>
+                </a:solidFill>
+              </a:rPr>
+              <a:t>E</a:t>
+            </a:r>
+            <a:r>
+              <a:rPr lang="en-AU" sz="3200" dirty="0"/>
+              <a:t>uler </a:t>
+            </a:r>
+            <a:r>
+              <a:rPr lang="en-AU" sz="3200" dirty="0">
+                <a:solidFill>
+                  <a:srgbClr val="7030A0"/>
+                </a:solidFill>
+              </a:rPr>
+              <a:t>E</a:t>
+            </a:r>
+            <a:r>
+              <a:rPr lang="en-AU" sz="3200" dirty="0"/>
+              <a:t>quations</a:t>
             </a:r>
             <a:br>
-              <a:rPr lang="en-AU" sz="3200"/>
+              <a:rPr lang="en-AU" sz="3200" dirty="0"/>
             </a:br>
             <a:br>
-              <a:rPr lang="en-AU"/>
+              <a:rPr lang="en-AU" dirty="0"/>
             </a:br>
             <a:r>
-              <a:rPr lang="en-AU"/>
-              <a:t>Model overview</a:t>
-            </a:r>
-            <a:endParaRPr lang="en-US"/>
+              <a:rPr lang="en-AU" dirty="0"/>
+              <a:t>``</a:t>
+            </a:r>
+            <a:r>
+              <a:rPr lang="en-AU" dirty="0" err="1">
+                <a:solidFill>
+                  <a:srgbClr val="7030A0"/>
+                </a:solidFill>
+              </a:rPr>
+              <a:t>emsee</a:t>
+            </a:r>
+            <a:r>
+              <a:rPr lang="en-AU" dirty="0"/>
+              <a:t>’’ model overview</a:t>
+            </a:r>
+            <a:endParaRPr lang="en-US" dirty="0"/>
           </a:p>
         </p:txBody>
       </p:sp>
@@ -26281,6 +26629,42 @@
           </a:p>
         </p:txBody>
       </p:sp>
+      <p:pic>
+        <p:nvPicPr>
+          <p:cNvPr id="8" name="Picture 7" descr="A picture containing icon&#10;&#10;Description automatically generated">
+            <a:extLst>
+              <a:ext uri="{FF2B5EF4-FFF2-40B4-BE49-F238E27FC236}">
+                <a16:creationId xmlns:a16="http://schemas.microsoft.com/office/drawing/2014/main" id="{ECD5B40C-78BA-0BBE-6F80-3789CE897073}"/>
+              </a:ext>
+            </a:extLst>
+          </p:cNvPr>
+          <p:cNvPicPr>
+            <a:picLocks noChangeAspect="1"/>
+          </p:cNvPicPr>
+          <p:nvPr/>
+        </p:nvPicPr>
+        <p:blipFill>
+          <a:blip r:embed="rId3">
+            <a:extLst>
+              <a:ext uri="{28A0092B-C50C-407E-A947-70E740481C1C}">
+                <a14:useLocalDpi xmlns:a14="http://schemas.microsoft.com/office/drawing/2010/main" val="0"/>
+              </a:ext>
+            </a:extLst>
+          </a:blip>
+          <a:stretch>
+            <a:fillRect/>
+          </a:stretch>
+        </p:blipFill>
+        <p:spPr>
+          <a:xfrm>
+            <a:off x="5011158" y="5214620"/>
+            <a:ext cx="2169684" cy="894715"/>
+          </a:xfrm>
+          <a:prstGeom prst="rect">
+            <a:avLst/>
+          </a:prstGeom>
+        </p:spPr>
+      </p:pic>
     </p:spTree>
     <p:extLst>
       <p:ext uri="{BB962C8B-B14F-4D97-AF65-F5344CB8AC3E}">
@@ -26329,13 +26713,13 @@
         </p:nvSpPr>
         <p:spPr>
           <a:xfrm>
-            <a:off x="838200" y="708758"/>
-            <a:ext cx="10515600" cy="5440484"/>
+            <a:off x="838200" y="835862"/>
+            <a:ext cx="10515600" cy="5313379"/>
           </a:xfrm>
         </p:spPr>
         <p:txBody>
           <a:bodyPr>
-            <a:normAutofit fontScale="77500" lnSpcReduction="20000"/>
+            <a:normAutofit fontScale="70000" lnSpcReduction="20000"/>
           </a:bodyPr>
           <a:lstStyle/>
           <a:p>
@@ -26343,12 +26727,16 @@
               <a:buNone/>
             </a:pPr>
             <a:r>
-              <a:rPr lang="en-AU" sz="3300" i="1" dirty="0"/>
-              <a:t>Forward-looking dynamics</a:t>
+              <a:rPr lang="en-AU" sz="3300" i="1" dirty="0">
+                <a:solidFill>
+                  <a:srgbClr val="7030A0"/>
+                </a:solidFill>
+              </a:rPr>
+              <a:t>CGE model with forward-looking dynamics</a:t>
             </a:r>
             <a:r>
               <a:rPr lang="en-AU" sz="3300" dirty="0"/>
-              <a:t>: for 19 ANZSIC divisions in the Gladstone region:</a:t>
+              <a:t>: 19 ANZSIC divisions, Gladstone region:</a:t>
             </a:r>
           </a:p>
           <a:p>
@@ -26407,6 +26795,40 @@
             </a:r>
           </a:p>
           <a:p>
+            <a:pPr marL="457200" lvl="1" indent="0">
+              <a:buNone/>
+            </a:pPr>
+            <a:r>
+              <a:rPr lang="en-AU" sz="2900" b="1" dirty="0"/>
+              <a:t>Balanced growth paths: </a:t>
+            </a:r>
+            <a:r>
+              <a:rPr lang="en-AU" sz="2500" dirty="0"/>
+              <a:t>each sector grows in range 1% to 2%</a:t>
+            </a:r>
+          </a:p>
+          <a:p>
+            <a:pPr marL="457200" lvl="1" indent="0">
+              <a:buNone/>
+            </a:pPr>
+            <a:r>
+              <a:rPr lang="en-AU" sz="2900" b="1" dirty="0"/>
+              <a:t>Solve as a sequence of overlapping nonlinear dynamic programs</a:t>
+            </a:r>
+          </a:p>
+          <a:p>
+            <a:pPr lvl="1"/>
+            <a:endParaRPr lang="en-AU" sz="2800" dirty="0"/>
+          </a:p>
+          <a:p>
+            <a:pPr lvl="1"/>
+            <a:endParaRPr lang="en-AU" sz="2800" dirty="0"/>
+          </a:p>
+          <a:p>
+            <a:pPr lvl="1"/>
+            <a:endParaRPr lang="en-AU" sz="2800" dirty="0"/>
+          </a:p>
+          <a:p>
             <a:pPr lvl="1"/>
             <a:endParaRPr lang="en-AU" sz="2800" dirty="0"/>
           </a:p>
@@ -26415,159 +26837,144 @@
               <a:buNone/>
             </a:pPr>
             <a:r>
-              <a:rPr lang="en-AU" sz="3300" i="1" dirty="0"/>
-              <a:t>Balanced growth paths</a:t>
-            </a:r>
-            <a:r>
-              <a:rPr lang="en-AU" sz="3300" dirty="0"/>
-              <a:t>: via technological growth and optimisation</a:t>
-            </a:r>
-            <a:endParaRPr lang="en-AU" sz="3300" i="1" dirty="0"/>
+              <a:rPr lang="en-AU" sz="3600" i="1" dirty="0">
+                <a:solidFill>
+                  <a:srgbClr val="7030A0"/>
+                </a:solidFill>
+              </a:rPr>
+              <a:t>Sector-specific Euler Eq’ns</a:t>
+            </a:r>
+            <a:r>
+              <a:rPr lang="en-AU" sz="3600" dirty="0"/>
+              <a:t>:</a:t>
+            </a:r>
           </a:p>
           <a:p>
             <a:pPr marL="457200" lvl="1" indent="0">
               <a:buNone/>
             </a:pPr>
             <a:r>
-              <a:rPr lang="en-AU" sz="2800" b="1" dirty="0"/>
-              <a:t>Growth rate</a:t>
-            </a:r>
-            <a:r>
-              <a:rPr lang="en-AU" sz="2800" dirty="0"/>
-              <a:t> is similar for output and capital: each sector grows in range 1% to 2%</a:t>
-            </a:r>
-            <a:endParaRPr lang="en-AU" sz="2800" b="1" dirty="0"/>
-          </a:p>
-          <a:p>
-            <a:pPr marL="457200" lvl="1" indent="0">
-              <a:buNone/>
-            </a:pPr>
-            <a:r>
-              <a:rPr lang="en-AU" sz="2800" b="1" dirty="0"/>
-              <a:t>Technological progress</a:t>
-            </a:r>
-            <a:r>
-              <a:rPr lang="en-AU" sz="2800" dirty="0"/>
-              <a:t> is fixed-factor augmenting </a:t>
-            </a:r>
-            <a:r>
-              <a:rPr lang="en-AU" sz="3200" dirty="0"/>
-              <a:t> </a:t>
+              <a:rPr lang="en-AU" sz="2900" b="1" dirty="0"/>
+              <a:t>Testable condition</a:t>
+            </a:r>
+            <a:r>
+              <a:rPr lang="en-AU" sz="2900" dirty="0"/>
+              <a:t>:    ``value capital today’’     =    ``</a:t>
+            </a:r>
+            <a:r>
+              <a:rPr lang="en-AU" sz="2900" b="1" dirty="0"/>
+              <a:t>expected value </a:t>
+            </a:r>
+            <a:r>
+              <a:rPr lang="en-AU" sz="2900" dirty="0"/>
+              <a:t>of capital in the future’’</a:t>
             </a:r>
           </a:p>
           <a:p>
             <a:pPr lvl="1"/>
-            <a:endParaRPr lang="en-AU" sz="2800" dirty="0"/>
+            <a:r>
+              <a:rPr lang="en-AU" sz="2900" b="1" dirty="0">
+                <a:solidFill>
+                  <a:srgbClr val="7030A0"/>
+                </a:solidFill>
+              </a:rPr>
+              <a:t>When the SEE hold</a:t>
+            </a:r>
+            <a:r>
+              <a:rPr lang="en-AU" sz="2900" dirty="0">
+                <a:solidFill>
+                  <a:srgbClr val="7030A0"/>
+                </a:solidFill>
+              </a:rPr>
+              <a:t>, capital is optimally allocated across sectors</a:t>
+            </a:r>
+          </a:p>
+          <a:p>
+            <a:pPr lvl="1"/>
+            <a:r>
+              <a:rPr lang="en-AU" sz="2900" dirty="0"/>
+              <a:t>Absent in intersectoral models: </a:t>
+            </a:r>
+            <a:r>
+              <a:rPr lang="en-AU" sz="2900" dirty="0" err="1"/>
+              <a:t>CoPS</a:t>
+            </a:r>
+            <a:r>
+              <a:rPr lang="en-AU" sz="2900" dirty="0"/>
+              <a:t>; </a:t>
+            </a:r>
+            <a:r>
+              <a:rPr lang="en-AU" sz="2900" dirty="0" err="1"/>
+              <a:t>Atalay</a:t>
+            </a:r>
+            <a:r>
+              <a:rPr lang="en-AU" sz="2900" dirty="0"/>
+              <a:t>; </a:t>
+            </a:r>
+            <a:r>
+              <a:rPr lang="en-AU" sz="2900" dirty="0" err="1"/>
+              <a:t>Cesa</a:t>
+            </a:r>
+            <a:r>
+              <a:rPr lang="en-AU" sz="2900" dirty="0"/>
+              <a:t>-Bianchi et al; </a:t>
+            </a:r>
+            <a:r>
+              <a:rPr lang="en-AU" sz="2900" dirty="0" err="1"/>
+              <a:t>Baqaee</a:t>
+            </a:r>
+            <a:r>
+              <a:rPr lang="en-AU" sz="2900" dirty="0"/>
+              <a:t> and Farhi</a:t>
+            </a:r>
+          </a:p>
+          <a:p>
+            <a:pPr lvl="1"/>
+            <a:endParaRPr lang="en-AU" sz="2800" i="1" dirty="0"/>
           </a:p>
           <a:p>
             <a:pPr marL="0" indent="0">
               <a:buNone/>
             </a:pPr>
             <a:r>
-              <a:rPr lang="en-AU" sz="3600" i="1" dirty="0"/>
-              <a:t>Euler eq’ns</a:t>
-            </a:r>
-            <a:r>
-              <a:rPr lang="en-AU" sz="3600" dirty="0"/>
-              <a:t>: </a:t>
-            </a:r>
-            <a:r>
-              <a:rPr lang="en-AU" sz="3300" dirty="0"/>
-              <a:t>novel application at the </a:t>
-            </a:r>
-            <a:r>
-              <a:rPr lang="en-AU" sz="3300" i="1" dirty="0"/>
-              <a:t>sectoral</a:t>
-            </a:r>
-            <a:r>
-              <a:rPr lang="en-AU" sz="3300" dirty="0"/>
-              <a:t> level</a:t>
-            </a:r>
-          </a:p>
-          <a:p>
-            <a:pPr marL="457200" lvl="1" indent="0">
-              <a:buNone/>
-            </a:pPr>
-            <a:r>
-              <a:rPr lang="en-AU" sz="2800" b="1" dirty="0"/>
-              <a:t>Testable</a:t>
-            </a:r>
+              <a:rPr lang="en-AU" sz="3400" i="1" dirty="0">
+                <a:solidFill>
+                  <a:srgbClr val="7030A0"/>
+                </a:solidFill>
+              </a:rPr>
+              <a:t>Transition to net zero: </a:t>
+            </a:r>
+            <a:r>
+              <a:rPr lang="en-AU" sz="3400" dirty="0">
+                <a:solidFill>
+                  <a:srgbClr val="7030A0"/>
+                </a:solidFill>
+              </a:rPr>
+              <a:t>the </a:t>
+            </a:r>
+            <a:r>
+              <a:rPr lang="en-AU" sz="3600" dirty="0">
+                <a:solidFill>
+                  <a:srgbClr val="7030A0"/>
+                </a:solidFill>
+              </a:rPr>
+              <a:t>SEE are unlikely to hold, but nonetheless important:</a:t>
+            </a:r>
+            <a:endParaRPr lang="en-AU" sz="3400" i="1" dirty="0"/>
+          </a:p>
+          <a:p>
+            <a:pPr lvl="1"/>
             <a:r>
               <a:rPr lang="en-AU" sz="2800" dirty="0"/>
-              <a:t>: ``value capital today’’ = ``</a:t>
-            </a:r>
-            <a:r>
-              <a:rPr lang="en-AU" sz="2800" b="1" dirty="0"/>
-              <a:t>expected value </a:t>
-            </a:r>
+              <a:t>sectoral shocks are more likely to spill over/propagate to other sectors</a:t>
+            </a:r>
+          </a:p>
+          <a:p>
+            <a:pPr lvl="1"/>
             <a:r>
               <a:rPr lang="en-AU" sz="2800" dirty="0"/>
-              <a:t>of capital in the future’’</a:t>
-            </a:r>
-          </a:p>
-          <a:p>
-            <a:pPr lvl="1"/>
-            <a:r>
-              <a:rPr lang="en-AU" sz="2800" dirty="0"/>
-              <a:t>We tend to smooth consumption across time</a:t>
-            </a:r>
-          </a:p>
-          <a:p>
-            <a:pPr lvl="1"/>
-            <a:r>
-              <a:rPr lang="en-AU" sz="2800" dirty="0"/>
-              <a:t>Absent in intersectoral models: </a:t>
-            </a:r>
-            <a:r>
-              <a:rPr lang="en-AU" sz="2800" dirty="0" err="1"/>
-              <a:t>CoPS</a:t>
-            </a:r>
-            <a:r>
-              <a:rPr lang="en-AU" sz="2800" dirty="0"/>
-              <a:t>; </a:t>
-            </a:r>
-            <a:r>
-              <a:rPr lang="en-AU" sz="2800" dirty="0" err="1"/>
-              <a:t>Atalay</a:t>
-            </a:r>
-            <a:r>
-              <a:rPr lang="en-AU" sz="2800" dirty="0"/>
-              <a:t>; </a:t>
-            </a:r>
-            <a:r>
-              <a:rPr lang="en-AU" sz="2800" dirty="0" err="1"/>
-              <a:t>Cesa</a:t>
-            </a:r>
-            <a:r>
-              <a:rPr lang="en-AU" sz="2800" dirty="0"/>
-              <a:t>-Bianchi et al; </a:t>
-            </a:r>
-            <a:r>
-              <a:rPr lang="en-AU" sz="2800" dirty="0" err="1"/>
-              <a:t>Baqaee</a:t>
-            </a:r>
-            <a:r>
-              <a:rPr lang="en-AU" sz="2800" dirty="0"/>
-              <a:t> and Farhi</a:t>
-            </a:r>
-          </a:p>
-          <a:p>
-            <a:pPr lvl="1"/>
-            <a:endParaRPr lang="en-AU" sz="2800" i="1" dirty="0"/>
-          </a:p>
-          <a:p>
-            <a:pPr marL="0" indent="0">
-              <a:buNone/>
-            </a:pPr>
-            <a:r>
-              <a:rPr lang="en-AU" sz="3200" dirty="0"/>
-              <a:t>Transition to net zero: Euler eq’ns unlikely to hold, but important implications for whether shock propagate and economy can transform.</a:t>
-            </a:r>
-            <a:endParaRPr lang="en-AU" sz="2400" dirty="0"/>
-          </a:p>
-          <a:p>
-            <a:pPr lvl="1"/>
-            <a:endParaRPr lang="en-AU" i="1" dirty="0"/>
+              <a:t>the economy has more capacity for adaptation: chance to nudge economy to new equilibria</a:t>
+            </a:r>
           </a:p>
         </p:txBody>
       </p:sp>
@@ -26600,6 +27007,42 @@
           </a:p>
         </p:txBody>
       </p:sp>
+      <p:pic>
+        <p:nvPicPr>
+          <p:cNvPr id="5" name="Picture 4" descr="A picture containing icon&#10;&#10;Description automatically generated">
+            <a:extLst>
+              <a:ext uri="{FF2B5EF4-FFF2-40B4-BE49-F238E27FC236}">
+                <a16:creationId xmlns:a16="http://schemas.microsoft.com/office/drawing/2014/main" id="{DD5709EA-CB80-7DDC-9A7F-F7DCC7F551F6}"/>
+              </a:ext>
+            </a:extLst>
+          </p:cNvPr>
+          <p:cNvPicPr>
+            <a:picLocks noChangeAspect="1"/>
+          </p:cNvPicPr>
+          <p:nvPr/>
+        </p:nvPicPr>
+        <p:blipFill>
+          <a:blip r:embed="rId3">
+            <a:extLst>
+              <a:ext uri="{28A0092B-C50C-407E-A947-70E740481C1C}">
+                <a14:useLocalDpi xmlns:a14="http://schemas.microsoft.com/office/drawing/2010/main" val="0"/>
+              </a:ext>
+            </a:extLst>
+          </a:blip>
+          <a:stretch>
+            <a:fillRect/>
+          </a:stretch>
+        </p:blipFill>
+        <p:spPr>
+          <a:xfrm>
+            <a:off x="6926209" y="2858186"/>
+            <a:ext cx="3075041" cy="1050874"/>
+          </a:xfrm>
+          <a:prstGeom prst="rect">
+            <a:avLst/>
+          </a:prstGeom>
+        </p:spPr>
+      </p:pic>
     </p:spTree>
     <p:extLst>
       <p:ext uri="{BB962C8B-B14F-4D97-AF65-F5344CB8AC3E}">
@@ -26845,8 +27288,16 @@
               <a:buNone/>
             </a:pPr>
             <a:r>
+              <a:rPr lang="en-AU" b="1" i="1" dirty="0">
+                <a:solidFill>
+                  <a:srgbClr val="7030A0"/>
+                </a:solidFill>
+              </a:rPr>
+              <a:t>BLADE</a:t>
+            </a:r>
+            <a:r>
               <a:rPr lang="en-AU" i="1" dirty="0"/>
-              <a:t>BLADE (and </a:t>
+              <a:t> (and </a:t>
             </a:r>
             <a:r>
               <a:rPr lang="en-AU" i="1" dirty="0" err="1"/>
@@ -26857,7 +27308,11 @@
               <a:t>): </a:t>
             </a:r>
             <a:r>
-              <a:rPr lang="en-AU" dirty="0"/>
+              <a:rPr lang="en-AU" dirty="0">
+                <a:solidFill>
+                  <a:srgbClr val="7030A0"/>
+                </a:solidFill>
+              </a:rPr>
               <a:t>for output per sector for Gladstone 2019</a:t>
             </a:r>
           </a:p>

</xml_diff>

<commit_message>
slides updated; reran experiment subsidyin..shock-orig
</commit_message>
<xml_diff>
--- a/powerpoint/glad-slides.pptx
+++ b/powerpoint/glad-slides.pptx
@@ -4535,100 +4535,100 @@
             <c:numRef>
               <c:f>PercentChange!$C$101:$C$131</c:f>
               <c:numCache>
-                <c:formatCode>0.0%</c:formatCode>
+                <c:formatCode>0.00%</c:formatCode>
                 <c:ptCount val="31"/>
                 <c:pt idx="0">
                   <c:v>0</c:v>
                 </c:pt>
                 <c:pt idx="1">
-                  <c:v>-0.25</c:v>
+                  <c:v>-0.24999999964322575</c:v>
                 </c:pt>
                 <c:pt idx="2">
-                  <c:v>-1.14301E-2</c:v>
+                  <c:v>-0.18555085411217576</c:v>
                 </c:pt>
                 <c:pt idx="3">
-                  <c:v>-1.96151E-2</c:v>
+                  <c:v>-0.14034088815375231</c:v>
                 </c:pt>
                 <c:pt idx="4">
-                  <c:v>-2.5480699999999998E-2</c:v>
+                  <c:v>-0.10910917916885843</c:v>
                 </c:pt>
                 <c:pt idx="5">
-                  <c:v>-2.9699900000000001E-2</c:v>
+                  <c:v>-8.772298848949793E-2</c:v>
                 </c:pt>
                 <c:pt idx="6">
-                  <c:v>-3.2754400000000003E-2</c:v>
+                  <c:v>-7.3152072051937148E-2</c:v>
                 </c:pt>
                 <c:pt idx="7">
-                  <c:v>-3.4984000000000001E-2</c:v>
+                  <c:v>-6.3251116577148589E-2</c:v>
                 </c:pt>
                 <c:pt idx="8">
-                  <c:v>-3.6626899999999997E-2</c:v>
+                  <c:v>-5.6531236451987051E-2</c:v>
                 </c:pt>
                 <c:pt idx="9">
-                  <c:v>-3.7850000000000002E-2</c:v>
+                  <c:v>-5.1970983178123251E-2</c:v>
                 </c:pt>
                 <c:pt idx="10">
-                  <c:v>-3.8770100000000002E-2</c:v>
+                  <c:v>-4.8874374994459319E-2</c:v>
                 </c:pt>
                 <c:pt idx="11">
-                  <c:v>-3.9469600000000001E-2</c:v>
+                  <c:v>-4.676899549161135E-2</c:v>
                 </c:pt>
                 <c:pt idx="12">
-                  <c:v>-4.0006600000000003E-2</c:v>
+                  <c:v>-4.5334834154739517E-2</c:v>
                 </c:pt>
                 <c:pt idx="13">
-                  <c:v>-4.0422699999999999E-2</c:v>
+                  <c:v>-4.4355319143769729E-2</c:v>
                 </c:pt>
                 <c:pt idx="14">
-                  <c:v>-4.0747800000000001E-2</c:v>
+                  <c:v>-4.368393796430893E-2</c:v>
                 </c:pt>
                 <c:pt idx="15">
-                  <c:v>-4.1003400000000002E-2</c:v>
+                  <c:v>-4.3221516865813138E-2</c:v>
                 </c:pt>
                 <c:pt idx="16">
-                  <c:v>-4.1205400000000003E-2</c:v>
+                  <c:v>-4.2900910367630697E-2</c:v>
                 </c:pt>
                 <c:pt idx="17">
-                  <c:v>-4.1365699999999998E-2</c:v>
+                  <c:v>-4.2676624108242876E-2</c:v>
                 </c:pt>
                 <c:pt idx="18">
-                  <c:v>-4.1493099999999998E-2</c:v>
+                  <c:v>-4.2517731966520853E-2</c:v>
                 </c:pt>
                 <c:pt idx="19">
-                  <c:v>-4.1594100000000002E-2</c:v>
+                  <c:v>-4.2403317786000316E-2</c:v>
                 </c:pt>
                 <c:pt idx="20">
-                  <c:v>-4.1674099999999999E-2</c:v>
+                  <c:v>-4.2319136063951518E-2</c:v>
                 </c:pt>
                 <c:pt idx="21">
-                  <c:v>-4.1736799999999998E-2</c:v>
+                  <c:v>-4.2255495289960372E-2</c:v>
                 </c:pt>
                 <c:pt idx="22">
-                  <c:v>-4.1785599999999999E-2</c:v>
+                  <c:v>-4.2205796895220575E-2</c:v>
                 </c:pt>
                 <c:pt idx="23">
-                  <c:v>-4.1822900000000003E-2</c:v>
+                  <c:v>-4.2165531150313108E-2</c:v>
                 </c:pt>
                 <c:pt idx="24">
-                  <c:v>-4.1850600000000002E-2</c:v>
+                  <c:v>-4.2131637781521826E-2</c:v>
                 </c:pt>
                 <c:pt idx="25">
-                  <c:v>-4.1870299999999999E-2</c:v>
+                  <c:v>-4.2102003722944085E-2</c:v>
                 </c:pt>
                 <c:pt idx="26">
-                  <c:v>-4.1883400000000001E-2</c:v>
+                  <c:v>-4.2075210761500233E-2</c:v>
                 </c:pt>
                 <c:pt idx="27">
-                  <c:v>-4.1890900000000002E-2</c:v>
+                  <c:v>-4.2050265982367954E-2</c:v>
                 </c:pt>
                 <c:pt idx="28">
-                  <c:v>-4.1893699999999999E-2</c:v>
+                  <c:v>-4.2026507705275835E-2</c:v>
                 </c:pt>
                 <c:pt idx="29">
-                  <c:v>-4.1892499999999999E-2</c:v>
+                  <c:v>-4.2003436310158564E-2</c:v>
                 </c:pt>
                 <c:pt idx="30">
-                  <c:v>-4.1888000000000002E-2</c:v>
+                  <c:v>-4.1980786901052655E-2</c:v>
                 </c:pt>
               </c:numCache>
             </c:numRef>
@@ -4636,7 +4636,7 @@
           <c:smooth val="0"/>
           <c:extLst>
             <c:ext xmlns:c16="http://schemas.microsoft.com/office/drawing/2014/chart" uri="{C3380CC4-5D6E-409C-BE32-E72D297353CC}">
-              <c16:uniqueId val="{00000000-EF6D-4446-BA49-A904911706B9}"/>
+              <c16:uniqueId val="{00000000-B229-5742-9F90-DB974FFD8070}"/>
             </c:ext>
           </c:extLst>
         </c:ser>
@@ -4764,100 +4764,100 @@
             <c:numRef>
               <c:f>PercentChange!$D$101:$D$131</c:f>
               <c:numCache>
-                <c:formatCode>0.0%</c:formatCode>
+                <c:formatCode>0.00%</c:formatCode>
                 <c:ptCount val="31"/>
                 <c:pt idx="0">
-                  <c:v>-1.533E-10</c:v>
+                  <c:v>-1.5329331978899793E-10</c:v>
                 </c:pt>
                 <c:pt idx="1">
-                  <c:v>-0.25363639999999998</c:v>
+                  <c:v>-0.27527022755432556</c:v>
                 </c:pt>
                 <c:pt idx="2">
-                  <c:v>-0.25455549999999999</c:v>
+                  <c:v>-0.26947900570395433</c:v>
                 </c:pt>
                 <c:pt idx="3">
-                  <c:v>-0.25524259999999999</c:v>
+                  <c:v>-0.26565578209920154</c:v>
                 </c:pt>
                 <c:pt idx="4">
-                  <c:v>-0.25574419999999998</c:v>
+                  <c:v>-0.26308869190607731</c:v>
                 </c:pt>
                 <c:pt idx="5">
-                  <c:v>-0.2561041</c:v>
+                  <c:v>-0.2613403344466021</c:v>
                 </c:pt>
                 <c:pt idx="6">
-                  <c:v>-0.2563571</c:v>
+                  <c:v>-0.26013220397567327</c:v>
                 </c:pt>
                 <c:pt idx="7">
-                  <c:v>-0.25652970000000003</c:v>
+                  <c:v>-0.25928317826660613</c:v>
                 </c:pt>
                 <c:pt idx="8">
-                  <c:v>-0.25664130000000002</c:v>
+                  <c:v>-0.25867400940234392</c:v>
                 </c:pt>
                 <c:pt idx="9">
-                  <c:v>-0.2567063</c:v>
+                  <c:v>-0.25822550934967659</c:v>
                 </c:pt>
                 <c:pt idx="10">
-                  <c:v>-0.2567352</c:v>
+                  <c:v>-0.25788486094701274</c:v>
                 </c:pt>
                 <c:pt idx="11">
-                  <c:v>-0.25673600000000002</c:v>
+                  <c:v>-0.25761668045938685</c:v>
                 </c:pt>
                 <c:pt idx="12">
-                  <c:v>-0.25671460000000002</c:v>
+                  <c:v>-0.25739720049524067</c:v>
                 </c:pt>
                 <c:pt idx="13">
-                  <c:v>-0.2566753</c:v>
+                  <c:v>-0.25721041095463487</c:v>
                 </c:pt>
                 <c:pt idx="14">
-                  <c:v>-0.25662180000000001</c:v>
+                  <c:v>-0.25704553664756241</c:v>
                 </c:pt>
                 <c:pt idx="15">
-                  <c:v>-0.25655650000000002</c:v>
+                  <c:v>-0.25689527969760489</c:v>
                 </c:pt>
                 <c:pt idx="16">
-                  <c:v>-0.25648159999999998</c:v>
+                  <c:v>-0.25675471286798818</c:v>
                 </c:pt>
                 <c:pt idx="17">
-                  <c:v>-0.25639869999999998</c:v>
+                  <c:v>-0.2566205278988668</c:v>
                 </c:pt>
                 <c:pt idx="18">
-                  <c:v>-0.25630920000000001</c:v>
+                  <c:v>-0.25649041350042967</c:v>
                 </c:pt>
                 <c:pt idx="19">
-                  <c:v>-0.25621389999999999</c:v>
+                  <c:v>-0.25636286863975266</c:v>
                 </c:pt>
                 <c:pt idx="20">
-                  <c:v>-0.25611390000000001</c:v>
+                  <c:v>-0.25623684941852176</c:v>
                 </c:pt>
                 <c:pt idx="21">
-                  <c:v>-0.25600970000000001</c:v>
+                  <c:v>-0.25611164887490745</c:v>
                 </c:pt>
                 <c:pt idx="22">
-                  <c:v>-0.25590200000000002</c:v>
+                  <c:v>-0.25598679005046338</c:v>
                 </c:pt>
                 <c:pt idx="23">
-                  <c:v>-0.2557913</c:v>
+                  <c:v>-0.25586194008211977</c:v>
                 </c:pt>
                 <c:pt idx="24">
-                  <c:v>-0.25567780000000001</c:v>
+                  <c:v>-0.25573689017763818</c:v>
                 </c:pt>
                 <c:pt idx="25">
-                  <c:v>-0.25556200000000001</c:v>
+                  <c:v>-0.25561147211864338</c:v>
                 </c:pt>
                 <c:pt idx="26">
-                  <c:v>-0.25544410000000001</c:v>
+                  <c:v>-0.25548560655258151</c:v>
                 </c:pt>
                 <c:pt idx="27">
-                  <c:v>-0.25532440000000001</c:v>
+                  <c:v>-0.2553592150182572</c:v>
                 </c:pt>
                 <c:pt idx="28">
-                  <c:v>-0.25520300000000001</c:v>
+                  <c:v>-0.25523226058004289</c:v>
                 </c:pt>
                 <c:pt idx="29">
-                  <c:v>-0.25508009999999998</c:v>
+                  <c:v>-0.25510468531291197</c:v>
                 </c:pt>
                 <c:pt idx="30">
-                  <c:v>-0.25495580000000001</c:v>
+                  <c:v>-0.25497651262050497</c:v>
                 </c:pt>
               </c:numCache>
             </c:numRef>
@@ -4865,7 +4865,7 @@
           <c:smooth val="0"/>
           <c:extLst>
             <c:ext xmlns:c16="http://schemas.microsoft.com/office/drawing/2014/chart" uri="{C3380CC4-5D6E-409C-BE32-E72D297353CC}">
-              <c16:uniqueId val="{00000001-EF6D-4446-BA49-A904911706B9}"/>
+              <c16:uniqueId val="{00000001-B229-5742-9F90-DB974FFD8070}"/>
             </c:ext>
           </c:extLst>
         </c:ser>
@@ -4993,100 +4993,100 @@
             <c:numRef>
               <c:f>PercentChange!$E$101:$E$131</c:f>
               <c:numCache>
-                <c:formatCode>0.0%</c:formatCode>
+                <c:formatCode>0.00%</c:formatCode>
                 <c:ptCount val="31"/>
                 <c:pt idx="0">
-                  <c:v>-1.6850000000000001E-9</c:v>
+                  <c:v>-1.6847179631014965E-9</c:v>
                 </c:pt>
                 <c:pt idx="1">
-                  <c:v>-2.99454E-2</c:v>
+                  <c:v>-7.1281846075805164E-2</c:v>
                 </c:pt>
                 <c:pt idx="2">
-                  <c:v>-3.2573299999999999E-2</c:v>
+                  <c:v>-6.1551979989709169E-2</c:v>
                 </c:pt>
                 <c:pt idx="3">
-                  <c:v>-3.4437599999999999E-2</c:v>
+                  <c:v>-5.5065590752598453E-2</c:v>
                 </c:pt>
                 <c:pt idx="4">
-                  <c:v>-3.5771799999999999E-2</c:v>
+                  <c:v>-5.0651817254281771E-2</c:v>
                 </c:pt>
                 <c:pt idx="5">
-                  <c:v>-3.6733300000000003E-2</c:v>
+                  <c:v>-4.7601459332478301E-2</c:v>
                 </c:pt>
                 <c:pt idx="6">
-                  <c:v>-3.7425300000000002E-2</c:v>
+                  <c:v>-4.5459443800168468E-2</c:v>
                 </c:pt>
                 <c:pt idx="7">
-                  <c:v>-3.7918E-2</c:v>
+                  <c:v>-4.3927825810918614E-2</c:v>
                 </c:pt>
                 <c:pt idx="8">
-                  <c:v>-3.8260599999999999E-2</c:v>
+                  <c:v>-4.2808901607039693E-2</c:v>
                 </c:pt>
                 <c:pt idx="9">
-                  <c:v>-3.8488399999999999E-2</c:v>
+                  <c:v>-4.1969950211676717E-2</c:v>
                 </c:pt>
                 <c:pt idx="10">
-                  <c:v>-3.86272E-2</c:v>
+                  <c:v>-4.1321582117330793E-2</c:v>
                 </c:pt>
                 <c:pt idx="11">
-                  <c:v>-3.8695899999999998E-2</c:v>
+                  <c:v>-4.0803155956706597E-2</c:v>
                 </c:pt>
                 <c:pt idx="12">
-                  <c:v>-3.8709300000000002E-2</c:v>
+                  <c:v>-4.0373422237223747E-2</c:v>
                 </c:pt>
                 <c:pt idx="13">
-                  <c:v>-3.8677700000000002E-2</c:v>
+                  <c:v>-4.0004115540559881E-2</c:v>
                 </c:pt>
                 <c:pt idx="14">
-                  <c:v>-3.8610199999999997E-2</c:v>
+                  <c:v>-3.9676017280992543E-2</c:v>
                 </c:pt>
                 <c:pt idx="15">
-                  <c:v>-3.8513100000000001E-2</c:v>
+                  <c:v>-3.9376014131953262E-2</c:v>
                 </c:pt>
                 <c:pt idx="16">
-                  <c:v>-3.8391799999999997E-2</c:v>
+                  <c:v>-3.9094860100488779E-2</c:v>
                 </c:pt>
                 <c:pt idx="17">
-                  <c:v>-3.8250300000000001E-2</c:v>
+                  <c:v>-3.8826711491091792E-2</c:v>
                 </c:pt>
                 <c:pt idx="18">
-                  <c:v>-3.8092099999999997E-2</c:v>
+                  <c:v>-3.8566811359969005E-2</c:v>
                 </c:pt>
                 <c:pt idx="19">
-                  <c:v>-3.7919799999999997E-2</c:v>
+                  <c:v>-3.8312448933877273E-2</c:v>
                 </c:pt>
                 <c:pt idx="20">
-                  <c:v>-3.7735600000000001E-2</c:v>
+                  <c:v>-3.8061569163803481E-2</c:v>
                 </c:pt>
                 <c:pt idx="21">
-                  <c:v>-3.75413E-2</c:v>
+                  <c:v>-3.7812760588993702E-2</c:v>
                 </c:pt>
                 <c:pt idx="22">
-                  <c:v>-3.7338499999999997E-2</c:v>
+                  <c:v>-3.7565101360279268E-2</c:v>
                 </c:pt>
                 <c:pt idx="23">
-                  <c:v>-3.71282E-2</c:v>
+                  <c:v>-3.7317836510634292E-2</c:v>
                 </c:pt>
                 <c:pt idx="24">
-                  <c:v>-3.6911600000000003E-2</c:v>
+                  <c:v>-3.7070647234656265E-2</c:v>
                 </c:pt>
                 <c:pt idx="25">
-                  <c:v>-3.66895E-2</c:v>
+                  <c:v>-3.6822995667487909E-2</c:v>
                 </c:pt>
                 <c:pt idx="26">
-                  <c:v>-3.6462700000000001E-2</c:v>
+                  <c:v>-3.6574877594615952E-2</c:v>
                 </c:pt>
                 <c:pt idx="27">
-                  <c:v>-3.6231600000000003E-2</c:v>
+                  <c:v>-3.6326059890053664E-2</c:v>
                 </c:pt>
                 <c:pt idx="28">
-                  <c:v>-3.5997000000000001E-2</c:v>
+                  <c:v>-3.607653633240443E-2</c:v>
                 </c:pt>
                 <c:pt idx="29">
-                  <c:v>-3.5758900000000003E-2</c:v>
+                  <c:v>-3.5825907851753949E-2</c:v>
                 </c:pt>
                 <c:pt idx="30">
-                  <c:v>-3.5518000000000001E-2</c:v>
+                  <c:v>-3.5574536565237992E-2</c:v>
                 </c:pt>
               </c:numCache>
             </c:numRef>
@@ -5094,7 +5094,7 @@
           <c:smooth val="0"/>
           <c:extLst>
             <c:ext xmlns:c16="http://schemas.microsoft.com/office/drawing/2014/chart" uri="{C3380CC4-5D6E-409C-BE32-E72D297353CC}">
-              <c16:uniqueId val="{00000002-EF6D-4446-BA49-A904911706B9}"/>
+              <c16:uniqueId val="{00000002-B229-5742-9F90-DB974FFD8070}"/>
             </c:ext>
           </c:extLst>
         </c:ser>
@@ -5222,100 +5222,100 @@
             <c:numRef>
               <c:f>PercentChange!$F$101:$F$131</c:f>
               <c:numCache>
-                <c:formatCode>0.0%</c:formatCode>
+                <c:formatCode>0.00%</c:formatCode>
                 <c:ptCount val="31"/>
                 <c:pt idx="0">
-                  <c:v>-1.7110000000000001E-10</c:v>
+                  <c:v>-1.711385066701041E-10</c:v>
                 </c:pt>
                 <c:pt idx="1">
-                  <c:v>-0.29182720000000001</c:v>
+                  <c:v>-0.31290958314699407</c:v>
                 </c:pt>
                 <c:pt idx="2">
-                  <c:v>-0.29270659999999998</c:v>
+                  <c:v>-0.30724912632633766</c:v>
                 </c:pt>
                 <c:pt idx="3">
-                  <c:v>-0.29335739999999999</c:v>
+                  <c:v>-0.30350481459252948</c:v>
                 </c:pt>
                 <c:pt idx="4">
-                  <c:v>-0.29382629999999998</c:v>
+                  <c:v>-0.30098358817635951</c:v>
                 </c:pt>
                 <c:pt idx="5">
-                  <c:v>-0.29415669999999999</c:v>
+                  <c:v>-0.29925965252026909</c:v>
                 </c:pt>
                 <c:pt idx="6">
-                  <c:v>-0.2943828</c:v>
+                  <c:v>-0.29806187486881008</c:v>
                 </c:pt>
                 <c:pt idx="7">
-                  <c:v>-0.29453040000000003</c:v>
+                  <c:v>-0.29721392717683698</c:v>
                 </c:pt>
                 <c:pt idx="8">
-                  <c:v>-0.29461870000000001</c:v>
+                  <c:v>-0.29659971406720648</c:v>
                 </c:pt>
                 <c:pt idx="9">
-                  <c:v>-0.29466150000000002</c:v>
+                  <c:v>-0.29614213330316369</c:v>
                 </c:pt>
                 <c:pt idx="10">
-                  <c:v>-0.29466940000000003</c:v>
+                  <c:v>-0.29578975345852365</c:v>
                 </c:pt>
                 <c:pt idx="11">
-                  <c:v>-0.29464990000000002</c:v>
+                  <c:v>-0.29550811332518678</c:v>
                 </c:pt>
                 <c:pt idx="12">
-                  <c:v>-0.29460890000000001</c:v>
+                  <c:v>-0.29527406072594709</c:v>
                 </c:pt>
                 <c:pt idx="13">
-                  <c:v>-0.2945507</c:v>
+                  <c:v>-0.2950719966213029</c:v>
                 </c:pt>
                 <c:pt idx="14">
-                  <c:v>-0.29447859999999998</c:v>
+                  <c:v>-0.29489141944762121</c:v>
                 </c:pt>
                 <c:pt idx="15">
-                  <c:v>-0.29439520000000002</c:v>
+                  <c:v>-0.29472521673609831</c:v>
                 </c:pt>
                 <c:pt idx="16">
-                  <c:v>-0.29430260000000003</c:v>
+                  <c:v>-0.2945685823680203</c:v>
                 </c:pt>
                 <c:pt idx="17">
-                  <c:v>-0.29420230000000003</c:v>
+                  <c:v>-0.29441829266923514</c:v>
                 </c:pt>
                 <c:pt idx="18">
-                  <c:v>-0.29409560000000001</c:v>
+                  <c:v>-0.29427208958234474</c:v>
                 </c:pt>
                 <c:pt idx="19">
-                  <c:v>-0.29398350000000001</c:v>
+                  <c:v>-0.2941285095405351</c:v>
                 </c:pt>
                 <c:pt idx="20">
-                  <c:v>-0.29386679999999998</c:v>
+                  <c:v>-0.29398653334249514</c:v>
                 </c:pt>
                 <c:pt idx="21">
-                  <c:v>-0.29374620000000001</c:v>
+                  <c:v>-0.29384547044556691</c:v>
                 </c:pt>
                 <c:pt idx="22">
-                  <c:v>-0.2936223</c:v>
+                  <c:v>-0.29370485513526534</c:v>
                 </c:pt>
                 <c:pt idx="23">
-                  <c:v>-0.29349560000000002</c:v>
+                  <c:v>-0.29356436144961318</c:v>
                 </c:pt>
                 <c:pt idx="24">
-                  <c:v>-0.29336630000000002</c:v>
+                  <c:v>-0.29342378591148799</c:v>
                 </c:pt>
                 <c:pt idx="25">
-                  <c:v>-0.29323480000000002</c:v>
+                  <c:v>-0.29328296263777587</c:v>
                 </c:pt>
                 <c:pt idx="26">
-                  <c:v>-0.29310140000000001</c:v>
+                  <c:v>-0.29314181484744589</c:v>
                 </c:pt>
                 <c:pt idx="27">
-                  <c:v>-0.29296640000000002</c:v>
+                  <c:v>-0.29300026519572725</c:v>
                 </c:pt>
                 <c:pt idx="28">
-                  <c:v>-0.29282979999999997</c:v>
+                  <c:v>-0.29285827774765377</c:v>
                 </c:pt>
                 <c:pt idx="29">
-                  <c:v>-0.2926918</c:v>
+                  <c:v>-0.29271579380029666</c:v>
                 </c:pt>
                 <c:pt idx="30">
-                  <c:v>-0.2925527</c:v>
+                  <c:v>-0.29257283811177787</c:v>
                 </c:pt>
               </c:numCache>
             </c:numRef>
@@ -5323,7 +5323,7 @@
           <c:smooth val="0"/>
           <c:extLst>
             <c:ext xmlns:c16="http://schemas.microsoft.com/office/drawing/2014/chart" uri="{C3380CC4-5D6E-409C-BE32-E72D297353CC}">
-              <c16:uniqueId val="{00000003-EF6D-4446-BA49-A904911706B9}"/>
+              <c16:uniqueId val="{00000003-B229-5742-9F90-DB974FFD8070}"/>
             </c:ext>
           </c:extLst>
         </c:ser>
@@ -5336,7 +5336,7 @@
           <c:spPr>
             <a:ln w="28575" cap="rnd">
               <a:solidFill>
-                <a:schemeClr val="accent6"/>
+                <a:schemeClr val="accent5"/>
               </a:solidFill>
               <a:round/>
             </a:ln>
@@ -5451,100 +5451,100 @@
             <c:numRef>
               <c:f>PercentChange!$G$101:$G$131</c:f>
               <c:numCache>
-                <c:formatCode>0.0%</c:formatCode>
+                <c:formatCode>0.00%</c:formatCode>
                 <c:ptCount val="31"/>
                 <c:pt idx="0">
-                  <c:v>6.6453E-11</c:v>
+                  <c:v>6.6453173899247589E-11</c:v>
                 </c:pt>
                 <c:pt idx="1">
-                  <c:v>-8.4341100000000002E-2</c:v>
+                  <c:v>-0.10084471026825487</c:v>
                 </c:pt>
                 <c:pt idx="2">
-                  <c:v>-8.5125999999999993E-2</c:v>
+                  <c:v>-9.6549294569873836E-2</c:v>
                 </c:pt>
                 <c:pt idx="3">
-                  <c:v>-8.57319E-2</c:v>
+                  <c:v>-9.3786670698537508E-2</c:v>
                 </c:pt>
                 <c:pt idx="4">
-                  <c:v>-8.6189699999999994E-2</c:v>
+                  <c:v>-9.1961881391999581E-2</c:v>
                 </c:pt>
                 <c:pt idx="5">
-                  <c:v>-8.6531399999999994E-2</c:v>
+                  <c:v>-9.07296224775824E-2</c:v>
                 </c:pt>
                 <c:pt idx="6">
-                  <c:v>-8.6783200000000005E-2</c:v>
+                  <c:v>-8.9880108963964145E-2</c:v>
                 </c:pt>
                 <c:pt idx="7">
-                  <c:v>-8.6965500000000001E-2</c:v>
+                  <c:v>-8.9281434872537757E-2</c:v>
                 </c:pt>
                 <c:pt idx="8">
-                  <c:v>-8.7094000000000005E-2</c:v>
+                  <c:v>-8.884884354332287E-2</c:v>
                 </c:pt>
                 <c:pt idx="9">
-                  <c:v>-8.7180099999999996E-2</c:v>
+                  <c:v>-8.852688957304404E-2</c:v>
                 </c:pt>
                 <c:pt idx="10">
-                  <c:v>-8.7232799999999999E-2</c:v>
+                  <c:v>-8.8278941993476148E-2</c:v>
                 </c:pt>
                 <c:pt idx="11">
-                  <c:v>-8.7258799999999997E-2</c:v>
+                  <c:v>-8.8080604699762685E-2</c:v>
                 </c:pt>
                 <c:pt idx="12">
-                  <c:v>-8.7263300000000002E-2</c:v>
+                  <c:v>-8.7915536316544848E-2</c:v>
                 </c:pt>
                 <c:pt idx="13">
-                  <c:v>-8.72502E-2</c:v>
+                  <c:v>-8.7772754890695054E-2</c:v>
                 </c:pt>
                 <c:pt idx="14">
-                  <c:v>-8.72227E-2</c:v>
+                  <c:v>-8.764489459914844E-2</c:v>
                 </c:pt>
                 <c:pt idx="15">
-                  <c:v>-8.7183300000000005E-2</c:v>
+                  <c:v>-8.7526849930880488E-2</c:v>
                 </c:pt>
                 <c:pt idx="16">
-                  <c:v>-8.7134000000000003E-2</c:v>
+                  <c:v>-8.7415336898092333E-2</c:v>
                 </c:pt>
                 <c:pt idx="17">
-                  <c:v>-8.7076399999999998E-2</c:v>
+                  <c:v>-8.7308022636978469E-2</c:v>
                 </c:pt>
                 <c:pt idx="18">
-                  <c:v>-8.7011900000000003E-2</c:v>
+                  <c:v>-8.7203342245613186E-2</c:v>
                 </c:pt>
                 <c:pt idx="19">
-                  <c:v>-8.6941299999999999E-2</c:v>
+                  <c:v>-8.7100252642213383E-2</c:v>
                 </c:pt>
                 <c:pt idx="20">
-                  <c:v>-8.6865700000000004E-2</c:v>
+                  <c:v>-8.6998033133894342E-2</c:v>
                 </c:pt>
                 <c:pt idx="21">
-                  <c:v>-8.6785699999999993E-2</c:v>
+                  <c:v>-8.6896196338968154E-2</c:v>
                 </c:pt>
                 <c:pt idx="22">
-                  <c:v>-8.6701899999999998E-2</c:v>
+                  <c:v>-8.6794407362604589E-2</c:v>
                 </c:pt>
                 <c:pt idx="23">
-                  <c:v>-8.6614899999999995E-2</c:v>
+                  <c:v>-8.6692444331599713E-2</c:v>
                 </c:pt>
                 <c:pt idx="24">
-                  <c:v>-8.6525099999999994E-2</c:v>
+                  <c:v>-8.6590147994250077E-2</c:v>
                 </c:pt>
                 <c:pt idx="25">
-                  <c:v>-8.6432700000000001E-2</c:v>
+                  <c:v>-8.6487422421178808E-2</c:v>
                 </c:pt>
                 <c:pt idx="26">
-                  <c:v>-8.6338200000000004E-2</c:v>
+                  <c:v>-8.6384193792308633E-2</c:v>
                 </c:pt>
                 <c:pt idx="27">
-                  <c:v>-8.6241700000000004E-2</c:v>
+                  <c:v>-8.6280416943193244E-2</c:v>
                 </c:pt>
                 <c:pt idx="28">
-                  <c:v>-8.6143399999999995E-2</c:v>
+                  <c:v>-8.6176055155824327E-2</c:v>
                 </c:pt>
                 <c:pt idx="29">
-                  <c:v>-8.6043599999999998E-2</c:v>
+                  <c:v>-8.6071090441136186E-2</c:v>
                 </c:pt>
                 <c:pt idx="30">
-                  <c:v>-8.5942299999999999E-2</c:v>
+                  <c:v>-8.596551939998559E-2</c:v>
                 </c:pt>
               </c:numCache>
             </c:numRef>
@@ -5552,7 +5552,7 @@
           <c:smooth val="0"/>
           <c:extLst>
             <c:ext xmlns:c16="http://schemas.microsoft.com/office/drawing/2014/chart" uri="{C3380CC4-5D6E-409C-BE32-E72D297353CC}">
-              <c16:uniqueId val="{00000004-EF6D-4446-BA49-A904911706B9}"/>
+              <c16:uniqueId val="{00000004-B229-5742-9F90-DB974FFD8070}"/>
             </c:ext>
           </c:extLst>
         </c:ser>
@@ -22728,7 +22728,7 @@
           <p:nvPr>
             <p:extLst>
               <p:ext uri="{D42A27DB-BD31-4B8C-83A1-F6EECF244321}">
-                <p14:modId xmlns:p14="http://schemas.microsoft.com/office/powerpoint/2010/main" val="3921654442"/>
+                <p14:modId xmlns:p14="http://schemas.microsoft.com/office/powerpoint/2010/main" val="2519019856"/>
               </p:ext>
             </p:extLst>
           </p:nvPr>
@@ -22809,7 +22809,7 @@
                             <a:srgbClr val="7030A0"/>
                           </a:solidFill>
                         </a:rPr>
-                        <a:t>Sectoral breakdown of initial -$1.56bn drop in Aggregate Output</a:t>
+                        <a:t>Sectoral breakdown of initial -$1.7bn drop in Aggregate Output</a:t>
                       </a:r>
                       <a:endParaRPr lang="en-AU" sz="2200" baseline="0" dirty="0">
                         <a:solidFill>
@@ -23068,7 +23068,7 @@
                             <a:srgbClr val="7030A0"/>
                           </a:solidFill>
                         </a:rPr>
-                        <a:t>-$1.47bn</a:t>
+                        <a:t>-$1.59bn</a:t>
                       </a:r>
                       <a:endParaRPr lang="en-US" sz="2200" baseline="0" dirty="0">
                         <a:solidFill>
@@ -23097,7 +23097,7 @@
                             <a:srgbClr val="7030A0"/>
                           </a:solidFill>
                         </a:rPr>
-                        <a:t>-$45m</a:t>
+                        <a:t>-$47m</a:t>
                       </a:r>
                       <a:endParaRPr lang="en-US" sz="2200" baseline="0" dirty="0">
                         <a:solidFill>
@@ -23121,14 +23121,14 @@
                     <a:p>
                       <a:pPr algn="ctr"/>
                       <a:r>
-                        <a:rPr lang="en-AU" sz="2200" baseline="0">
+                        <a:rPr lang="en-AU" sz="2200" baseline="0" dirty="0">
                           <a:solidFill>
                             <a:srgbClr val="7030A0"/>
                           </a:solidFill>
                         </a:rPr>
-                        <a:t>-$23m</a:t>
+                        <a:t>-$24m</a:t>
                       </a:r>
-                      <a:endParaRPr lang="en-US" sz="2200" baseline="0">
+                      <a:endParaRPr lang="en-US" sz="2200" baseline="0" dirty="0">
                         <a:solidFill>
                           <a:srgbClr val="7030A0"/>
                         </a:solidFill>
@@ -23150,12 +23150,12 @@
                     <a:p>
                       <a:pPr algn="ctr"/>
                       <a:r>
-                        <a:rPr lang="en-US" sz="2200" baseline="0">
+                        <a:rPr lang="en-US" sz="2200" baseline="0" dirty="0">
                           <a:solidFill>
                             <a:srgbClr val="7030A0"/>
                           </a:solidFill>
                         </a:rPr>
-                        <a:t>-$4m</a:t>
+                        <a:t>-$8m</a:t>
                       </a:r>
                     </a:p>
                   </a:txBody>
@@ -23179,7 +23179,7 @@
                             <a:srgbClr val="7030A0"/>
                           </a:solidFill>
                         </a:rPr>
-                        <a:t>-$17.5m</a:t>
+                        <a:t>-$27m</a:t>
                       </a:r>
                     </a:p>
                   </a:txBody>
@@ -23514,7 +23514,7 @@
                   <a:schemeClr val="accent2"/>
                 </a:solidFill>
               </a:rPr>
-              <a:t>Aggregate Output permanently down by 10% or $1.5bn</a:t>
+              <a:t>Aggregate Output permanently down by 10% or $1.6bn</a:t>
             </a:r>
           </a:p>
           <a:p>
@@ -23633,13 +23633,13 @@
           <p:nvPr>
             <p:extLst>
               <p:ext uri="{D42A27DB-BD31-4B8C-83A1-F6EECF244321}">
-                <p14:modId xmlns:p14="http://schemas.microsoft.com/office/powerpoint/2010/main" val="3186666789"/>
+                <p14:modId xmlns:p14="http://schemas.microsoft.com/office/powerpoint/2010/main" val="3293314872"/>
               </p:ext>
             </p:extLst>
           </p:nvPr>
         </p:nvGraphicFramePr>
         <p:xfrm>
-          <a:off x="619452" y="1623355"/>
+          <a:off x="710892" y="1623355"/>
           <a:ext cx="5040000" cy="3744000"/>
         </p:xfrm>
         <a:graphic>
@@ -23663,13 +23663,13 @@
           <p:nvPr>
             <p:extLst>
               <p:ext uri="{D42A27DB-BD31-4B8C-83A1-F6EECF244321}">
-                <p14:modId xmlns:p14="http://schemas.microsoft.com/office/powerpoint/2010/main" val="3716940410"/>
+                <p14:modId xmlns:p14="http://schemas.microsoft.com/office/powerpoint/2010/main" val="3676575264"/>
               </p:ext>
             </p:extLst>
           </p:nvPr>
         </p:nvGraphicFramePr>
         <p:xfrm>
-          <a:off x="6322012" y="1623355"/>
+          <a:off x="6407737" y="1623355"/>
           <a:ext cx="5040000" cy="3744000"/>
         </p:xfrm>
         <a:graphic>
@@ -23821,7 +23821,7 @@
         <p:spPr>
           <a:xfrm>
             <a:off x="591303" y="5470741"/>
-            <a:ext cx="5355087" cy="646331"/>
+            <a:ext cx="5355087" cy="1200329"/>
           </a:xfrm>
           <a:prstGeom prst="rect">
             <a:avLst/>
@@ -23837,10 +23837,31 @@
             <a:r>
               <a:rPr lang="en-US" dirty="0">
                 <a:solidFill>
+                  <a:schemeClr val="accent2"/>
+                </a:solidFill>
+              </a:rPr>
+              <a:t>Aggregate Output permanently down by 27% or $1.5bn</a:t>
+            </a:r>
+          </a:p>
+          <a:p>
+            <a:r>
+              <a:rPr lang="en-US" dirty="0"/>
+              <a:t>in accordance with productivity shock </a:t>
+            </a:r>
+            <a:endParaRPr lang="en-US" dirty="0">
+              <a:solidFill>
+                <a:schemeClr val="accent1"/>
+              </a:solidFill>
+            </a:endParaRPr>
+          </a:p>
+          <a:p>
+            <a:r>
+              <a:rPr lang="en-US" dirty="0">
+                <a:solidFill>
                   <a:schemeClr val="accent1"/>
                 </a:solidFill>
               </a:rPr>
-              <a:t>Manufacturing capital immediately returns back to previous no-shock levels</a:t>
+              <a:t>Manufacturing capital quickly returns back to previous no-shock levels</a:t>
             </a:r>
             <a:r>
               <a:rPr lang="en-US" dirty="0"/>
@@ -23864,7 +23885,7 @@
         <p:spPr>
           <a:xfrm>
             <a:off x="6293221" y="5470741"/>
-            <a:ext cx="5536936" cy="646331"/>
+            <a:ext cx="5536936" cy="923330"/>
           </a:xfrm>
           <a:prstGeom prst="rect">
             <a:avLst/>
@@ -23888,6 +23909,16 @@
             <a:r>
               <a:rPr lang="en-US" dirty="0"/>
               <a:t>as they were not entirely efficient.</a:t>
+            </a:r>
+          </a:p>
+          <a:p>
+            <a:r>
+              <a:rPr lang="en-US" dirty="0">
+                <a:solidFill>
+                  <a:schemeClr val="accent3"/>
+                </a:solidFill>
+              </a:rPr>
+              <a:t>Consumption rises as Manufacturing prices fall.</a:t>
             </a:r>
           </a:p>
         </p:txBody>
@@ -23936,13 +23967,13 @@
           <p:nvPr>
             <p:extLst>
               <p:ext uri="{D42A27DB-BD31-4B8C-83A1-F6EECF244321}">
-                <p14:modId xmlns:p14="http://schemas.microsoft.com/office/powerpoint/2010/main" val="3968357380"/>
+                <p14:modId xmlns:p14="http://schemas.microsoft.com/office/powerpoint/2010/main" val="1499754971"/>
               </p:ext>
             </p:extLst>
           </p:nvPr>
         </p:nvGraphicFramePr>
         <p:xfrm>
-          <a:off x="6322686" y="1624544"/>
+          <a:off x="6402370" y="1621289"/>
           <a:ext cx="5040000" cy="3744000"/>
         </p:xfrm>
         <a:graphic>
@@ -23953,7 +23984,7 @@
       </p:graphicFrame>
       <p:graphicFrame>
         <p:nvGraphicFramePr>
-          <p:cNvPr id="6" name="Chart 5" descr="Chart type: Line. Multiple values by 'Years'&#10;&#10;Description automatically generated">
+          <p:cNvPr id="2" name="Chart 1" descr="Chart type: Line. Multiple values by 'Years'&#10;&#10;Description automatically generated">
             <a:extLst>
               <a:ext uri="{FF2B5EF4-FFF2-40B4-BE49-F238E27FC236}">
                 <a16:creationId xmlns:a16="http://schemas.microsoft.com/office/drawing/2014/main" id="{50FFD8E8-D85B-05D4-94A3-8946BB9DEDB3}"/>
@@ -23966,13 +23997,13 @@
           <p:nvPr>
             <p:extLst>
               <p:ext uri="{D42A27DB-BD31-4B8C-83A1-F6EECF244321}">
-                <p14:modId xmlns:p14="http://schemas.microsoft.com/office/powerpoint/2010/main" val="862661903"/>
+                <p14:modId xmlns:p14="http://schemas.microsoft.com/office/powerpoint/2010/main" val="2429243160"/>
               </p:ext>
             </p:extLst>
           </p:nvPr>
         </p:nvGraphicFramePr>
         <p:xfrm>
-          <a:off x="614163" y="1624544"/>
+          <a:off x="703910" y="1621289"/>
           <a:ext cx="5040000" cy="3744000"/>
         </p:xfrm>
         <a:graphic>
@@ -24167,13 +24198,13 @@
           <p:nvPr>
             <p:extLst>
               <p:ext uri="{D42A27DB-BD31-4B8C-83A1-F6EECF244321}">
-                <p14:modId xmlns:p14="http://schemas.microsoft.com/office/powerpoint/2010/main" val="1424772149"/>
+                <p14:modId xmlns:p14="http://schemas.microsoft.com/office/powerpoint/2010/main" val="1138178653"/>
               </p:ext>
             </p:extLst>
           </p:nvPr>
         </p:nvGraphicFramePr>
         <p:xfrm>
-          <a:off x="610357" y="1623456"/>
+          <a:off x="713227" y="1623456"/>
           <a:ext cx="5040000" cy="3744000"/>
         </p:xfrm>
         <a:graphic>
@@ -24197,13 +24228,13 @@
           <p:nvPr>
             <p:extLst>
               <p:ext uri="{D42A27DB-BD31-4B8C-83A1-F6EECF244321}">
-                <p14:modId xmlns:p14="http://schemas.microsoft.com/office/powerpoint/2010/main" val="2229492461"/>
+                <p14:modId xmlns:p14="http://schemas.microsoft.com/office/powerpoint/2010/main" val="2048217193"/>
               </p:ext>
             </p:extLst>
           </p:nvPr>
         </p:nvGraphicFramePr>
         <p:xfrm>
-          <a:off x="6316275" y="1620776"/>
+          <a:off x="6424860" y="1620776"/>
           <a:ext cx="5040000" cy="3744000"/>
         </p:xfrm>
         <a:graphic>
@@ -24509,13 +24540,13 @@
           <p:nvPr>
             <p:extLst>
               <p:ext uri="{D42A27DB-BD31-4B8C-83A1-F6EECF244321}">
-                <p14:modId xmlns:p14="http://schemas.microsoft.com/office/powerpoint/2010/main" val="430933084"/>
+                <p14:modId xmlns:p14="http://schemas.microsoft.com/office/powerpoint/2010/main" val="3578391994"/>
               </p:ext>
             </p:extLst>
           </p:nvPr>
         </p:nvGraphicFramePr>
         <p:xfrm>
-          <a:off x="595768" y="1623456"/>
+          <a:off x="698638" y="1623456"/>
           <a:ext cx="5040000" cy="3744000"/>
         </p:xfrm>
         <a:graphic>
@@ -24659,13 +24690,13 @@
           <p:nvPr>
             <p:extLst>
               <p:ext uri="{D42A27DB-BD31-4B8C-83A1-F6EECF244321}">
-                <p14:modId xmlns:p14="http://schemas.microsoft.com/office/powerpoint/2010/main" val="3606308379"/>
+                <p14:modId xmlns:p14="http://schemas.microsoft.com/office/powerpoint/2010/main" val="4123869648"/>
               </p:ext>
             </p:extLst>
           </p:nvPr>
         </p:nvGraphicFramePr>
         <p:xfrm>
-          <a:off x="6314499" y="1623456"/>
+          <a:off x="6405939" y="1623456"/>
           <a:ext cx="5040000" cy="3744000"/>
         </p:xfrm>
         <a:graphic>
@@ -24832,14 +24863,22 @@
             </a:pPr>
             <a:r>
               <a:rPr lang="en-AU" sz="5100" dirty="0"/>
-              <a:t>Economic modelling with the SEE:</a:t>
+              <a:t>Economic modelling with SEE:</a:t>
             </a:r>
           </a:p>
           <a:p>
             <a:pPr lvl="1"/>
             <a:r>
               <a:rPr lang="en-AU" sz="4700" dirty="0"/>
-              <a:t>The SEE are testable conditions with a long history in macroeconomics and finance</a:t>
+              <a:t>The SEE are </a:t>
+            </a:r>
+            <a:r>
+              <a:rPr lang="en-AU" sz="4700" b="1" dirty="0"/>
+              <a:t>testable</a:t>
+            </a:r>
+            <a:r>
+              <a:rPr lang="en-AU" sz="4700" dirty="0"/>
+              <a:t> conditions with long history in macroeconomics and finance: absent in CGE</a:t>
             </a:r>
           </a:p>
           <a:p>
@@ -24876,7 +24915,31 @@
                   <a:srgbClr val="7030A0"/>
                 </a:solidFill>
               </a:rPr>
-              <a:t>greater propagation of shocks, but also opportunity for change</a:t>
+              <a:t>greater </a:t>
+            </a:r>
+            <a:r>
+              <a:rPr lang="en-AU" sz="4500" b="1" dirty="0">
+                <a:solidFill>
+                  <a:srgbClr val="7030A0"/>
+                </a:solidFill>
+              </a:rPr>
+              <a:t>propagation of shocks</a:t>
+            </a:r>
+            <a:r>
+              <a:rPr lang="en-AU" sz="4500" dirty="0">
+                <a:solidFill>
+                  <a:srgbClr val="7030A0"/>
+                </a:solidFill>
+              </a:rPr>
+              <a:t>, but also </a:t>
+            </a:r>
+            <a:r>
+              <a:rPr lang="en-AU" sz="4500" b="1" dirty="0">
+                <a:solidFill>
+                  <a:srgbClr val="7030A0"/>
+                </a:solidFill>
+              </a:rPr>
+              <a:t>opportunity for change</a:t>
             </a:r>
           </a:p>
           <a:p>

</xml_diff>

<commit_message>
slides significantly modified: now emsee is upfront
</commit_message>
<xml_diff>
--- a/powerpoint/glad-slides.pptx
+++ b/powerpoint/glad-slides.pptx
@@ -17441,7 +17441,7 @@
                   <a:srgbClr val="7030A0"/>
                 </a:solidFill>
               </a:rPr>
-              <a:t>all 20 SEE hold</a:t>
+              <a:t>all 19 SEE hold</a:t>
             </a:r>
           </a:p>
           <a:p>
@@ -17783,7 +17783,7 @@
                   <a:srgbClr val="7030A0"/>
                 </a:solidFill>
               </a:rPr>
-              <a:t>not all 20 SEE hold</a:t>
+              <a:t>not all 19 SEE hold</a:t>
             </a:r>
           </a:p>
           <a:p>
@@ -21479,11 +21479,11 @@
                   <a:srgbClr val="7030A0"/>
                 </a:solidFill>
               </a:rPr>
-              <a:t>: </a:t>
+              <a:t>: some </a:t>
             </a:r>
             <a:r>
               <a:rPr lang="en-AU" sz="7400" dirty="0"/>
-              <a:t>the SEE unlikely to hold (given uncertainty and out-of-date capital)</a:t>
+              <a:t>SEE will not hold (given uncertainty and out-of-date capital)</a:t>
             </a:r>
           </a:p>
           <a:p>
@@ -22780,7 +22780,7 @@
         </p:spPr>
         <p:txBody>
           <a:bodyPr anchor="ctr">
-            <a:normAutofit fontScale="70000" lnSpcReduction="20000"/>
+            <a:normAutofit fontScale="62500" lnSpcReduction="20000"/>
           </a:bodyPr>
           <a:lstStyle/>
           <a:p>
@@ -22788,7 +22788,7 @@
               <a:buNone/>
             </a:pPr>
             <a:r>
-              <a:rPr lang="en-AU" sz="3400" b="1" dirty="0">
+              <a:rPr lang="en-AU" sz="3800" b="1" dirty="0">
                 <a:solidFill>
                   <a:srgbClr val="7030A0"/>
                 </a:solidFill>
@@ -22796,11 +22796,11 @@
               <a:t>S</a:t>
             </a:r>
             <a:r>
-              <a:rPr lang="en-AU" sz="3400" b="1" dirty="0"/>
+              <a:rPr lang="en-AU" sz="3800" b="1" dirty="0"/>
               <a:t>ector-specific</a:t>
             </a:r>
             <a:r>
-              <a:rPr lang="en-AU" sz="3400" b="1" dirty="0">
+              <a:rPr lang="en-AU" sz="3800" b="1" dirty="0">
                 <a:solidFill>
                   <a:srgbClr val="7030A0"/>
                 </a:solidFill>
@@ -22808,11 +22808,11 @@
               <a:t> E</a:t>
             </a:r>
             <a:r>
-              <a:rPr lang="en-AU" sz="3400" b="1" dirty="0"/>
+              <a:rPr lang="en-AU" sz="3800" b="1" dirty="0"/>
               <a:t>uler </a:t>
             </a:r>
             <a:r>
-              <a:rPr lang="en-AU" sz="3400" b="1" dirty="0">
+              <a:rPr lang="en-AU" sz="3800" b="1" dirty="0">
                 <a:solidFill>
                   <a:srgbClr val="7030A0"/>
                 </a:solidFill>
@@ -22820,57 +22820,49 @@
               <a:t>E</a:t>
             </a:r>
             <a:r>
-              <a:rPr lang="en-AU" sz="3400" b="1" dirty="0"/>
+              <a:rPr lang="en-AU" sz="3800" b="1" dirty="0"/>
               <a:t>q’ns:</a:t>
             </a:r>
           </a:p>
           <a:p>
-            <a:pPr marL="914400" lvl="2" indent="0">
+            <a:pPr marL="457200" lvl="1" indent="0">
               <a:buNone/>
             </a:pPr>
             <a:r>
-              <a:rPr lang="en-AU" sz="2500" i="1" dirty="0"/>
+              <a:rPr lang="en-AU" sz="3300" i="1" dirty="0"/>
               <a:t>Testable condition</a:t>
             </a:r>
             <a:r>
-              <a:rPr lang="en-AU" sz="2500" dirty="0"/>
+              <a:rPr lang="en-AU" sz="3300" dirty="0"/>
               <a:t>:   ``value capital today’’   </a:t>
             </a:r>
             <a:r>
-              <a:rPr lang="en-AU" sz="2900" dirty="0">
+              <a:rPr lang="en-AU" sz="3300" dirty="0">
                 <a:solidFill>
                   <a:srgbClr val="7030A0"/>
                 </a:solidFill>
               </a:rPr>
-              <a:t>=</a:t>
-            </a:r>
-            <a:r>
-              <a:rPr lang="en-AU" sz="2500" dirty="0">
-                <a:solidFill>
-                  <a:srgbClr val="7030A0"/>
-                </a:solidFill>
-              </a:rPr>
-              <a:t> </a:t>
-            </a:r>
-            <a:r>
-              <a:rPr lang="en-AU" sz="2500" dirty="0"/>
+              <a:t>= </a:t>
+            </a:r>
+            <a:r>
+              <a:rPr lang="en-AU" sz="3300" dirty="0"/>
               <a:t>  ``</a:t>
             </a:r>
             <a:r>
-              <a:rPr lang="en-AU" sz="2500" b="1" dirty="0"/>
+              <a:rPr lang="en-AU" sz="3300" b="1" dirty="0"/>
               <a:t>expected value </a:t>
             </a:r>
             <a:r>
-              <a:rPr lang="en-AU" sz="2500" dirty="0"/>
+              <a:rPr lang="en-AU" sz="3300" dirty="0"/>
               <a:t>of capital in the future’’</a:t>
             </a:r>
           </a:p>
           <a:p>
-            <a:pPr marL="914400" lvl="2" indent="0">
+            <a:pPr marL="457200" lvl="1" indent="0">
               <a:buNone/>
             </a:pPr>
             <a:r>
-              <a:rPr lang="en-AU" sz="2500" i="1" dirty="0">
+              <a:rPr lang="en-AU" sz="3300" i="1" dirty="0">
                 <a:solidFill>
                   <a:srgbClr val="7030A0"/>
                 </a:solidFill>
@@ -22878,7 +22870,7 @@
               <a:t>When the </a:t>
             </a:r>
             <a:r>
-              <a:rPr lang="en-AU" sz="2500" b="1" i="1" dirty="0">
+              <a:rPr lang="en-AU" sz="3300" b="1" i="1" dirty="0">
                 <a:solidFill>
                   <a:srgbClr val="7030A0"/>
                 </a:solidFill>
@@ -22886,7 +22878,7 @@
               <a:t>SEE</a:t>
             </a:r>
             <a:r>
-              <a:rPr lang="en-AU" sz="2500" i="1" dirty="0">
+              <a:rPr lang="en-AU" sz="3300" i="1" dirty="0">
                 <a:solidFill>
                   <a:srgbClr val="7030A0"/>
                 </a:solidFill>
@@ -22894,7 +22886,7 @@
               <a:t> hold, </a:t>
             </a:r>
             <a:r>
-              <a:rPr lang="en-AU" sz="2500" b="1" dirty="0">
+              <a:rPr lang="en-AU" sz="3300" b="1" dirty="0">
                 <a:solidFill>
                   <a:srgbClr val="7030A0"/>
                 </a:solidFill>
@@ -22903,41 +22895,41 @@
             </a:r>
           </a:p>
           <a:p>
-            <a:pPr lvl="2"/>
-            <a:r>
-              <a:rPr lang="en-AU" sz="2500" dirty="0"/>
+            <a:pPr lvl="1"/>
+            <a:r>
+              <a:rPr lang="en-AU" sz="3300" dirty="0"/>
               <a:t>Absent in intersectoral models: </a:t>
             </a:r>
             <a:r>
-              <a:rPr lang="en-AU" sz="2500" dirty="0" err="1"/>
+              <a:rPr lang="en-AU" sz="3300" dirty="0" err="1"/>
               <a:t>CoPS</a:t>
             </a:r>
             <a:r>
-              <a:rPr lang="en-AU" sz="2500" dirty="0"/>
+              <a:rPr lang="en-AU" sz="3300" dirty="0"/>
               <a:t>; </a:t>
             </a:r>
             <a:r>
-              <a:rPr lang="en-AU" sz="2500" dirty="0" err="1"/>
+              <a:rPr lang="en-AU" sz="3300" dirty="0" err="1"/>
               <a:t>Atalay</a:t>
             </a:r>
             <a:r>
-              <a:rPr lang="en-AU" sz="2500" dirty="0"/>
+              <a:rPr lang="en-AU" sz="3300" dirty="0"/>
               <a:t>; </a:t>
             </a:r>
             <a:r>
-              <a:rPr lang="en-AU" sz="2500" dirty="0" err="1"/>
+              <a:rPr lang="en-AU" sz="3300" dirty="0" err="1"/>
               <a:t>Cesa</a:t>
             </a:r>
             <a:r>
-              <a:rPr lang="en-AU" sz="2500" dirty="0"/>
+              <a:rPr lang="en-AU" sz="3300" dirty="0"/>
               <a:t>-Bianchi et al; </a:t>
             </a:r>
             <a:r>
-              <a:rPr lang="en-AU" sz="2500" dirty="0" err="1"/>
+              <a:rPr lang="en-AU" sz="3300" dirty="0" err="1"/>
               <a:t>Baqaee</a:t>
             </a:r>
             <a:r>
-              <a:rPr lang="en-AU" sz="2500" dirty="0"/>
+              <a:rPr lang="en-AU" sz="3300" dirty="0"/>
               <a:t> and Farhi</a:t>
             </a:r>
           </a:p>
@@ -22956,7 +22948,7 @@
               <a:buNone/>
             </a:pPr>
             <a:r>
-              <a:rPr lang="en-AU" sz="3400" b="1" dirty="0">
+              <a:rPr lang="en-AU" sz="3800" b="1" dirty="0">
                 <a:solidFill>
                   <a:srgbClr val="7030A0"/>
                 </a:solidFill>
@@ -22964,22 +22956,14 @@
               <a:t>Transition to net zero: </a:t>
             </a:r>
             <a:r>
-              <a:rPr lang="en-AU" sz="3400" dirty="0">
+              <a:rPr lang="en-AU" sz="3800" dirty="0">
                 <a:solidFill>
                   <a:srgbClr val="7030A0"/>
                 </a:solidFill>
               </a:rPr>
-              <a:t>some </a:t>
-            </a:r>
-            <a:r>
-              <a:rPr lang="en-AU" sz="3600" dirty="0">
-                <a:solidFill>
-                  <a:srgbClr val="7030A0"/>
-                </a:solidFill>
-              </a:rPr>
-              <a:t>SEE may fail to hold and, in this case:</a:t>
-            </a:r>
-            <a:endParaRPr lang="en-AU" sz="3400" i="1" dirty="0"/>
+              <a:t>some SEE may fail to hold </a:t>
+            </a:r>
+            <a:endParaRPr lang="en-AU" sz="3800" i="1" dirty="0"/>
           </a:p>
           <a:p>
             <a:pPr lvl="1"/>
@@ -23066,6 +23050,18 @@
             </a:r>
           </a:p>
           <a:p>
+            <a:pPr lvl="1"/>
+            <a:r>
+              <a:rPr lang="en-AU" sz="2000" b="1" dirty="0"/>
+              <a:t>Capital</a:t>
+            </a:r>
+            <a:r>
+              <a:rPr lang="en-AU" sz="2000" dirty="0"/>
+              <a:t> depreciates and is optimally replenished to grow the economy.</a:t>
+            </a:r>
+            <a:endParaRPr lang="en-AU" sz="2000" b="1" dirty="0"/>
+          </a:p>
+          <a:p>
             <a:pPr marL="457200" lvl="1" indent="0">
               <a:buNone/>
             </a:pPr>
@@ -23084,19 +23080,6 @@
             <a:r>
               <a:rPr lang="en-AU" sz="2000" dirty="0"/>
               <a:t>iates (with imports) and a fixed factor.</a:t>
-            </a:r>
-          </a:p>
-          <a:p>
-            <a:pPr marL="457200" lvl="1" indent="0">
-              <a:buNone/>
-            </a:pPr>
-            <a:r>
-              <a:rPr lang="en-AU" sz="2000" b="1" dirty="0"/>
-              <a:t>Capital</a:t>
-            </a:r>
-            <a:r>
-              <a:rPr lang="en-AU" sz="2000" dirty="0"/>
-              <a:t> depreciates and is optimally replenished to grow the economy.</a:t>
             </a:r>
           </a:p>
           <a:p>
@@ -23122,9 +23105,51 @@
                   <a:srgbClr val="7030A0"/>
                 </a:solidFill>
               </a:rPr>
-              <a:t>Solve as a sequence of overlapping nonlinear dynamic programs</a:t>
-            </a:r>
-            <a:endParaRPr lang="en-AU" sz="2000" dirty="0"/>
+              <a:t>Solve as a sequence of overlapping nonlinear dynamic programs </a:t>
+            </a:r>
+            <a:r>
+              <a:rPr lang="en-AU" sz="2000" dirty="0"/>
+              <a:t>(Cai–Judd; Na et al.; 2021)</a:t>
+            </a:r>
+          </a:p>
+        </p:txBody>
+      </p:sp>
+      <p:sp>
+        <p:nvSpPr>
+          <p:cNvPr id="11" name="TextBox 10">
+            <a:extLst>
+              <a:ext uri="{FF2B5EF4-FFF2-40B4-BE49-F238E27FC236}">
+                <a16:creationId xmlns:a16="http://schemas.microsoft.com/office/drawing/2014/main" id="{18DBD0F4-574E-55AC-5E60-C2504C7F5C3A}"/>
+              </a:ext>
+            </a:extLst>
+          </p:cNvPr>
+          <p:cNvSpPr txBox="1"/>
+          <p:nvPr/>
+        </p:nvSpPr>
+        <p:spPr>
+          <a:xfrm>
+            <a:off x="6975158" y="4981694"/>
+            <a:ext cx="328612" cy="461665"/>
+          </a:xfrm>
+          <a:prstGeom prst="rect">
+            <a:avLst/>
+          </a:prstGeom>
+          <a:noFill/>
+        </p:spPr>
+        <p:txBody>
+          <a:bodyPr wrap="square">
+            <a:spAutoFit/>
+          </a:bodyPr>
+          <a:lstStyle/>
+          <a:p>
+            <a:r>
+              <a:rPr lang="en-US" sz="2400" dirty="0">
+                <a:solidFill>
+                  <a:srgbClr val="7030A0"/>
+                </a:solidFill>
+              </a:rPr>
+              <a:t>∴</a:t>
+            </a:r>
           </a:p>
         </p:txBody>
       </p:sp>
@@ -23335,7 +23360,7 @@
           <a:p>
             <a:pPr lvl="1"/>
             <a:r>
-              <a:rPr lang="en-AU" sz="2600" dirty="0"/>
+              <a:rPr lang="en-AU" dirty="0"/>
               <a:t>One of only three countries in the world along with Brazil and Venezuela.</a:t>
             </a:r>
           </a:p>
@@ -23382,27 +23407,35 @@
           <a:p>
             <a:pPr lvl="1"/>
             <a:r>
-              <a:rPr lang="en-AU" sz="2800" dirty="0"/>
+              <a:rPr lang="en-AU" dirty="0"/>
               <a:t>Gladstone Bauxite imports less than half of Weipa production</a:t>
             </a:r>
           </a:p>
           <a:p>
             <a:pPr lvl="1"/>
             <a:r>
-              <a:rPr lang="en-AU" sz="2800" dirty="0"/>
+              <a:rPr lang="en-AU" dirty="0"/>
               <a:t>QAL and Yarwun: Alumina sales to BSL is 15% of total output</a:t>
             </a:r>
-            <a:endParaRPr lang="en-AU" sz="2800" i="1" dirty="0"/>
+            <a:endParaRPr lang="en-AU" i="1" dirty="0"/>
           </a:p>
           <a:p>
             <a:pPr marL="457200" lvl="1" indent="0">
               <a:buNone/>
             </a:pPr>
             <a:r>
-              <a:rPr lang="en-AU" sz="2800" i="1" dirty="0"/>
+              <a:rPr lang="en-AU" sz="2500" i="1" dirty="0">
+                <a:solidFill>
+                  <a:srgbClr val="7030A0"/>
+                </a:solidFill>
+              </a:rPr>
               <a:t>No obvious major threats to overall supply chain: Rio Tinto is majority owner</a:t>
             </a:r>
-            <a:endParaRPr lang="en-AU" sz="3000" dirty="0"/>
+            <a:endParaRPr lang="en-AU" sz="2500" dirty="0">
+              <a:solidFill>
+                <a:srgbClr val="7030A0"/>
+              </a:solidFill>
+            </a:endParaRPr>
           </a:p>
           <a:p>
             <a:endParaRPr lang="en-AU" sz="2000" dirty="0"/>
@@ -23447,30 +23480,37 @@
           <a:p>
             <a:pPr lvl="1"/>
             <a:r>
-              <a:rPr lang="en-AU" sz="2600" dirty="0"/>
+              <a:rPr lang="en-AU" dirty="0"/>
               <a:t>Like other smelters it is in close proximity of energy resources</a:t>
             </a:r>
           </a:p>
           <a:p>
             <a:pPr lvl="1"/>
             <a:r>
-              <a:rPr lang="en-AU" sz="2600" dirty="0"/>
-              <a:t>Recent Smelter closure: Kurri Kurri smelter, closed in 2012</a:t>
-            </a:r>
-          </a:p>
-          <a:p>
-            <a:pPr lvl="1"/>
-            <a:r>
-              <a:rPr lang="en-AU" sz="2600" dirty="0"/>
-              <a:t>Tiwai Point smelter, New Zealand </a:t>
-            </a:r>
-            <a:r>
-              <a:rPr lang="en-AU" sz="2600" i="1" dirty="0"/>
+              <a:rPr lang="en-AU" dirty="0"/>
+              <a:t>Recent smelter closures: </a:t>
+            </a:r>
+          </a:p>
+          <a:p>
+            <a:pPr lvl="2"/>
+            <a:r>
+              <a:rPr lang="en-AU" sz="2100" dirty="0"/>
+              <a:t>Kurri Kurri, NSW closed in 2012</a:t>
+            </a:r>
+          </a:p>
+          <a:p>
+            <a:pPr lvl="2"/>
+            <a:r>
+              <a:rPr lang="en-AU" sz="2100" dirty="0"/>
+              <a:t>Tiwai Point, New Zealand </a:t>
+            </a:r>
+            <a:r>
+              <a:rPr lang="en-AU" sz="2100" i="1" dirty="0"/>
               <a:t>almost </a:t>
             </a:r>
             <a:r>
-              <a:rPr lang="en-AU" sz="2600" dirty="0"/>
-              <a:t>closed in 2020-2021:</a:t>
+              <a:rPr lang="en-AU" sz="2100" dirty="0"/>
+              <a:t>closed in 2020-2021</a:t>
             </a:r>
           </a:p>
           <a:p>
@@ -23492,7 +23532,7 @@
           <a:p>
             <a:pPr lvl="1"/>
             <a:r>
-              <a:rPr lang="en-AU" sz="2600" dirty="0"/>
+              <a:rPr lang="en-AU" dirty="0"/>
               <a:t>Sustaining heavy industry in Qld is a key part of the transition</a:t>
             </a:r>
           </a:p>
@@ -24172,7 +24212,7 @@
         </p:spPr>
         <p:txBody>
           <a:bodyPr>
-            <a:normAutofit fontScale="92500" lnSpcReduction="10000"/>
+            <a:normAutofit lnSpcReduction="10000"/>
           </a:bodyPr>
           <a:lstStyle/>
           <a:p>
@@ -24180,21 +24220,21 @@
               <a:buNone/>
             </a:pPr>
             <a:r>
-              <a:rPr lang="en-AU" sz="2400" b="1" dirty="0"/>
-              <a:t>Using data we specialise the model to the Gladstone region with 19 ANZSIC divisions</a:t>
-            </a:r>
-            <a:endParaRPr lang="en-AU" sz="2400" b="1" i="1" dirty="0"/>
+              <a:rPr lang="en-AU" sz="2600" b="1" dirty="0"/>
+              <a:t>We specialise the model to the Gladstone region with 19 ANZSIC divisions:</a:t>
+            </a:r>
+            <a:endParaRPr lang="en-AU" sz="2600" b="1" i="1" dirty="0"/>
           </a:p>
           <a:p>
             <a:pPr marL="0" indent="0">
               <a:buNone/>
             </a:pPr>
             <a:r>
-              <a:rPr lang="en-AU" sz="2400" i="1" dirty="0"/>
+              <a:rPr lang="en-AU" sz="2200" i="1" dirty="0"/>
               <a:t>Jobs in Australia</a:t>
             </a:r>
             <a:r>
-              <a:rPr lang="en-AU" sz="2400" dirty="0"/>
+              <a:rPr lang="en-AU" sz="2200" dirty="0"/>
               <a:t> ABS data: labour per sector for Gladstone 2019.</a:t>
             </a:r>
           </a:p>
@@ -24203,11 +24243,11 @@
               <a:buNone/>
             </a:pPr>
             <a:r>
-              <a:rPr lang="en-AU" sz="2400" i="1" dirty="0"/>
+              <a:rPr lang="en-AU" sz="2200" i="1" dirty="0"/>
               <a:t>Input-output flows</a:t>
             </a:r>
             <a:r>
-              <a:rPr lang="en-AU" sz="2400" dirty="0"/>
+              <a:rPr lang="en-AU" sz="2200" dirty="0"/>
               <a:t> between sectors: ABS tables 5 and 8 for Australia</a:t>
             </a:r>
           </a:p>
@@ -24216,7 +24256,7 @@
               <a:buNone/>
             </a:pPr>
             <a:r>
-              <a:rPr lang="en-AU" sz="2400" b="1" dirty="0">
+              <a:rPr lang="en-AU" sz="2200" b="1" dirty="0">
                 <a:solidFill>
                   <a:srgbClr val="7030A0"/>
                 </a:solidFill>
@@ -24224,11 +24264,11 @@
               <a:t>Investment flows </a:t>
             </a:r>
             <a:r>
-              <a:rPr lang="en-AU" sz="2400" dirty="0"/>
+              <a:rPr lang="en-AU" sz="2200" dirty="0"/>
               <a:t>between sectors: </a:t>
             </a:r>
             <a:r>
-              <a:rPr lang="en-AU" sz="2400" dirty="0">
+              <a:rPr lang="en-AU" sz="2200" dirty="0">
                 <a:solidFill>
                   <a:srgbClr val="7030A0"/>
                 </a:solidFill>
@@ -24236,7 +24276,7 @@
               <a:t>following </a:t>
             </a:r>
             <a:r>
-              <a:rPr lang="en-AU" sz="2400" dirty="0" err="1">
+              <a:rPr lang="en-AU" sz="2200" dirty="0" err="1">
                 <a:solidFill>
                   <a:srgbClr val="7030A0"/>
                 </a:solidFill>
@@ -24244,7 +24284,7 @@
               <a:t>Atalay</a:t>
             </a:r>
             <a:r>
-              <a:rPr lang="en-AU" sz="2400" dirty="0">
+              <a:rPr lang="en-AU" sz="2200" dirty="0">
                 <a:solidFill>
                   <a:srgbClr val="7030A0"/>
                 </a:solidFill>
@@ -24255,14 +24295,14 @@
           <a:p>
             <a:pPr lvl="1"/>
             <a:r>
-              <a:rPr lang="en-AU" dirty="0"/>
+              <a:rPr lang="en-AU" sz="2200" dirty="0"/>
               <a:t>Adapt investment flows tables from the US Bureau of Economic Analysis</a:t>
             </a:r>
           </a:p>
           <a:p>
             <a:pPr lvl="1"/>
             <a:r>
-              <a:rPr lang="en-AU" dirty="0"/>
+              <a:rPr lang="en-AU" sz="2200" dirty="0"/>
               <a:t>ABS Gross Fixed Capital Formation by Industry by type of Asset</a:t>
             </a:r>
           </a:p>
@@ -24271,7 +24311,7 @@
               <a:buNone/>
             </a:pPr>
             <a:r>
-              <a:rPr lang="en-AU" sz="2400" b="1" dirty="0">
+              <a:rPr lang="en-AU" sz="2200" b="1" dirty="0">
                 <a:solidFill>
                   <a:srgbClr val="7030A0"/>
                 </a:solidFill>
@@ -24279,19 +24319,19 @@
               <a:t>BLADE</a:t>
             </a:r>
             <a:r>
-              <a:rPr lang="en-AU" sz="2400" i="1" dirty="0"/>
+              <a:rPr lang="en-AU" sz="2200" i="1" dirty="0"/>
               <a:t> (and </a:t>
             </a:r>
             <a:r>
-              <a:rPr lang="en-AU" sz="2400" i="1" dirty="0" err="1"/>
+              <a:rPr lang="en-AU" sz="2200" i="1" dirty="0" err="1"/>
               <a:t>Remplan</a:t>
             </a:r>
             <a:r>
-              <a:rPr lang="en-AU" sz="2400" i="1" dirty="0"/>
+              <a:rPr lang="en-AU" sz="2200" i="1" dirty="0"/>
               <a:t>): </a:t>
             </a:r>
             <a:r>
-              <a:rPr lang="en-AU" sz="2400" dirty="0">
+              <a:rPr lang="en-AU" sz="2200" dirty="0">
                 <a:solidFill>
                   <a:srgbClr val="7030A0"/>
                 </a:solidFill>
@@ -24304,22 +24344,22 @@
               <a:buNone/>
             </a:pPr>
             <a:r>
-              <a:rPr lang="en-AU" sz="2400" i="1" dirty="0"/>
+              <a:rPr lang="en-AU" sz="2200" i="1" dirty="0"/>
               <a:t>Gladstone Port</a:t>
             </a:r>
             <a:r>
-              <a:rPr lang="en-AU" sz="2400" dirty="0"/>
+              <a:rPr lang="en-AU" sz="2200" dirty="0"/>
               <a:t> data for Bauxite, Alumina, Aluminium and Coal</a:t>
             </a:r>
           </a:p>
           <a:p>
             <a:pPr lvl="1"/>
             <a:r>
-              <a:rPr lang="en-AU" dirty="0" err="1"/>
+              <a:rPr lang="en-AU" sz="2200" dirty="0" err="1"/>
               <a:t>Eg.</a:t>
             </a:r>
             <a:r>
-              <a:rPr lang="en-AU" dirty="0"/>
+              <a:rPr lang="en-AU" sz="2200" dirty="0"/>
               <a:t> Bauxite imports</a:t>
             </a:r>
           </a:p>
@@ -24328,11 +24368,11 @@
               <a:buNone/>
             </a:pPr>
             <a:r>
-              <a:rPr lang="en-AU" sz="2400" i="1" dirty="0"/>
+              <a:rPr lang="en-AU" sz="2200" i="1" dirty="0"/>
               <a:t>Rio Tinto</a:t>
             </a:r>
             <a:r>
-              <a:rPr lang="en-AU" sz="2400" dirty="0"/>
+              <a:rPr lang="en-AU" sz="2200" dirty="0"/>
               <a:t> accounts</a:t>
             </a:r>
           </a:p>
@@ -24341,25 +24381,25 @@
               <a:buNone/>
             </a:pPr>
             <a:r>
-              <a:rPr lang="en-AU" sz="2400" i="1" dirty="0"/>
+              <a:rPr lang="en-AU" sz="2200" i="1" dirty="0"/>
               <a:t>Studies </a:t>
             </a:r>
             <a:r>
-              <a:rPr lang="en-AU" sz="2400" dirty="0"/>
+              <a:rPr lang="en-AU" sz="2200" dirty="0"/>
               <a:t>on aluminium production e.g. </a:t>
             </a:r>
           </a:p>
           <a:p>
             <a:pPr lvl="1"/>
             <a:r>
-              <a:rPr lang="en-AU" dirty="0"/>
+              <a:rPr lang="en-AU" sz="2200" dirty="0"/>
               <a:t>Gagne and Nappi 2000</a:t>
             </a:r>
           </a:p>
           <a:p>
             <a:pPr lvl="1"/>
             <a:r>
-              <a:rPr lang="en-AU" dirty="0"/>
+              <a:rPr lang="en-AU" sz="2200" dirty="0"/>
               <a:t>Best Available Techniques 2017</a:t>
             </a:r>
           </a:p>

</xml_diff>

<commit_message>
many more edits to slides
</commit_message>
<xml_diff>
--- a/powerpoint/glad-slides.pptx
+++ b/powerpoint/glad-slides.pptx
@@ -17395,7 +17395,7 @@
         <p:spPr>
           <a:xfrm>
             <a:off x="838200" y="693094"/>
-            <a:ext cx="5257800" cy="3424511"/>
+            <a:ext cx="5257800" cy="3231089"/>
           </a:xfrm>
           <a:solidFill>
             <a:schemeClr val="bg2"/>
@@ -17428,9 +17428,61 @@
             <a:pPr marL="457200" lvl="1" indent="0">
               <a:buNone/>
             </a:pPr>
+            <a:endParaRPr lang="en-AU" sz="2000" b="1" dirty="0"/>
+          </a:p>
+          <a:p>
+            <a:pPr marL="457200" lvl="1" indent="0">
+              <a:buNone/>
+            </a:pPr>
+            <a:r>
+              <a:rPr lang="en-AU" sz="2000" b="1" dirty="0"/>
+              <a:t>1st phase</a:t>
+            </a:r>
+            <a:r>
+              <a:rPr lang="en-AU" sz="2000" dirty="0"/>
+              <a:t>: </a:t>
+            </a:r>
+            <a:r>
+              <a:rPr lang="en-AU" sz="2000" dirty="0">
+                <a:solidFill>
+                  <a:srgbClr val="7030A0"/>
+                </a:solidFill>
+              </a:rPr>
+              <a:t>tune/regionalise parameters</a:t>
+            </a:r>
+            <a:r>
+              <a:rPr lang="en-AU" sz="2000" dirty="0"/>
+              <a:t> </a:t>
+            </a:r>
+          </a:p>
+          <a:p>
+            <a:pPr marL="457200" lvl="1" indent="0">
+              <a:buNone/>
+            </a:pPr>
+            <a:r>
+              <a:rPr lang="en-AU" sz="2000" b="1" dirty="0"/>
+              <a:t>2nd phase</a:t>
+            </a:r>
+            <a:r>
+              <a:rPr lang="en-AU" sz="2000" dirty="0"/>
+              <a:t>: </a:t>
+            </a:r>
+            <a:r>
+              <a:rPr lang="en-AU" sz="2000" dirty="0">
+                <a:solidFill>
+                  <a:srgbClr val="7030A0"/>
+                </a:solidFill>
+              </a:rPr>
+              <a:t>capital evolves towards a balanced growth path;</a:t>
+            </a:r>
+          </a:p>
+          <a:p>
+            <a:pPr marL="457200" lvl="1" indent="0">
+              <a:buNone/>
+            </a:pPr>
             <a:r>
               <a:rPr lang="en-AU" b="1" dirty="0"/>
-              <a:t>1st phase</a:t>
+              <a:t>3rd phase</a:t>
             </a:r>
             <a:r>
               <a:rPr lang="en-AU" dirty="0"/>
@@ -17442,71 +17494,24 @@
                   <a:srgbClr val="7030A0"/>
                 </a:solidFill>
               </a:rPr>
-              <a:t>tune parameters to regionalise;</a:t>
-            </a:r>
-            <a:endParaRPr lang="en-AU" b="1" i="1" dirty="0">
-              <a:solidFill>
-                <a:srgbClr val="7030A0"/>
-              </a:solidFill>
-            </a:endParaRPr>
-          </a:p>
-          <a:p>
-            <a:pPr marL="457200" lvl="1" indent="0">
-              <a:buNone/>
-            </a:pPr>
-            <a:r>
-              <a:rPr lang="en-AU" b="1" dirty="0"/>
-              <a:t>2nd phase</a:t>
-            </a:r>
-            <a:r>
-              <a:rPr lang="en-AU" dirty="0"/>
-              <a:t>: </a:t>
-            </a:r>
+              <a:t>continue and generate</a:t>
+            </a:r>
+          </a:p>
+          <a:p>
+            <a:pPr lvl="2"/>
             <a:r>
               <a:rPr lang="en-AU" dirty="0">
                 <a:solidFill>
                   <a:srgbClr val="7030A0"/>
                 </a:solidFill>
               </a:rPr>
-              <a:t>capital evolves towards a balanced growth path;</a:t>
-            </a:r>
-          </a:p>
-          <a:p>
-            <a:pPr marL="457200" lvl="1" indent="0">
-              <a:buNone/>
-            </a:pPr>
-            <a:r>
-              <a:rPr lang="en-AU" b="1" dirty="0"/>
-              <a:t>3rd phase</a:t>
-            </a:r>
-            <a:r>
-              <a:rPr lang="en-AU" dirty="0"/>
-              <a:t>: </a:t>
-            </a:r>
+              <a:t>``status quo’’ path</a:t>
+            </a:r>
+          </a:p>
+          <a:p>
+            <a:pPr lvl="2"/>
             <a:r>
               <a:rPr lang="en-AU" dirty="0">
-                <a:solidFill>
-                  <a:srgbClr val="7030A0"/>
-                </a:solidFill>
-              </a:rPr>
-              <a:t>continue along same path and generate</a:t>
-            </a:r>
-          </a:p>
-          <a:p>
-            <a:pPr lvl="2"/>
-            <a:r>
-              <a:rPr lang="en-AU" sz="2200" dirty="0">
-                <a:solidFill>
-                  <a:srgbClr val="7030A0"/>
-                </a:solidFill>
-              </a:rPr>
-              <a:t>``status quo’’ path</a:t>
-            </a:r>
-          </a:p>
-          <a:p>
-            <a:pPr lvl="2"/>
-            <a:r>
-              <a:rPr lang="en-AU" sz="2200" dirty="0">
                 <a:solidFill>
                   <a:srgbClr val="7030A0"/>
                 </a:solidFill>
@@ -17576,7 +17581,7 @@
         <p:spPr>
           <a:xfrm>
             <a:off x="6226896" y="693094"/>
-            <a:ext cx="5126904" cy="3424511"/>
+            <a:ext cx="5126904" cy="3231089"/>
           </a:xfrm>
           <a:prstGeom prst="rect">
             <a:avLst/>
@@ -17791,9 +17796,62 @@
             <a:pPr marL="457200" lvl="1" indent="0">
               <a:buNone/>
             </a:pPr>
+            <a:endParaRPr lang="en-AU" sz="2000" b="1" dirty="0"/>
+          </a:p>
+          <a:p>
+            <a:pPr marL="457200" lvl="1" indent="0">
+              <a:buNone/>
+            </a:pPr>
+            <a:r>
+              <a:rPr lang="en-AU" sz="2000" b="1" dirty="0"/>
+              <a:t>1st phase</a:t>
+            </a:r>
+            <a:r>
+              <a:rPr lang="en-AU" sz="2000" dirty="0"/>
+              <a:t>: </a:t>
+            </a:r>
+            <a:r>
+              <a:rPr lang="en-AU" sz="2000" dirty="0">
+                <a:solidFill>
+                  <a:srgbClr val="7030A0"/>
+                </a:solidFill>
+              </a:rPr>
+              <a:t>tune/regionalise parameters; </a:t>
+            </a:r>
+            <a:endParaRPr lang="en-AU" sz="2000" b="1" i="1" dirty="0">
+              <a:solidFill>
+                <a:schemeClr val="accent6"/>
+              </a:solidFill>
+            </a:endParaRPr>
+          </a:p>
+          <a:p>
+            <a:pPr marL="457200" lvl="1" indent="0">
+              <a:buNone/>
+            </a:pPr>
+            <a:r>
+              <a:rPr lang="en-AU" sz="2000" b="1" dirty="0"/>
+              <a:t>2nd phase</a:t>
+            </a:r>
+            <a:r>
+              <a:rPr lang="en-AU" sz="2000" dirty="0"/>
+              <a:t>: </a:t>
+            </a:r>
+            <a:r>
+              <a:rPr lang="en-AU" sz="2000" dirty="0">
+                <a:solidFill>
+                  <a:srgbClr val="7030A0"/>
+                </a:solidFill>
+              </a:rPr>
+              <a:t>capital evolves towards a balanced growth path;</a:t>
+            </a:r>
+          </a:p>
+          <a:p>
+            <a:pPr marL="457200" lvl="1" indent="0">
+              <a:buNone/>
+            </a:pPr>
             <a:r>
               <a:rPr lang="en-AU" b="1" dirty="0"/>
-              <a:t>1st phase</a:t>
+              <a:t>3rd phase</a:t>
             </a:r>
             <a:r>
               <a:rPr lang="en-AU" dirty="0"/>
@@ -17805,71 +17863,24 @@
                   <a:srgbClr val="7030A0"/>
                 </a:solidFill>
               </a:rPr>
-              <a:t>tune parameters to regionalise; </a:t>
-            </a:r>
-            <a:endParaRPr lang="en-AU" b="1" i="1" dirty="0">
-              <a:solidFill>
-                <a:schemeClr val="accent6"/>
-              </a:solidFill>
-            </a:endParaRPr>
-          </a:p>
-          <a:p>
-            <a:pPr marL="457200" lvl="1" indent="0">
-              <a:buNone/>
-            </a:pPr>
-            <a:r>
-              <a:rPr lang="en-AU" b="1" dirty="0"/>
-              <a:t>2nd phase</a:t>
-            </a:r>
-            <a:r>
-              <a:rPr lang="en-AU" dirty="0"/>
-              <a:t>: </a:t>
-            </a:r>
+              <a:t>continue and generate</a:t>
+            </a:r>
+          </a:p>
+          <a:p>
+            <a:pPr lvl="2"/>
             <a:r>
               <a:rPr lang="en-AU" dirty="0">
                 <a:solidFill>
                   <a:srgbClr val="7030A0"/>
                 </a:solidFill>
               </a:rPr>
-              <a:t>capital evolves towards a balanced growth path;</a:t>
-            </a:r>
-          </a:p>
-          <a:p>
-            <a:pPr marL="457200" lvl="1" indent="0">
-              <a:buNone/>
-            </a:pPr>
-            <a:r>
-              <a:rPr lang="en-AU" b="1" dirty="0"/>
-              <a:t>3rd phase</a:t>
-            </a:r>
-            <a:r>
-              <a:rPr lang="en-AU" dirty="0"/>
-              <a:t>: </a:t>
-            </a:r>
+              <a:t>``status quo’’ path</a:t>
+            </a:r>
+          </a:p>
+          <a:p>
+            <a:pPr lvl="2"/>
             <a:r>
               <a:rPr lang="en-AU" dirty="0">
-                <a:solidFill>
-                  <a:srgbClr val="7030A0"/>
-                </a:solidFill>
-              </a:rPr>
-              <a:t>continue along same path and generate</a:t>
-            </a:r>
-          </a:p>
-          <a:p>
-            <a:pPr lvl="2"/>
-            <a:r>
-              <a:rPr lang="en-AU" sz="2200" dirty="0">
-                <a:solidFill>
-                  <a:srgbClr val="7030A0"/>
-                </a:solidFill>
-              </a:rPr>
-              <a:t>``status quo’’ path</a:t>
-            </a:r>
-          </a:p>
-          <a:p>
-            <a:pPr lvl="2"/>
-            <a:r>
-              <a:rPr lang="en-AU" sz="2200" dirty="0">
                 <a:solidFill>
                   <a:srgbClr val="7030A0"/>
                 </a:solidFill>
@@ -17895,8 +17906,8 @@
         </p:nvSpPr>
         <p:spPr>
           <a:xfrm>
-            <a:off x="838200" y="4245493"/>
-            <a:ext cx="10515600" cy="1789547"/>
+            <a:off x="838200" y="4091941"/>
+            <a:ext cx="10515600" cy="1943100"/>
           </a:xfrm>
           <a:prstGeom prst="rect">
             <a:avLst/>
@@ -18085,8 +18096,16 @@
           </a:p>
           <a:p>
             <a:pPr lvl="1"/>
-            <a:r>
-              <a:rPr lang="en-AU" dirty="0">
+            <a:endParaRPr lang="en-AU" sz="2000" dirty="0">
+              <a:solidFill>
+                <a:srgbClr val="7030A0"/>
+              </a:solidFill>
+            </a:endParaRPr>
+          </a:p>
+          <a:p>
+            <a:pPr lvl="1"/>
+            <a:r>
+              <a:rPr lang="en-AU" sz="2000" dirty="0">
                 <a:solidFill>
                   <a:srgbClr val="7030A0"/>
                 </a:solidFill>
@@ -18097,7 +18116,7 @@
           <a:p>
             <a:pPr lvl="1"/>
             <a:r>
-              <a:rPr lang="en-AU" dirty="0">
+              <a:rPr lang="en-AU" sz="2000" dirty="0">
                 <a:solidFill>
                   <a:srgbClr val="7030A0"/>
                 </a:solidFill>
@@ -18108,7 +18127,7 @@
           <a:p>
             <a:pPr lvl="1"/>
             <a:r>
-              <a:rPr lang="en-AU" dirty="0">
+              <a:rPr lang="en-AU" sz="2000" dirty="0">
                 <a:solidFill>
                   <a:srgbClr val="7030A0"/>
                 </a:solidFill>
@@ -18116,7 +18135,7 @@
               <a:t>No </a:t>
             </a:r>
             <a:r>
-              <a:rPr lang="en-AU" b="1" dirty="0">
+              <a:rPr lang="en-AU" sz="2000" b="1" dirty="0">
                 <a:solidFill>
                   <a:srgbClr val="7030A0"/>
                 </a:solidFill>
@@ -18124,7 +18143,7 @@
               <a:t>exogenous </a:t>
             </a:r>
             <a:r>
-              <a:rPr lang="en-AU" dirty="0">
+              <a:rPr lang="en-AU" sz="2000" dirty="0">
                 <a:solidFill>
                   <a:srgbClr val="7030A0"/>
                 </a:solidFill>
@@ -18182,8 +18201,8 @@
         </p:nvSpPr>
         <p:spPr>
           <a:xfrm>
-            <a:off x="723900" y="584932"/>
-            <a:ext cx="5257800" cy="5688135"/>
+            <a:off x="723900" y="659228"/>
+            <a:ext cx="5257800" cy="5324378"/>
           </a:xfrm>
           <a:solidFill>
             <a:schemeClr val="bg2"/>
@@ -18199,19 +18218,16 @@
               <a:buNone/>
             </a:pPr>
             <a:r>
-              <a:rPr lang="en-AU" sz="2600" dirty="0">
-                <a:latin typeface="+mj-lt"/>
-              </a:rPr>
+              <a:rPr lang="en-AU" sz="2600" dirty="0"/>
               <a:t>Experiment (1a) Summary of Results</a:t>
             </a:r>
-            <a:endParaRPr lang="en-AU" sz="2600" dirty="0"/>
           </a:p>
           <a:p>
             <a:pPr marL="0" indent="0">
               <a:buNone/>
             </a:pPr>
             <a:r>
-              <a:rPr lang="en-AU" dirty="0">
+              <a:rPr lang="en-AU" sz="2600" dirty="0">
                 <a:solidFill>
                   <a:srgbClr val="7030A0"/>
                 </a:solidFill>
@@ -18223,13 +18239,13 @@
             <a:pPr marL="0" indent="0">
               <a:buNone/>
             </a:pPr>
-            <a:endParaRPr lang="en-AU" sz="2600" b="1" dirty="0"/>
+            <a:endParaRPr lang="en-AU" sz="2200" b="1" dirty="0"/>
           </a:p>
           <a:p>
             <a:pPr marL="0" indent="0">
               <a:buNone/>
             </a:pPr>
-            <a:endParaRPr lang="en-AU" sz="2600" b="1" dirty="0"/>
+            <a:endParaRPr lang="en-AU" sz="2200" b="1" dirty="0"/>
           </a:p>
           <a:p>
             <a:pPr marL="457200" lvl="1" indent="0">
@@ -18241,13 +18257,13 @@
             <a:pPr marL="457200" lvl="1" indent="0">
               <a:buNone/>
             </a:pPr>
-            <a:endParaRPr lang="en-AU" i="1" dirty="0"/>
+            <a:endParaRPr lang="en-AU" sz="2200" i="1" dirty="0"/>
           </a:p>
           <a:p>
             <a:pPr marL="0" indent="0">
               <a:buNone/>
             </a:pPr>
-            <a:endParaRPr lang="en-AU" dirty="0">
+            <a:endParaRPr lang="en-AU" sz="2200" dirty="0">
               <a:solidFill>
                 <a:srgbClr val="7030A0"/>
               </a:solidFill>
@@ -18258,12 +18274,12 @@
               <a:buNone/>
             </a:pPr>
             <a:r>
-              <a:rPr lang="en-AU" dirty="0">
+              <a:rPr lang="en-AU" sz="2600" dirty="0">
                 <a:solidFill>
                   <a:srgbClr val="7030A0"/>
                 </a:solidFill>
               </a:rPr>
-              <a:t>Utilities prices      by 4%</a:t>
+              <a:t>Utilities price falls by 4%:</a:t>
             </a:r>
           </a:p>
           <a:p>
@@ -18271,66 +18287,79 @@
               <a:buNone/>
             </a:pPr>
             <a:r>
-              <a:rPr lang="en-AU" dirty="0"/>
-              <a:t>Agriculture</a:t>
-            </a:r>
-            <a:r>
-              <a:rPr lang="en-AU" i="1" dirty="0"/>
-              <a:t>, </a:t>
-            </a:r>
-            <a:r>
-              <a:rPr lang="en-AU" dirty="0"/>
-              <a:t>Consumption </a:t>
-            </a:r>
-            <a:r>
-              <a:rPr lang="en-AU" i="1" dirty="0"/>
-              <a:t> </a:t>
-            </a:r>
-          </a:p>
-          <a:p>
-            <a:pPr lvl="1">
-              <a:buFont typeface="System Font Regular"/>
-              <a:buChar char="*"/>
-            </a:pPr>
-            <a:r>
-              <a:rPr lang="en-AU" dirty="0"/>
-              <a:t>But Gladstone is connected to NEM …</a:t>
-            </a:r>
-          </a:p>
-          <a:p>
-            <a:pPr marL="0" indent="0">
-              <a:buNone/>
-            </a:pPr>
-            <a:r>
-              <a:rPr lang="en-AU" dirty="0">
+              <a:rPr lang="en-AU" sz="1900" dirty="0">
                 <a:solidFill>
                   <a:srgbClr val="7030A0"/>
                 </a:solidFill>
               </a:rPr>
-              <a:t>Manufacturing employment      6%:</a:t>
-            </a:r>
-            <a:r>
-              <a:rPr lang="en-AU" dirty="0"/>
-              <a:t> </a:t>
-            </a:r>
-          </a:p>
-          <a:p>
-            <a:pPr lvl="1"/>
-            <a:r>
-              <a:rPr lang="en-AU" dirty="0"/>
-              <a:t>At 32% lower pay as economy strives to preserve </a:t>
-            </a:r>
-            <a:r>
-              <a:rPr lang="en-AU" dirty="0">
+              <a:t>Increases: </a:t>
+            </a:r>
+            <a:r>
+              <a:rPr lang="en-AU" sz="1900" dirty="0"/>
+              <a:t>Agriculture and Consumption</a:t>
+            </a:r>
+            <a:endParaRPr lang="en-AU" sz="1900" dirty="0">
+              <a:solidFill>
+                <a:srgbClr val="7030A0"/>
+              </a:solidFill>
+            </a:endParaRPr>
+          </a:p>
+          <a:p>
+            <a:pPr marL="0" indent="0">
+              <a:buNone/>
+            </a:pPr>
+            <a:endParaRPr lang="en-AU" sz="2200" dirty="0"/>
+          </a:p>
+          <a:p>
+            <a:pPr marL="0" indent="0">
+              <a:buNone/>
+            </a:pPr>
+            <a:r>
+              <a:rPr lang="en-AU" sz="2600" dirty="0"/>
+              <a:t>Economy preserves the status quo:</a:t>
+            </a:r>
+            <a:endParaRPr lang="en-AU" sz="2600" dirty="0">
+              <a:solidFill>
+                <a:srgbClr val="7030A0"/>
+              </a:solidFill>
+            </a:endParaRPr>
+          </a:p>
+          <a:p>
+            <a:pPr marL="457200" lvl="1" indent="0">
+              <a:buNone/>
+            </a:pPr>
+            <a:r>
+              <a:rPr lang="en-AU" sz="1900" b="1" dirty="0">
                 <a:solidFill>
                   <a:srgbClr val="7030A0"/>
                 </a:solidFill>
               </a:rPr>
-              <a:t>current equilibrium</a:t>
-            </a:r>
-            <a:r>
-              <a:rPr lang="en-AU" dirty="0"/>
-              <a:t>.</a:t>
+              <a:t>Manufacturing employment actually rises </a:t>
+            </a:r>
+          </a:p>
+          <a:p>
+            <a:pPr marL="457200" lvl="1" indent="0">
+              <a:buNone/>
+            </a:pPr>
+            <a:r>
+              <a:rPr lang="en-AU" sz="1900" b="1" dirty="0">
+                <a:solidFill>
+                  <a:srgbClr val="7030A0"/>
+                </a:solidFill>
+              </a:rPr>
+              <a:t>(</a:t>
+            </a:r>
+            <a:r>
+              <a:rPr lang="en-AU" sz="1900" dirty="0"/>
+              <a:t>Compensation of Employees does indeed fall</a:t>
+            </a:r>
+            <a:r>
+              <a:rPr lang="en-AU" sz="1900" b="1" dirty="0">
+                <a:solidFill>
+                  <a:srgbClr val="7030A0"/>
+                </a:solidFill>
+              </a:rPr>
+              <a:t>)</a:t>
             </a:r>
           </a:p>
         </p:txBody>
@@ -18645,8 +18674,8 @@
         </p:nvSpPr>
         <p:spPr>
           <a:xfrm>
-            <a:off x="6170294" y="584931"/>
-            <a:ext cx="5297805" cy="5688135"/>
+            <a:off x="6170294" y="659228"/>
+            <a:ext cx="5297805" cy="5324378"/>
           </a:xfrm>
           <a:prstGeom prst="rect">
             <a:avLst/>
@@ -18657,7 +18686,7 @@
         </p:spPr>
         <p:txBody>
           <a:bodyPr vert="horz" lIns="91440" tIns="45720" rIns="91440" bIns="45720" rtlCol="0">
-            <a:normAutofit fontScale="92500"/>
+            <a:normAutofit/>
           </a:bodyPr>
           <a:lstStyle>
             <a:lvl1pPr marL="228600" indent="-228600" algn="l" defTabSz="914400" rtl="0" eaLnBrk="1" latinLnBrk="0" hangingPunct="1">
@@ -18829,13 +18858,13 @@
               <a:buNone/>
             </a:pPr>
             <a:r>
-              <a:rPr lang="en-AU" sz="2600" dirty="0">
+              <a:rPr lang="en-AU" sz="2400" dirty="0">
                 <a:latin typeface="+mj-lt"/>
               </a:rPr>
               <a:t>Experiment (</a:t>
             </a:r>
             <a:r>
-              <a:rPr lang="en-AU" sz="2600" dirty="0">
+              <a:rPr lang="en-AU" sz="2400" dirty="0">
                 <a:solidFill>
                   <a:schemeClr val="accent6"/>
                 </a:solidFill>
@@ -18844,13 +18873,13 @@
               <a:t>2a</a:t>
             </a:r>
             <a:r>
-              <a:rPr lang="en-AU" sz="2600" dirty="0">
+              <a:rPr lang="en-AU" sz="2400" dirty="0">
                 <a:latin typeface="+mj-lt"/>
               </a:rPr>
               <a:t>) </a:t>
             </a:r>
             <a:r>
-              <a:rPr lang="en-AU" sz="2600" b="1" dirty="0">
+              <a:rPr lang="en-AU" sz="2400" b="1" dirty="0">
                 <a:solidFill>
                   <a:schemeClr val="accent6"/>
                 </a:solidFill>
@@ -18859,12 +18888,12 @@
               <a:t>An example </a:t>
             </a:r>
             <a:r>
-              <a:rPr lang="en-AU" sz="2600" dirty="0">
+              <a:rPr lang="en-AU" sz="2400" dirty="0">
                 <a:latin typeface="+mj-lt"/>
               </a:rPr>
               <a:t>of Results</a:t>
             </a:r>
-            <a:endParaRPr lang="en-AU" sz="2600" dirty="0"/>
+            <a:endParaRPr lang="en-AU" sz="2400" dirty="0"/>
           </a:p>
           <a:p>
             <a:pPr marL="0" indent="0">
@@ -18872,7 +18901,7 @@
               <a:buNone/>
             </a:pPr>
             <a:r>
-              <a:rPr lang="en-AU" dirty="0">
+              <a:rPr lang="en-AU" sz="2400" dirty="0">
                 <a:solidFill>
                   <a:srgbClr val="7030A0"/>
                 </a:solidFill>
@@ -18885,35 +18914,34 @@
               <a:buFont typeface="Arial" panose="020B0604020202020204" pitchFamily="34" charset="0"/>
               <a:buNone/>
             </a:pPr>
-            <a:endParaRPr lang="en-AU" sz="2600" b="1" dirty="0"/>
+            <a:endParaRPr lang="en-AU" sz="2000" b="1" dirty="0"/>
           </a:p>
           <a:p>
             <a:pPr marL="0" indent="0">
               <a:buFont typeface="Arial" panose="020B0604020202020204" pitchFamily="34" charset="0"/>
               <a:buNone/>
             </a:pPr>
-            <a:endParaRPr lang="en-AU" sz="2600" b="1" dirty="0"/>
+            <a:endParaRPr lang="en-AU" sz="2000" b="1" dirty="0"/>
           </a:p>
           <a:p>
             <a:pPr marL="457200" lvl="1" indent="0">
               <a:buFont typeface="Arial" panose="020B0604020202020204" pitchFamily="34" charset="0"/>
               <a:buNone/>
             </a:pPr>
-            <a:endParaRPr lang="en-AU" sz="2200" b="1" dirty="0"/>
+            <a:endParaRPr lang="en-AU" sz="2000" b="1" dirty="0"/>
           </a:p>
           <a:p>
             <a:pPr marL="457200" lvl="1" indent="0">
               <a:buFont typeface="Arial" panose="020B0604020202020204" pitchFamily="34" charset="0"/>
               <a:buNone/>
             </a:pPr>
-            <a:endParaRPr lang="en-AU" i="1" dirty="0"/>
+            <a:endParaRPr lang="en-AU" sz="2000" i="1" dirty="0"/>
           </a:p>
           <a:p>
             <a:pPr marL="0" indent="0">
-              <a:buFont typeface="Arial" panose="020B0604020202020204" pitchFamily="34" charset="0"/>
               <a:buNone/>
             </a:pPr>
-            <a:endParaRPr lang="en-AU" dirty="0">
+            <a:endParaRPr lang="en-AU" sz="2000" dirty="0">
               <a:solidFill>
                 <a:srgbClr val="7030A0"/>
               </a:solidFill>
@@ -18924,12 +18952,12 @@
               <a:buNone/>
             </a:pPr>
             <a:r>
-              <a:rPr lang="en-AU" dirty="0">
+              <a:rPr lang="en-AU" sz="2400" dirty="0">
                 <a:solidFill>
                   <a:srgbClr val="7030A0"/>
                 </a:solidFill>
               </a:rPr>
-              <a:t>Prices: Utilities     10%, Manuf.      3%</a:t>
+              <a:t>Utilities and Manufacturing prices fall</a:t>
             </a:r>
           </a:p>
           <a:p>
@@ -18937,223 +18965,83 @@
               <a:buNone/>
             </a:pPr>
             <a:r>
-              <a:rPr lang="en-AU" dirty="0"/>
-              <a:t>Agriculture</a:t>
-            </a:r>
-            <a:r>
-              <a:rPr lang="en-AU" i="1" dirty="0"/>
-              <a:t>, </a:t>
-            </a:r>
-            <a:r>
-              <a:rPr lang="en-AU" dirty="0"/>
-              <a:t>Mining</a:t>
-            </a:r>
-            <a:r>
-              <a:rPr lang="en-AU" i="1" dirty="0"/>
-              <a:t>, …      </a:t>
-            </a:r>
-            <a:r>
-              <a:rPr lang="en-AU" dirty="0"/>
-              <a:t>Consumption</a:t>
-            </a:r>
-            <a:endParaRPr lang="en-AU" i="1" dirty="0"/>
-          </a:p>
-          <a:p>
-            <a:pPr lvl="1">
-              <a:buFont typeface="System Font Regular"/>
-              <a:buChar char="*"/>
-            </a:pPr>
-            <a:r>
-              <a:rPr lang="en-AU" dirty="0"/>
-              <a:t>But Gladstone is connected to NEM …</a:t>
-            </a:r>
-          </a:p>
-          <a:p>
-            <a:pPr marL="0" indent="0">
-              <a:buFont typeface="Arial" panose="020B0604020202020204" pitchFamily="34" charset="0"/>
-              <a:buNone/>
-            </a:pPr>
-            <a:r>
-              <a:rPr lang="en-AU" dirty="0">
+              <a:rPr lang="en-AU" sz="1800" dirty="0">
                 <a:solidFill>
                   <a:srgbClr val="7030A0"/>
                 </a:solidFill>
               </a:rPr>
-              <a:t>Employment: Manuf.     1.5%:</a:t>
-            </a:r>
-          </a:p>
-          <a:p>
-            <a:pPr lvl="1"/>
-            <a:r>
-              <a:rPr lang="en-AU" dirty="0"/>
-              <a:t>At 19% lower pay.</a:t>
-            </a:r>
-          </a:p>
-          <a:p>
-            <a:pPr lvl="1"/>
-            <a:r>
-              <a:rPr lang="en-AU" dirty="0"/>
-              <a:t>Agric. employment     5%, Mining more</a:t>
+              <a:t>Increases: </a:t>
+            </a:r>
+            <a:r>
+              <a:rPr lang="en-AU" sz="1800" dirty="0"/>
+              <a:t>Agriculture</a:t>
+            </a:r>
+            <a:r>
+              <a:rPr lang="en-AU" sz="1800" i="1" dirty="0"/>
+              <a:t>, </a:t>
+            </a:r>
+            <a:r>
+              <a:rPr lang="en-AU" sz="1800" dirty="0"/>
+              <a:t>Mining, …, Consumption</a:t>
+            </a:r>
+          </a:p>
+          <a:p>
+            <a:endParaRPr lang="en-AU" sz="2400" dirty="0"/>
+          </a:p>
+          <a:p>
+            <a:pPr marL="0" indent="0">
+              <a:buNone/>
+            </a:pPr>
+            <a:r>
+              <a:rPr lang="en-AU" sz="2400" dirty="0"/>
+              <a:t>Economy departs from the status quo</a:t>
+            </a:r>
+            <a:endParaRPr lang="en-AU" sz="2400" dirty="0">
+              <a:solidFill>
+                <a:srgbClr val="7030A0"/>
+              </a:solidFill>
+            </a:endParaRPr>
+          </a:p>
+          <a:p>
+            <a:pPr marL="457200" lvl="1" indent="0">
+              <a:buNone/>
+            </a:pPr>
+            <a:r>
+              <a:rPr lang="en-AU" sz="1900" b="1" dirty="0">
+                <a:solidFill>
+                  <a:srgbClr val="7030A0"/>
+                </a:solidFill>
+              </a:rPr>
+              <a:t>Manufacturing employment falls</a:t>
+            </a:r>
+          </a:p>
+          <a:p>
+            <a:pPr marL="457200" lvl="1" indent="0">
+              <a:buNone/>
+            </a:pPr>
+            <a:r>
+              <a:rPr lang="en-AU" sz="1800" b="1" dirty="0">
+                <a:solidFill>
+                  <a:srgbClr val="7030A0"/>
+                </a:solidFill>
+              </a:rPr>
+              <a:t>(</a:t>
+            </a:r>
+            <a:r>
+              <a:rPr lang="en-AU" sz="1800" dirty="0"/>
+              <a:t>Agriculture and Mining employment rise</a:t>
+            </a:r>
+            <a:r>
+              <a:rPr lang="en-AU" sz="1800" b="1" dirty="0">
+                <a:solidFill>
+                  <a:srgbClr val="7030A0"/>
+                </a:solidFill>
+              </a:rPr>
+              <a:t>)</a:t>
             </a:r>
           </a:p>
         </p:txBody>
       </p:sp>
-      <p:pic>
-        <p:nvPicPr>
-          <p:cNvPr id="7" name="Graphic 6" descr="Arrow Up with solid fill">
-            <a:extLst>
-              <a:ext uri="{FF2B5EF4-FFF2-40B4-BE49-F238E27FC236}">
-                <a16:creationId xmlns:a16="http://schemas.microsoft.com/office/drawing/2014/main" id="{B7940942-9347-704A-8E44-6BAEE9315716}"/>
-              </a:ext>
-            </a:extLst>
-          </p:cNvPr>
-          <p:cNvPicPr>
-            <a:picLocks noChangeAspect="1"/>
-          </p:cNvPicPr>
-          <p:nvPr/>
-        </p:nvPicPr>
-        <p:blipFill>
-          <a:blip r:embed="rId2">
-            <a:extLst>
-              <a:ext uri="{28A0092B-C50C-407E-A947-70E740481C1C}">
-                <a14:useLocalDpi xmlns:a14="http://schemas.microsoft.com/office/drawing/2010/main" val="0"/>
-              </a:ext>
-              <a:ext uri="{96DAC541-7B7A-43D3-8B79-37D633B846F1}">
-                <asvg:svgBlip xmlns:asvg="http://schemas.microsoft.com/office/drawing/2016/SVG/main" r:embed="rId3"/>
-              </a:ext>
-            </a:extLst>
-          </a:blip>
-          <a:stretch>
-            <a:fillRect/>
-          </a:stretch>
-        </p:blipFill>
-        <p:spPr>
-          <a:xfrm>
-            <a:off x="4672965" y="4937756"/>
-            <a:ext cx="310515" cy="251461"/>
-          </a:xfrm>
-          <a:prstGeom prst="rect">
-            <a:avLst/>
-          </a:prstGeom>
-        </p:spPr>
-      </p:pic>
-      <p:pic>
-        <p:nvPicPr>
-          <p:cNvPr id="12" name="Graphic 11" descr="Arrow Down with solid fill">
-            <a:extLst>
-              <a:ext uri="{FF2B5EF4-FFF2-40B4-BE49-F238E27FC236}">
-                <a16:creationId xmlns:a16="http://schemas.microsoft.com/office/drawing/2014/main" id="{E9BEF21A-947F-49B9-4BBB-A5AE9E01ACCA}"/>
-              </a:ext>
-            </a:extLst>
-          </p:cNvPr>
-          <p:cNvPicPr>
-            <a:picLocks noChangeAspect="1"/>
-          </p:cNvPicPr>
-          <p:nvPr/>
-        </p:nvPicPr>
-        <p:blipFill>
-          <a:blip r:embed="rId4">
-            <a:extLst>
-              <a:ext uri="{28A0092B-C50C-407E-A947-70E740481C1C}">
-                <a14:useLocalDpi xmlns:a14="http://schemas.microsoft.com/office/drawing/2010/main" val="0"/>
-              </a:ext>
-              <a:ext uri="{96DAC541-7B7A-43D3-8B79-37D633B846F1}">
-                <asvg:svgBlip xmlns:asvg="http://schemas.microsoft.com/office/drawing/2016/SVG/main" r:embed="rId5"/>
-              </a:ext>
-            </a:extLst>
-          </a:blip>
-          <a:stretch>
-            <a:fillRect/>
-          </a:stretch>
-        </p:blipFill>
-        <p:spPr>
-          <a:xfrm>
-            <a:off x="2827020" y="3703319"/>
-            <a:ext cx="274319" cy="274319"/>
-          </a:xfrm>
-          <a:prstGeom prst="rect">
-            <a:avLst/>
-          </a:prstGeom>
-        </p:spPr>
-      </p:pic>
-      <p:pic>
-        <p:nvPicPr>
-          <p:cNvPr id="13" name="Graphic 12" descr="Arrow Down with solid fill">
-            <a:extLst>
-              <a:ext uri="{FF2B5EF4-FFF2-40B4-BE49-F238E27FC236}">
-                <a16:creationId xmlns:a16="http://schemas.microsoft.com/office/drawing/2014/main" id="{3604FF1C-95A1-4D1F-B205-F4E1FB7D309D}"/>
-              </a:ext>
-            </a:extLst>
-          </p:cNvPr>
-          <p:cNvPicPr>
-            <a:picLocks noChangeAspect="1"/>
-          </p:cNvPicPr>
-          <p:nvPr/>
-        </p:nvPicPr>
-        <p:blipFill>
-          <a:blip r:embed="rId4">
-            <a:extLst>
-              <a:ext uri="{28A0092B-C50C-407E-A947-70E740481C1C}">
-                <a14:useLocalDpi xmlns:a14="http://schemas.microsoft.com/office/drawing/2010/main" val="0"/>
-              </a:ext>
-              <a:ext uri="{96DAC541-7B7A-43D3-8B79-37D633B846F1}">
-                <asvg:svgBlip xmlns:asvg="http://schemas.microsoft.com/office/drawing/2016/SVG/main" r:embed="rId5"/>
-              </a:ext>
-            </a:extLst>
-          </a:blip>
-          <a:stretch>
-            <a:fillRect/>
-          </a:stretch>
-        </p:blipFill>
-        <p:spPr>
-          <a:xfrm>
-            <a:off x="8321040" y="3703319"/>
-            <a:ext cx="274319" cy="274319"/>
-          </a:xfrm>
-          <a:prstGeom prst="rect">
-            <a:avLst/>
-          </a:prstGeom>
-        </p:spPr>
-      </p:pic>
-      <p:pic>
-        <p:nvPicPr>
-          <p:cNvPr id="15" name="Graphic 14" descr="Arrow Down with solid fill">
-            <a:extLst>
-              <a:ext uri="{FF2B5EF4-FFF2-40B4-BE49-F238E27FC236}">
-                <a16:creationId xmlns:a16="http://schemas.microsoft.com/office/drawing/2014/main" id="{F5AB8D15-39B6-0563-6CD9-30539BAE9FBA}"/>
-              </a:ext>
-            </a:extLst>
-          </p:cNvPr>
-          <p:cNvPicPr>
-            <a:picLocks noChangeAspect="1"/>
-          </p:cNvPicPr>
-          <p:nvPr/>
-        </p:nvPicPr>
-        <p:blipFill>
-          <a:blip r:embed="rId4">
-            <a:extLst>
-              <a:ext uri="{28A0092B-C50C-407E-A947-70E740481C1C}">
-                <a14:useLocalDpi xmlns:a14="http://schemas.microsoft.com/office/drawing/2010/main" val="0"/>
-              </a:ext>
-              <a:ext uri="{96DAC541-7B7A-43D3-8B79-37D633B846F1}">
-                <asvg:svgBlip xmlns:asvg="http://schemas.microsoft.com/office/drawing/2016/SVG/main" r:embed="rId5"/>
-              </a:ext>
-            </a:extLst>
-          </a:blip>
-          <a:stretch>
-            <a:fillRect/>
-          </a:stretch>
-        </p:blipFill>
-        <p:spPr>
-          <a:xfrm>
-            <a:off x="9140189" y="4914898"/>
-            <a:ext cx="274319" cy="274319"/>
-          </a:xfrm>
-          <a:prstGeom prst="rect">
-            <a:avLst/>
-          </a:prstGeom>
-        </p:spPr>
-      </p:pic>
       <p:graphicFrame>
         <p:nvGraphicFramePr>
           <p:cNvPr id="17" name="Table 17">
@@ -19409,201 +19297,6 @@
           </a:graphicData>
         </a:graphic>
       </p:graphicFrame>
-      <p:pic>
-        <p:nvPicPr>
-          <p:cNvPr id="19" name="Graphic 18" descr="Arrow Up with solid fill">
-            <a:extLst>
-              <a:ext uri="{FF2B5EF4-FFF2-40B4-BE49-F238E27FC236}">
-                <a16:creationId xmlns:a16="http://schemas.microsoft.com/office/drawing/2014/main" id="{525BF25D-FED2-5235-BA4C-26D459CAFD86}"/>
-              </a:ext>
-            </a:extLst>
-          </p:cNvPr>
-          <p:cNvPicPr>
-            <a:picLocks noChangeAspect="1"/>
-          </p:cNvPicPr>
-          <p:nvPr/>
-        </p:nvPicPr>
-        <p:blipFill>
-          <a:blip r:embed="rId2">
-            <a:extLst>
-              <a:ext uri="{28A0092B-C50C-407E-A947-70E740481C1C}">
-                <a14:useLocalDpi xmlns:a14="http://schemas.microsoft.com/office/drawing/2010/main" val="0"/>
-              </a:ext>
-              <a:ext uri="{96DAC541-7B7A-43D3-8B79-37D633B846F1}">
-                <asvg:svgBlip xmlns:asvg="http://schemas.microsoft.com/office/drawing/2016/SVG/main" r:embed="rId3"/>
-              </a:ext>
-            </a:extLst>
-          </a:blip>
-          <a:stretch>
-            <a:fillRect/>
-          </a:stretch>
-        </p:blipFill>
-        <p:spPr>
-          <a:xfrm>
-            <a:off x="9113520" y="5661656"/>
-            <a:ext cx="310515" cy="251461"/>
-          </a:xfrm>
-          <a:prstGeom prst="rect">
-            <a:avLst/>
-          </a:prstGeom>
-        </p:spPr>
-      </p:pic>
-      <p:pic>
-        <p:nvPicPr>
-          <p:cNvPr id="20" name="Graphic 19" descr="Arrow Down with solid fill">
-            <a:extLst>
-              <a:ext uri="{FF2B5EF4-FFF2-40B4-BE49-F238E27FC236}">
-                <a16:creationId xmlns:a16="http://schemas.microsoft.com/office/drawing/2014/main" id="{C87FD46D-26E9-F882-D7A9-D8B090CDAF6A}"/>
-              </a:ext>
-            </a:extLst>
-          </p:cNvPr>
-          <p:cNvPicPr>
-            <a:picLocks noChangeAspect="1"/>
-          </p:cNvPicPr>
-          <p:nvPr/>
-        </p:nvPicPr>
-        <p:blipFill>
-          <a:blip r:embed="rId4">
-            <a:extLst>
-              <a:ext uri="{28A0092B-C50C-407E-A947-70E740481C1C}">
-                <a14:useLocalDpi xmlns:a14="http://schemas.microsoft.com/office/drawing/2010/main" val="0"/>
-              </a:ext>
-              <a:ext uri="{96DAC541-7B7A-43D3-8B79-37D633B846F1}">
-                <asvg:svgBlip xmlns:asvg="http://schemas.microsoft.com/office/drawing/2016/SVG/main" r:embed="rId5"/>
-              </a:ext>
-            </a:extLst>
-          </a:blip>
-          <a:stretch>
-            <a:fillRect/>
-          </a:stretch>
-        </p:blipFill>
-        <p:spPr>
-          <a:xfrm>
-            <a:off x="10372724" y="3709032"/>
-            <a:ext cx="274319" cy="274319"/>
-          </a:xfrm>
-          <a:prstGeom prst="rect">
-            <a:avLst/>
-          </a:prstGeom>
-        </p:spPr>
-      </p:pic>
-      <p:pic>
-        <p:nvPicPr>
-          <p:cNvPr id="22" name="Graphic 21" descr="Arrow Up with solid fill">
-            <a:extLst>
-              <a:ext uri="{FF2B5EF4-FFF2-40B4-BE49-F238E27FC236}">
-                <a16:creationId xmlns:a16="http://schemas.microsoft.com/office/drawing/2014/main" id="{F8156D0B-9DCC-F510-8278-DAEC826054C9}"/>
-              </a:ext>
-            </a:extLst>
-          </p:cNvPr>
-          <p:cNvPicPr>
-            <a:picLocks noChangeAspect="1"/>
-          </p:cNvPicPr>
-          <p:nvPr/>
-        </p:nvPicPr>
-        <p:blipFill>
-          <a:blip r:embed="rId2">
-            <a:extLst>
-              <a:ext uri="{28A0092B-C50C-407E-A947-70E740481C1C}">
-                <a14:useLocalDpi xmlns:a14="http://schemas.microsoft.com/office/drawing/2010/main" val="0"/>
-              </a:ext>
-              <a:ext uri="{96DAC541-7B7A-43D3-8B79-37D633B846F1}">
-                <asvg:svgBlip xmlns:asvg="http://schemas.microsoft.com/office/drawing/2016/SVG/main" r:embed="rId3"/>
-              </a:ext>
-            </a:extLst>
-          </a:blip>
-          <a:stretch>
-            <a:fillRect/>
-          </a:stretch>
-        </p:blipFill>
-        <p:spPr>
-          <a:xfrm>
-            <a:off x="9259250" y="4076693"/>
-            <a:ext cx="310515" cy="251461"/>
-          </a:xfrm>
-          <a:prstGeom prst="rect">
-            <a:avLst/>
-          </a:prstGeom>
-        </p:spPr>
-      </p:pic>
-      <p:pic>
-        <p:nvPicPr>
-          <p:cNvPr id="23" name="Graphic 22" descr="Arrow Up with solid fill">
-            <a:extLst>
-              <a:ext uri="{FF2B5EF4-FFF2-40B4-BE49-F238E27FC236}">
-                <a16:creationId xmlns:a16="http://schemas.microsoft.com/office/drawing/2014/main" id="{B8A25321-D332-3C4E-4A45-1799F71D04F2}"/>
-              </a:ext>
-            </a:extLst>
-          </p:cNvPr>
-          <p:cNvPicPr>
-            <a:picLocks noChangeAspect="1"/>
-          </p:cNvPicPr>
-          <p:nvPr/>
-        </p:nvPicPr>
-        <p:blipFill>
-          <a:blip r:embed="rId2">
-            <a:extLst>
-              <a:ext uri="{28A0092B-C50C-407E-A947-70E740481C1C}">
-                <a14:useLocalDpi xmlns:a14="http://schemas.microsoft.com/office/drawing/2010/main" val="0"/>
-              </a:ext>
-              <a:ext uri="{96DAC541-7B7A-43D3-8B79-37D633B846F1}">
-                <asvg:svgBlip xmlns:asvg="http://schemas.microsoft.com/office/drawing/2016/SVG/main" r:embed="rId3"/>
-              </a:ext>
-            </a:extLst>
-          </a:blip>
-          <a:stretch>
-            <a:fillRect/>
-          </a:stretch>
-        </p:blipFill>
-        <p:spPr>
-          <a:xfrm>
-            <a:off x="11154726" y="4076693"/>
-            <a:ext cx="310515" cy="251461"/>
-          </a:xfrm>
-          <a:prstGeom prst="rect">
-            <a:avLst/>
-          </a:prstGeom>
-        </p:spPr>
-      </p:pic>
-      <p:pic>
-        <p:nvPicPr>
-          <p:cNvPr id="24" name="Graphic 23" descr="Arrow Up with solid fill">
-            <a:extLst>
-              <a:ext uri="{FF2B5EF4-FFF2-40B4-BE49-F238E27FC236}">
-                <a16:creationId xmlns:a16="http://schemas.microsoft.com/office/drawing/2014/main" id="{037CA09A-32B5-2C0E-1E88-E912ABD521D1}"/>
-              </a:ext>
-            </a:extLst>
-          </p:cNvPr>
-          <p:cNvPicPr>
-            <a:picLocks noChangeAspect="1"/>
-          </p:cNvPicPr>
-          <p:nvPr/>
-        </p:nvPicPr>
-        <p:blipFill>
-          <a:blip r:embed="rId2">
-            <a:extLst>
-              <a:ext uri="{28A0092B-C50C-407E-A947-70E740481C1C}">
-                <a14:useLocalDpi xmlns:a14="http://schemas.microsoft.com/office/drawing/2010/main" val="0"/>
-              </a:ext>
-              <a:ext uri="{96DAC541-7B7A-43D3-8B79-37D633B846F1}">
-                <asvg:svgBlip xmlns:asvg="http://schemas.microsoft.com/office/drawing/2016/SVG/main" r:embed="rId3"/>
-              </a:ext>
-            </a:extLst>
-          </a:blip>
-          <a:stretch>
-            <a:fillRect/>
-          </a:stretch>
-        </p:blipFill>
-        <p:spPr>
-          <a:xfrm>
-            <a:off x="4160044" y="4076692"/>
-            <a:ext cx="310515" cy="251461"/>
-          </a:xfrm>
-          <a:prstGeom prst="rect">
-            <a:avLst/>
-          </a:prstGeom>
-        </p:spPr>
-      </p:pic>
     </p:spTree>
     <p:extLst>
       <p:ext uri="{BB962C8B-B14F-4D97-AF65-F5344CB8AC3E}">
@@ -19957,13 +19650,8 @@
                   <a:schemeClr val="accent1"/>
                 </a:solidFill>
               </a:rPr>
-              <a:t>Aggregate Capital permanently down by 1.6-1.7%</a:t>
-            </a:r>
-            <a:endParaRPr lang="en-US" dirty="0">
-              <a:solidFill>
-                <a:schemeClr val="accent2"/>
-              </a:solidFill>
-            </a:endParaRPr>
+              <a:t>Aggregate Capital permanently down;</a:t>
+            </a:r>
           </a:p>
           <a:p>
             <a:r>
@@ -19972,14 +19660,16 @@
                   <a:schemeClr val="accent2"/>
                 </a:solidFill>
               </a:rPr>
-              <a:t>Aggregate Output permanently down by 11% or $1.7bn</a:t>
+              <a:t>Aggregate Output permanently down by 10%;</a:t>
             </a:r>
           </a:p>
           <a:p>
             <a:r>
               <a:rPr lang="en-US" dirty="0">
                 <a:solidFill>
-                  <a:schemeClr val="accent3"/>
+                  <a:schemeClr val="accent3">
+                    <a:lumMod val="75000"/>
+                  </a:schemeClr>
                 </a:solidFill>
               </a:rPr>
               <a:t>Consumption falls as aggregate price levels rise</a:t>
@@ -20021,7 +19711,7 @@
                   <a:schemeClr val="accent1"/>
                 </a:solidFill>
               </a:rPr>
-              <a:t>Aggregate Capital is higher than status quo after 7 years</a:t>
+              <a:t>Aggregate Capital falls, but then rises above status quo;</a:t>
             </a:r>
           </a:p>
           <a:p>
@@ -20031,19 +19721,20 @@
                   <a:schemeClr val="accent2"/>
                 </a:solidFill>
               </a:rPr>
-              <a:t>Output initially falls by 6% or $0.85bn before rising</a:t>
-            </a:r>
-            <a:r>
-              <a:rPr lang="en-US" dirty="0"/>
-              <a:t>; </a:t>
-            </a:r>
+              <a:t>Output initially falls by 6% before rising;</a:t>
+            </a:r>
+            <a:endParaRPr lang="en-US" dirty="0"/>
+          </a:p>
+          <a:p>
             <a:r>
               <a:rPr lang="en-US" dirty="0">
                 <a:solidFill>
-                  <a:schemeClr val="accent3"/>
+                  <a:schemeClr val="accent3">
+                    <a:lumMod val="75000"/>
+                  </a:schemeClr>
                 </a:solidFill>
               </a:rPr>
-              <a:t>Consumption is 3.5% higher in the long run.</a:t>
+              <a:t>Consumption is 3.5% higher in the long run</a:t>
             </a:r>
           </a:p>
         </p:txBody>
@@ -20316,7 +20007,7 @@
         <p:spPr>
           <a:xfrm>
             <a:off x="591303" y="5470741"/>
-            <a:ext cx="5355087" cy="923330"/>
+            <a:ext cx="5355087" cy="646331"/>
           </a:xfrm>
           <a:prstGeom prst="rect">
             <a:avLst/>
@@ -20335,7 +20026,7 @@
                   <a:schemeClr val="accent1"/>
                 </a:solidFill>
               </a:rPr>
-              <a:t>Manufacturing capital quickly recovers</a:t>
+              <a:t>Manufacturing capital quickly recovers;</a:t>
             </a:r>
             <a:endParaRPr lang="en-US" dirty="0">
               <a:solidFill>
@@ -20347,21 +20038,18 @@
             <a:r>
               <a:rPr lang="en-US" dirty="0">
                 <a:solidFill>
-                  <a:schemeClr val="accent2"/>
+                  <a:schemeClr val="accent3">
+                    <a:lumMod val="75000"/>
+                  </a:schemeClr>
                 </a:solidFill>
               </a:rPr>
-              <a:t>Manufacturing output down by 27% or $1.5bn</a:t>
-            </a:r>
-          </a:p>
-          <a:p>
-            <a:r>
-              <a:rPr lang="en-US" dirty="0">
-                <a:solidFill>
-                  <a:schemeClr val="accent3"/>
-                </a:solidFill>
-              </a:rPr>
-              <a:t>Consumption falls as Manufacturing prices rise.</a:t>
-            </a:r>
+              <a:t>Consumption falls (prices rise)</a:t>
+            </a:r>
+            <a:endParaRPr lang="en-US" dirty="0">
+              <a:solidFill>
+                <a:schemeClr val="accent3"/>
+              </a:solidFill>
+            </a:endParaRPr>
           </a:p>
         </p:txBody>
       </p:sp>
@@ -20380,7 +20068,7 @@
         <p:spPr>
           <a:xfrm>
             <a:off x="6293221" y="5470741"/>
-            <a:ext cx="5536936" cy="923330"/>
+            <a:ext cx="5536936" cy="646331"/>
           </a:xfrm>
           <a:prstGeom prst="rect">
             <a:avLst/>
@@ -20399,32 +20087,19 @@
                   <a:schemeClr val="accent1"/>
                 </a:solidFill>
               </a:rPr>
-              <a:t>Manufacturing capital slowly recovers</a:t>
+              <a:t>Manufacturing capital slowly recovers;</a:t>
             </a:r>
           </a:p>
           <a:p>
             <a:r>
               <a:rPr lang="en-US" dirty="0">
                 <a:solidFill>
-                  <a:schemeClr val="accent2"/>
+                  <a:schemeClr val="accent3">
+                    <a:lumMod val="75000"/>
+                  </a:schemeClr>
                 </a:solidFill>
               </a:rPr>
-              <a:t>Manufacturing output down by 20% or $1.1bn</a:t>
-            </a:r>
-            <a:endParaRPr lang="en-US" dirty="0">
-              <a:solidFill>
-                <a:schemeClr val="accent3"/>
-              </a:solidFill>
-            </a:endParaRPr>
-          </a:p>
-          <a:p>
-            <a:r>
-              <a:rPr lang="en-US" dirty="0">
-                <a:solidFill>
-                  <a:schemeClr val="accent3"/>
-                </a:solidFill>
-              </a:rPr>
-              <a:t>Consumption rises as Manufacturing prices fall.</a:t>
+              <a:t>Consumption rises (prices fall)</a:t>
             </a:r>
           </a:p>
         </p:txBody>
@@ -20669,35 +20344,26 @@
             <a:r>
               <a:rPr lang="en-US" dirty="0">
                 <a:solidFill>
-                  <a:schemeClr val="accent1"/>
+                  <a:schemeClr val="accent3">
+                    <a:lumMod val="75000"/>
+                  </a:schemeClr>
                 </a:solidFill>
               </a:rPr>
-              <a:t>Capital down by 9% in the long run</a:t>
-            </a:r>
-            <a:r>
-              <a:rPr lang="en-US" dirty="0"/>
-              <a:t>.</a:t>
-            </a:r>
-          </a:p>
-          <a:p>
-            <a:r>
-              <a:rPr lang="en-US" dirty="0"/>
-              <a:t>Utilities (Energy and Water) price initially fall by 4%; </a:t>
-            </a:r>
-          </a:p>
-          <a:p>
-            <a:r>
-              <a:rPr lang="en-US" dirty="0">
-                <a:solidFill>
-                  <a:schemeClr val="accent3"/>
-                </a:solidFill>
-              </a:rPr>
-              <a:t>Consumption up compensating for falls elsewhere</a:t>
-            </a:r>
-            <a:r>
-              <a:rPr lang="en-US" dirty="0"/>
-              <a:t>;</a:t>
-            </a:r>
+              <a:t>Consumption up (price down) temporarily</a:t>
+            </a:r>
+          </a:p>
+          <a:p>
+            <a:pPr marL="285750" indent="-285750">
+              <a:buFont typeface="System Font Regular"/>
+              <a:buChar char="*"/>
+            </a:pPr>
+            <a:r>
+              <a:rPr lang="en-AU" dirty="0"/>
+              <a:t>Gladstone is connected to NEM …</a:t>
+            </a:r>
+          </a:p>
+          <a:p>
+            <a:endParaRPr lang="en-US" dirty="0"/>
           </a:p>
         </p:txBody>
       </p:sp>
@@ -20865,29 +20531,32 @@
             <a:r>
               <a:rPr lang="en-US" dirty="0">
                 <a:solidFill>
-                  <a:schemeClr val="accent1"/>
+                  <a:schemeClr val="accent3">
+                    <a:lumMod val="75000"/>
+                  </a:schemeClr>
                 </a:solidFill>
               </a:rPr>
-              <a:t>Capital down by 6% in the long run;</a:t>
-            </a:r>
-            <a:endParaRPr lang="en-US" dirty="0"/>
-          </a:p>
-          <a:p>
-            <a:r>
-              <a:rPr lang="en-US" dirty="0"/>
-              <a:t>Utilities price down by 10% and remains there;</a:t>
-            </a:r>
-          </a:p>
-          <a:p>
-            <a:r>
-              <a:rPr lang="en-US" dirty="0">
-                <a:solidFill>
-                  <a:schemeClr val="accent3"/>
-                </a:solidFill>
-              </a:rPr>
-              <a:t>Consumption up and remains there</a:t>
-            </a:r>
-            <a:endParaRPr lang="en-US" dirty="0"/>
+              <a:t>Consumption up (price down) permanently</a:t>
+            </a:r>
+          </a:p>
+          <a:p>
+            <a:pPr marL="285750" indent="-285750">
+              <a:buFont typeface="System Font Regular"/>
+              <a:buChar char="*"/>
+            </a:pPr>
+            <a:r>
+              <a:rPr lang="en-AU" dirty="0"/>
+              <a:t>Gladstone is connected to NEM …</a:t>
+            </a:r>
+          </a:p>
+          <a:p>
+            <a:endParaRPr lang="en-US" dirty="0">
+              <a:solidFill>
+                <a:schemeClr val="accent3">
+                  <a:lumMod val="75000"/>
+                </a:schemeClr>
+              </a:solidFill>
+            </a:endParaRPr>
           </a:p>
         </p:txBody>
       </p:sp>
@@ -21005,7 +20674,7 @@
         <p:spPr>
           <a:xfrm>
             <a:off x="612860" y="5448524"/>
-            <a:ext cx="5124076" cy="1200329"/>
+            <a:ext cx="5124076" cy="923330"/>
           </a:xfrm>
           <a:prstGeom prst="rect">
             <a:avLst/>
@@ -21017,12 +20686,6 @@
             <a:spAutoFit/>
           </a:bodyPr>
           <a:lstStyle/>
-          <a:p>
-            <a:r>
-              <a:rPr lang="en-US" dirty="0"/>
-              <a:t>Cheaper energy and water prices cause</a:t>
-            </a:r>
-          </a:p>
           <a:p>
             <a:r>
               <a:rPr lang="en-US" dirty="0">
@@ -21212,7 +20875,7 @@
         <p:spPr>
           <a:xfrm>
             <a:off x="6290633" y="5448523"/>
-            <a:ext cx="5124076" cy="646331"/>
+            <a:ext cx="5124076" cy="369332"/>
           </a:xfrm>
           <a:prstGeom prst="rect">
             <a:avLst/>
@@ -21224,12 +20887,6 @@
             <a:spAutoFit/>
           </a:bodyPr>
           <a:lstStyle/>
-          <a:p>
-            <a:r>
-              <a:rPr lang="en-US" dirty="0"/>
-              <a:t>Similar, but more extreme:</a:t>
-            </a:r>
-          </a:p>
           <a:p>
             <a:r>
               <a:rPr lang="en-US" dirty="0">
@@ -21678,16 +21335,13 @@
             <a:pPr lvl="1"/>
             <a:r>
               <a:rPr lang="en-AU" sz="2000" dirty="0"/>
-              <a:t>Transition needs to be handled with care: </a:t>
-            </a:r>
-            <a:r>
-              <a:rPr lang="en-AU" sz="2000" dirty="0">
-                <a:solidFill>
-                  <a:srgbClr val="7030A0"/>
-                </a:solidFill>
-              </a:rPr>
-              <a:t>major consumer of energy and energy prices </a:t>
-            </a:r>
+              <a:t>Transition needs to be handled with care: BSL needs to be in close proximity of energy supply</a:t>
+            </a:r>
+            <a:endParaRPr lang="en-AU" sz="2000" dirty="0">
+              <a:solidFill>
+                <a:srgbClr val="7030A0"/>
+              </a:solidFill>
+            </a:endParaRPr>
           </a:p>
           <a:p>
             <a:pPr marL="457200" lvl="1" indent="0">
@@ -21760,50 +21414,11 @@
             </a:r>
             <a:r>
               <a:rPr lang="en-AU" sz="2000" dirty="0"/>
-              <a:t> can keep Gladstone in proximity of power supply</a:t>
+              <a:t> can keep Gladstone in proximity of energy supply</a:t>
             </a:r>
           </a:p>
         </p:txBody>
       </p:sp>
-      <p:pic>
-        <p:nvPicPr>
-          <p:cNvPr id="8" name="Graphic 7" descr="Arrow Up with solid fill">
-            <a:extLst>
-              <a:ext uri="{FF2B5EF4-FFF2-40B4-BE49-F238E27FC236}">
-                <a16:creationId xmlns:a16="http://schemas.microsoft.com/office/drawing/2014/main" id="{B676BE18-4480-38F9-D9ED-6384AE2AC549}"/>
-              </a:ext>
-            </a:extLst>
-          </p:cNvPr>
-          <p:cNvPicPr>
-            <a:picLocks noChangeAspect="1"/>
-          </p:cNvPicPr>
-          <p:nvPr/>
-        </p:nvPicPr>
-        <p:blipFill>
-          <a:blip r:embed="rId4">
-            <a:extLst>
-              <a:ext uri="{28A0092B-C50C-407E-A947-70E740481C1C}">
-                <a14:useLocalDpi xmlns:a14="http://schemas.microsoft.com/office/drawing/2010/main" val="0"/>
-              </a:ext>
-              <a:ext uri="{96DAC541-7B7A-43D3-8B79-37D633B846F1}">
-                <asvg:svgBlip xmlns:asvg="http://schemas.microsoft.com/office/drawing/2016/SVG/main" r:embed="rId5"/>
-              </a:ext>
-            </a:extLst>
-          </a:blip>
-          <a:stretch>
-            <a:fillRect/>
-          </a:stretch>
-        </p:blipFill>
-        <p:spPr>
-          <a:xfrm>
-            <a:off x="10276046" y="1365877"/>
-            <a:ext cx="310515" cy="251461"/>
-          </a:xfrm>
-          <a:prstGeom prst="rect">
-            <a:avLst/>
-          </a:prstGeom>
-        </p:spPr>
-      </p:pic>
     </p:spTree>
     <p:extLst>
       <p:ext uri="{BB962C8B-B14F-4D97-AF65-F5344CB8AC3E}">
@@ -22759,7 +22374,7 @@
         </p:nvSpPr>
         <p:spPr>
           <a:xfrm>
-            <a:off x="838200" y="2475419"/>
+            <a:off x="838200" y="2635439"/>
             <a:ext cx="10515600" cy="3651061"/>
           </a:xfrm>
           <a:solidFill>
@@ -22969,7 +22584,15 @@
             </a:r>
             <a:r>
               <a:rPr lang="en-AU" sz="2800" dirty="0"/>
-              <a:t> decisions are hard in such settings, so some of the SEE will fail to hold.</a:t>
+              <a:t> decisions are hard in such settings, so </a:t>
+            </a:r>
+            <a:r>
+              <a:rPr lang="en-AU" sz="2800" b="1" dirty="0"/>
+              <a:t>some of the SEE will fail to hold</a:t>
+            </a:r>
+            <a:r>
+              <a:rPr lang="en-AU" sz="2800" dirty="0"/>
+              <a:t>.</a:t>
             </a:r>
           </a:p>
           <a:p>
@@ -23008,7 +22631,7 @@
             <a:pPr lvl="1"/>
             <a:r>
               <a:rPr lang="en-AU" sz="2900" dirty="0"/>
-              <a:t>Sector-specific shocks more likely to spread/propagate</a:t>
+              <a:t>Sector-specific shocks lead to corrections that spill over to other sectors</a:t>
             </a:r>
           </a:p>
           <a:p>
@@ -23042,8 +22665,8 @@
         </p:nvSpPr>
         <p:spPr>
           <a:xfrm>
-            <a:off x="838200" y="623948"/>
-            <a:ext cx="10515600" cy="1692771"/>
+            <a:off x="838200" y="470060"/>
+            <a:ext cx="10515600" cy="2000548"/>
           </a:xfrm>
           <a:prstGeom prst="rect">
             <a:avLst/>
@@ -23137,9 +22760,12 @@
             <a:pPr marL="457200" lvl="1" indent="0">
               <a:buNone/>
             </a:pPr>
+            <a:endParaRPr lang="en-AU" sz="2000" dirty="0"/>
+          </a:p>
+          <a:p>
             <a:r>
               <a:rPr lang="en-AU" sz="2000" b="1" dirty="0"/>
-              <a:t>Computable: </a:t>
+              <a:t>Computation: </a:t>
             </a:r>
             <a:r>
               <a:rPr lang="en-AU" sz="2000" b="1" dirty="0">
@@ -23830,6 +23456,51 @@
               <a:buNone/>
             </a:pPr>
             <a:r>
+              <a:rPr lang="en-AU" dirty="0"/>
+              <a:t>Other Heavy industry: Ammonia, Cement, LNG, Oil refinery</a:t>
+            </a:r>
+          </a:p>
+          <a:p>
+            <a:pPr marL="457200" lvl="1" indent="0">
+              <a:buNone/>
+            </a:pPr>
+            <a:r>
+              <a:rPr lang="en-AU" b="1" dirty="0">
+                <a:hlinkClick r:id="rId3"/>
+              </a:rPr>
+              <a:t>Growth</a:t>
+            </a:r>
+            <a:r>
+              <a:rPr lang="en-AU" b="1" dirty="0">
+                <a:effectLst/>
+                <a:hlinkClick r:id="rId3"/>
+              </a:rPr>
+              <a:t> industries</a:t>
+            </a:r>
+            <a:r>
+              <a:rPr lang="en-AU" b="0" dirty="0">
+                <a:effectLst/>
+              </a:rPr>
+              <a:t>: ag-tech, </a:t>
+            </a:r>
+            <a:r>
+              <a:rPr lang="en-AU" b="0" dirty="0" err="1">
+                <a:effectLst/>
+              </a:rPr>
+              <a:t>AlOx</a:t>
+            </a:r>
+            <a:r>
+              <a:rPr lang="en-AU" b="0" dirty="0">
+                <a:effectLst/>
+              </a:rPr>
+              <a:t> batteries, aquaculture, Mining Serv., green {…}</a:t>
+            </a:r>
+          </a:p>
+          <a:p>
+            <a:pPr marL="457200" lvl="1" indent="0">
+              <a:buNone/>
+            </a:pPr>
+            <a:r>
               <a:rPr lang="en-AU" b="1" dirty="0">
                 <a:solidFill>
                   <a:srgbClr val="7030A0"/>
@@ -23850,46 +23521,9 @@
             <a:pPr marL="457200" lvl="1" indent="0">
               <a:buNone/>
             </a:pPr>
-            <a:r>
-              <a:rPr lang="en-AU" dirty="0"/>
-              <a:t>Other Heavy industry: Ammonia, Cement, LNG, Oil refinery</a:t>
-            </a:r>
-          </a:p>
-          <a:p>
-            <a:pPr marL="457200" lvl="1" indent="0">
-              <a:buNone/>
-            </a:pPr>
-            <a:r>
-              <a:rPr lang="en-AU" b="1" dirty="0">
-                <a:hlinkClick r:id="rId3"/>
-              </a:rPr>
-              <a:t>Growth</a:t>
-            </a:r>
-            <a:r>
-              <a:rPr lang="en-AU" b="1" dirty="0">
-                <a:effectLst/>
-                <a:hlinkClick r:id="rId3"/>
-              </a:rPr>
-              <a:t> industries</a:t>
-            </a:r>
-            <a:r>
-              <a:rPr lang="en-AU" b="0" dirty="0">
-                <a:effectLst/>
-              </a:rPr>
-              <a:t>: ag-tech, </a:t>
-            </a:r>
-            <a:r>
-              <a:rPr lang="en-AU" b="0" dirty="0" err="1">
-                <a:effectLst/>
-              </a:rPr>
-              <a:t>AlOx</a:t>
-            </a:r>
-            <a:r>
-              <a:rPr lang="en-AU" b="0" dirty="0">
-                <a:effectLst/>
-              </a:rPr>
-              <a:t> batteries, aquaculture, Mining Serv., green {…}</a:t>
-            </a:r>
+            <a:endParaRPr lang="en-AU" b="0" dirty="0">
+              <a:effectLst/>
+            </a:endParaRPr>
           </a:p>
         </p:txBody>
       </p:sp>
@@ -24159,8 +23793,8 @@
         </p:nvSpPr>
         <p:spPr>
           <a:xfrm>
-            <a:off x="838200" y="950118"/>
-            <a:ext cx="10515600" cy="4957763"/>
+            <a:off x="838200" y="1151929"/>
+            <a:ext cx="10515600" cy="4554141"/>
           </a:xfrm>
           <a:solidFill>
             <a:schemeClr val="bg2"/>
@@ -24176,43 +23810,27 @@
               <a:buNone/>
             </a:pPr>
             <a:r>
-              <a:rPr lang="en-AU" sz="2600" b="1" dirty="0"/>
-              <a:t>We specialise the model to a 19 (ANZSIC division) Gladstone economy:</a:t>
-            </a:r>
-            <a:endParaRPr lang="en-AU" sz="2600" b="1" i="1" dirty="0"/>
-          </a:p>
-          <a:p>
-            <a:pPr marL="0" indent="0">
+              <a:rPr lang="en-AU" b="1" dirty="0"/>
+              <a:t>Regionalisation to a 19-sector (ANZSIC divisions) Gladstone economy</a:t>
+            </a:r>
+            <a:endParaRPr lang="en-AU" b="1" i="1" dirty="0"/>
+          </a:p>
+          <a:p>
+            <a:pPr marL="457200" lvl="1" indent="0">
               <a:buNone/>
             </a:pPr>
-            <a:r>
-              <a:rPr lang="en-AU" sz="2200" i="1" dirty="0"/>
-              <a:t>Jobs in Australia</a:t>
-            </a:r>
-            <a:r>
-              <a:rPr lang="en-AU" sz="2200" dirty="0"/>
-              <a:t> ABS data: labour per sector for Gladstone 2019.</a:t>
-            </a:r>
-          </a:p>
-          <a:p>
-            <a:pPr marL="0" indent="0">
+            <a:endParaRPr lang="en-AU" b="1" dirty="0">
+              <a:solidFill>
+                <a:srgbClr val="7030A0"/>
+              </a:solidFill>
+            </a:endParaRPr>
+          </a:p>
+          <a:p>
+            <a:pPr marL="457200" lvl="1" indent="0">
               <a:buNone/>
             </a:pPr>
             <a:r>
-              <a:rPr lang="en-AU" sz="2200" i="1" dirty="0"/>
-              <a:t>Input-output flows</a:t>
-            </a:r>
-            <a:r>
-              <a:rPr lang="en-AU" sz="2200" dirty="0"/>
-              <a:t> between sectors: ABS tables 5 and 8 for Australia</a:t>
-            </a:r>
-          </a:p>
-          <a:p>
-            <a:pPr marL="0" indent="0">
-              <a:buNone/>
-            </a:pPr>
-            <a:r>
-              <a:rPr lang="en-AU" sz="2200" b="1" dirty="0">
+              <a:rPr lang="en-AU" b="1" dirty="0">
                 <a:solidFill>
                   <a:srgbClr val="7030A0"/>
                 </a:solidFill>
@@ -24220,62 +23838,36 @@
               <a:t>Investment flows </a:t>
             </a:r>
             <a:r>
-              <a:rPr lang="en-AU" sz="2200" dirty="0"/>
-              <a:t>between sectors: </a:t>
-            </a:r>
-            <a:r>
-              <a:rPr lang="en-AU" sz="2200" dirty="0">
-                <a:solidFill>
-                  <a:srgbClr val="7030A0"/>
-                </a:solidFill>
-              </a:rPr>
-              <a:t>following </a:t>
-            </a:r>
-            <a:r>
-              <a:rPr lang="en-AU" sz="2200" dirty="0" err="1">
-                <a:solidFill>
-                  <a:srgbClr val="7030A0"/>
-                </a:solidFill>
-              </a:rPr>
+              <a:rPr lang="en-AU" dirty="0"/>
+              <a:t>between sectors: method of </a:t>
+            </a:r>
+            <a:r>
+              <a:rPr lang="en-AU" dirty="0" err="1"/>
               <a:t>Atalay</a:t>
             </a:r>
             <a:r>
-              <a:rPr lang="en-AU" sz="2200" dirty="0">
-                <a:solidFill>
-                  <a:srgbClr val="7030A0"/>
-                </a:solidFill>
-              </a:rPr>
+              <a:rPr lang="en-AU" dirty="0"/>
               <a:t> (2017)</a:t>
             </a:r>
           </a:p>
           <a:p>
-            <a:pPr lvl="1"/>
-            <a:r>
-              <a:rPr lang="en-AU" sz="2200" dirty="0">
+            <a:pPr lvl="2"/>
+            <a:r>
+              <a:rPr lang="en-AU" dirty="0">
                 <a:solidFill>
                   <a:srgbClr val="7030A0"/>
                 </a:solidFill>
               </a:rPr>
               <a:t>Adapt investment flows tables from US data</a:t>
             </a:r>
-            <a:r>
-              <a:rPr lang="en-AU" sz="2200" dirty="0"/>
-              <a:t> (US Bureau of Economic Analysis)</a:t>
-            </a:r>
-          </a:p>
-          <a:p>
-            <a:pPr lvl="1"/>
-            <a:r>
-              <a:rPr lang="en-AU" sz="2200" dirty="0"/>
-              <a:t>ABS Gross Fixed Capital Formation by Industry by type of Asset</a:t>
-            </a:r>
-          </a:p>
-          <a:p>
-            <a:pPr marL="0" indent="0">
+            <a:endParaRPr lang="en-AU" dirty="0"/>
+          </a:p>
+          <a:p>
+            <a:pPr marL="457200" lvl="1" indent="0">
               <a:buNone/>
             </a:pPr>
             <a:r>
-              <a:rPr lang="en-AU" sz="2200" b="1" dirty="0">
+              <a:rPr lang="en-AU" sz="2000" b="1" dirty="0">
                 <a:solidFill>
                   <a:srgbClr val="7030A0"/>
                 </a:solidFill>
@@ -24283,19 +23875,19 @@
               <a:t>BLADE</a:t>
             </a:r>
             <a:r>
-              <a:rPr lang="en-AU" sz="2200" i="1" dirty="0"/>
+              <a:rPr lang="en-AU" sz="2000" i="1" dirty="0"/>
               <a:t> (and </a:t>
             </a:r>
             <a:r>
-              <a:rPr lang="en-AU" sz="2200" i="1" dirty="0" err="1"/>
+              <a:rPr lang="en-AU" sz="2000" i="1" dirty="0" err="1"/>
               <a:t>Remplan</a:t>
             </a:r>
             <a:r>
-              <a:rPr lang="en-AU" sz="2200" i="1" dirty="0"/>
+              <a:rPr lang="en-AU" sz="2000" i="1" dirty="0"/>
               <a:t>): </a:t>
             </a:r>
             <a:r>
-              <a:rPr lang="en-AU" sz="2200" dirty="0">
+              <a:rPr lang="en-AU" sz="2000" dirty="0">
                 <a:solidFill>
                   <a:srgbClr val="7030A0"/>
                 </a:solidFill>
@@ -24304,55 +23896,102 @@
             </a:r>
           </a:p>
           <a:p>
-            <a:pPr marL="0" indent="0">
+            <a:pPr marL="457200" lvl="1" indent="0">
               <a:buNone/>
             </a:pPr>
-            <a:r>
-              <a:rPr lang="en-AU" sz="2200" i="1" dirty="0"/>
-              <a:t>Gladstone Port</a:t>
-            </a:r>
-            <a:r>
-              <a:rPr lang="en-AU" sz="2200" dirty="0"/>
-              <a:t> data for Bauxite, Alumina, Aluminium and Coal</a:t>
-            </a:r>
-          </a:p>
-          <a:p>
-            <a:pPr marL="0" indent="0">
+            <a:endParaRPr lang="en-AU" sz="1600" i="1" dirty="0"/>
+          </a:p>
+          <a:p>
+            <a:pPr marL="457200" lvl="1" indent="0">
               <a:buNone/>
             </a:pPr>
             <a:r>
-              <a:rPr lang="en-AU" sz="2200" i="1" dirty="0"/>
-              <a:t>Rio Tinto</a:t>
-            </a:r>
-            <a:r>
-              <a:rPr lang="en-AU" sz="2200" dirty="0"/>
-              <a:t> accounts</a:t>
-            </a:r>
-          </a:p>
-          <a:p>
-            <a:pPr marL="0" indent="0">
+              <a:rPr lang="en-AU" sz="1600" i="1" dirty="0"/>
+              <a:t>Jobs in Australia</a:t>
+            </a:r>
+            <a:r>
+              <a:rPr lang="en-AU" sz="1600" dirty="0"/>
+              <a:t> ABS data: labour per sector for Gladstone 2019.</a:t>
+            </a:r>
+          </a:p>
+          <a:p>
+            <a:pPr marL="457200" lvl="1" indent="0">
               <a:buNone/>
             </a:pPr>
             <a:r>
-              <a:rPr lang="en-AU" sz="2200" i="1" dirty="0"/>
+              <a:rPr lang="en-AU" sz="1600" i="1" dirty="0"/>
+              <a:t>Input-output flows</a:t>
+            </a:r>
+            <a:r>
+              <a:rPr lang="en-AU" sz="1600" dirty="0"/>
+              <a:t> between sectors: ABS tables 5 and 8 for Australia</a:t>
+            </a:r>
+            <a:endParaRPr lang="en-AU" sz="1600" i="1" dirty="0"/>
+          </a:p>
+          <a:p>
+            <a:pPr marL="457200" lvl="1" indent="0">
+              <a:buNone/>
+            </a:pPr>
+            <a:r>
+              <a:rPr lang="en-AU" sz="1600" i="1" dirty="0"/>
+              <a:t>Gross Fixed Capital Formation by Industry by type of Asset</a:t>
+            </a:r>
+            <a:r>
+              <a:rPr lang="en-AU" sz="1600" dirty="0"/>
+              <a:t>: ABS for Australia</a:t>
+            </a:r>
+            <a:endParaRPr lang="en-AU" sz="1600" i="1" dirty="0"/>
+          </a:p>
+          <a:p>
+            <a:pPr marL="457200" lvl="1" indent="0">
+              <a:buNone/>
+            </a:pPr>
+            <a:r>
+              <a:rPr lang="en-AU" sz="1600" i="1" dirty="0"/>
+              <a:t>Gladstone Port</a:t>
+            </a:r>
+            <a:r>
+              <a:rPr lang="en-AU" sz="1600" dirty="0"/>
+              <a:t> data for Bauxite, Alumina, Aluminium and Coal</a:t>
+            </a:r>
+          </a:p>
+          <a:p>
+            <a:pPr marL="457200" lvl="1" indent="0">
+              <a:buNone/>
+            </a:pPr>
+            <a:r>
+              <a:rPr lang="en-AU" sz="1600" i="1" dirty="0"/>
+              <a:t>Rio Tinto</a:t>
+            </a:r>
+            <a:r>
+              <a:rPr lang="en-AU" sz="1600" dirty="0"/>
+              <a:t> accounts</a:t>
+            </a:r>
+          </a:p>
+          <a:p>
+            <a:pPr marL="457200" lvl="1" indent="0">
+              <a:buNone/>
+            </a:pPr>
+            <a:r>
+              <a:rPr lang="en-AU" sz="1600" i="1" dirty="0"/>
               <a:t>Studies </a:t>
             </a:r>
             <a:r>
-              <a:rPr lang="en-AU" sz="2200" dirty="0"/>
+              <a:rPr lang="en-AU" sz="1600" dirty="0"/>
               <a:t>on aluminium production e.g. </a:t>
             </a:r>
           </a:p>
           <a:p>
-            <a:pPr lvl="1"/>
-            <a:r>
-              <a:rPr lang="en-AU" sz="2200" dirty="0"/>
+            <a:pPr lvl="2"/>
+            <a:r>
+              <a:rPr lang="en-AU" sz="1600" dirty="0"/>
               <a:t>Gagne and Nappi 2000</a:t>
             </a:r>
           </a:p>
           <a:p>
-            <a:pPr lvl="1"/>
-            <a:r>
-              <a:rPr lang="en-AU" sz="2200" dirty="0"/>
+            <a:pPr lvl="2"/>
+            <a:r>
+              <a:rPr lang="en-AU" sz="1600" dirty="0"/>
               <a:t>Best Available Techniques 2017</a:t>
             </a:r>
           </a:p>

</xml_diff>